<commit_message>
updating plots and powerpoint
</commit_message>
<xml_diff>
--- a/Task1.pptx
+++ b/Task1.pptx
@@ -11,6 +11,15 @@
     <p:sldId id="256" r:id="rId6"/>
     <p:sldId id="257" r:id="rId7"/>
     <p:sldId id="258" r:id="rId8"/>
+    <p:sldId id="259" r:id="rId9"/>
+    <p:sldId id="260" r:id="rId10"/>
+    <p:sldId id="261" r:id="rId11"/>
+    <p:sldId id="262" r:id="rId12"/>
+    <p:sldId id="263" r:id="rId13"/>
+    <p:sldId id="264" r:id="rId14"/>
+    <p:sldId id="265" r:id="rId15"/>
+    <p:sldId id="266" r:id="rId16"/>
+    <p:sldId id="267" r:id="rId17"/>
   </p:sldIdLst>
   <p:sldSz cy="5143500" cx="9144000"/>
   <p:notesSz cx="6858000" cy="9144000"/>
@@ -707,7 +716,7 @@
       </p:grpSpPr>
       <p:sp>
         <p:nvSpPr>
-          <p:cNvPr id="51" name="Google Shape;51;p:notes"/>
+          <p:cNvPr id="51" name="Google Shape;51;ga3bf6a83b6_0_0:notes"/>
           <p:cNvSpPr/>
           <p:nvPr>
             <p:ph idx="2" type="sldImg"/>
@@ -716,7 +725,7 @@
         <p:spPr>
           <a:xfrm>
             <a:off x="381300" y="685800"/>
-            <a:ext cx="6096075" cy="3429000"/>
+            <a:ext cx="6096000" cy="3429000"/>
           </a:xfrm>
           <a:custGeom>
             <a:rect b="b" l="l" r="r" t="t"/>
@@ -742,7 +751,304 @@
       </p:sp>
       <p:sp>
         <p:nvSpPr>
-          <p:cNvPr id="52" name="Google Shape;52;p:notes"/>
+          <p:cNvPr id="52" name="Google Shape;52;ga3bf6a83b6_0_0:notes"/>
+          <p:cNvSpPr txBox="1"/>
+          <p:nvPr>
+            <p:ph idx="1" type="body"/>
+          </p:nvPr>
+        </p:nvSpPr>
+        <p:spPr>
+          <a:xfrm>
+            <a:off x="685800" y="4343400"/>
+            <a:ext cx="5486400" cy="4114800"/>
+          </a:xfrm>
+          <a:prstGeom prst="rect">
+            <a:avLst/>
+          </a:prstGeom>
+        </p:spPr>
+        <p:txBody>
+          <a:bodyPr anchorCtr="0" anchor="t" bIns="91425" lIns="91425" spcFirstLastPara="1" rIns="91425" wrap="square" tIns="91425">
+            <a:noAutofit/>
+          </a:bodyPr>
+          <a:lstStyle/>
+          <a:p>
+            <a:pPr indent="0" lvl="0" marL="0" rtl="0" algn="l">
+              <a:spcBef>
+                <a:spcPts val="0"/>
+              </a:spcBef>
+              <a:spcAft>
+                <a:spcPts val="0"/>
+              </a:spcAft>
+              <a:buNone/>
+            </a:pPr>
+            <a:r>
+              <a:t/>
+            </a:r>
+            <a:endParaRPr/>
+          </a:p>
+        </p:txBody>
+      </p:sp>
+    </p:spTree>
+  </p:cSld>
+  <p:clrMapOvr>
+    <a:masterClrMapping/>
+  </p:clrMapOvr>
+</p:notes>
+</file>
+
+<file path=ppt/notesSlides/notesSlide10.xml><?xml version="1.0" encoding="utf-8"?>
+<p:notes xmlns:a="http://schemas.openxmlformats.org/drawingml/2006/main" xmlns:r="http://schemas.openxmlformats.org/officeDocument/2006/relationships" xmlns:mc="http://schemas.openxmlformats.org/markup-compatibility/2006" xmlns:mv="urn:schemas-microsoft-com:mac:vml" xmlns:p="http://schemas.openxmlformats.org/presentationml/2006/main" xmlns:c="http://schemas.openxmlformats.org/drawingml/2006/chart" xmlns:dgm="http://schemas.openxmlformats.org/drawingml/2006/diagram" xmlns:o="urn:schemas-microsoft-com:office:office" xmlns:v="urn:schemas-microsoft-com:vml" xmlns:pvml="urn:schemas-microsoft-com:office:powerpoint" xmlns:com="http://schemas.openxmlformats.org/drawingml/2006/compatibility" xmlns:p14="http://schemas.microsoft.com/office/powerpoint/2010/main" xmlns:p15="http://schemas.microsoft.com/office/powerpoint/2012/main" xmlns:ahyp="http://schemas.microsoft.com/office/drawing/2018/hyperlinkcolor" showMasterPhAnim="0" showMasterSp="0">
+  <p:cSld>
+    <p:spTree>
+      <p:nvGrpSpPr>
+        <p:cNvPr id="105" name="Shape 105"/>
+        <p:cNvGrpSpPr/>
+        <p:nvPr/>
+      </p:nvGrpSpPr>
+      <p:grpSpPr>
+        <a:xfrm>
+          <a:off x="0" y="0"/>
+          <a:ext cx="0" cy="0"/>
+          <a:chOff x="0" y="0"/>
+          <a:chExt cx="0" cy="0"/>
+        </a:xfrm>
+      </p:grpSpPr>
+      <p:sp>
+        <p:nvSpPr>
+          <p:cNvPr id="106" name="Google Shape;106;g9faee993de_0_22:notes"/>
+          <p:cNvSpPr/>
+          <p:nvPr>
+            <p:ph idx="2" type="sldImg"/>
+          </p:nvPr>
+        </p:nvSpPr>
+        <p:spPr>
+          <a:xfrm>
+            <a:off x="381300" y="685800"/>
+            <a:ext cx="6096000" cy="3429000"/>
+          </a:xfrm>
+          <a:custGeom>
+            <a:rect b="b" l="l" r="r" t="t"/>
+            <a:pathLst>
+              <a:path extrusionOk="0" h="120000" w="120000">
+                <a:moveTo>
+                  <a:pt x="0" y="0"/>
+                </a:moveTo>
+                <a:lnTo>
+                  <a:pt x="120000" y="0"/>
+                </a:lnTo>
+                <a:lnTo>
+                  <a:pt x="120000" y="120000"/>
+                </a:lnTo>
+                <a:lnTo>
+                  <a:pt x="0" y="120000"/>
+                </a:lnTo>
+                <a:close/>
+              </a:path>
+            </a:pathLst>
+          </a:custGeom>
+        </p:spPr>
+      </p:sp>
+      <p:sp>
+        <p:nvSpPr>
+          <p:cNvPr id="107" name="Google Shape;107;g9faee993de_0_22:notes"/>
+          <p:cNvSpPr txBox="1"/>
+          <p:nvPr>
+            <p:ph idx="1" type="body"/>
+          </p:nvPr>
+        </p:nvSpPr>
+        <p:spPr>
+          <a:xfrm>
+            <a:off x="685800" y="4343400"/>
+            <a:ext cx="5486400" cy="4114800"/>
+          </a:xfrm>
+          <a:prstGeom prst="rect">
+            <a:avLst/>
+          </a:prstGeom>
+        </p:spPr>
+        <p:txBody>
+          <a:bodyPr anchorCtr="0" anchor="t" bIns="91425" lIns="91425" spcFirstLastPara="1" rIns="91425" wrap="square" tIns="91425">
+            <a:noAutofit/>
+          </a:bodyPr>
+          <a:lstStyle/>
+          <a:p>
+            <a:pPr indent="0" lvl="0" marL="0" rtl="0" algn="l">
+              <a:spcBef>
+                <a:spcPts val="0"/>
+              </a:spcBef>
+              <a:spcAft>
+                <a:spcPts val="0"/>
+              </a:spcAft>
+              <a:buNone/>
+            </a:pPr>
+            <a:r>
+              <a:t/>
+            </a:r>
+            <a:endParaRPr/>
+          </a:p>
+        </p:txBody>
+      </p:sp>
+    </p:spTree>
+  </p:cSld>
+  <p:clrMapOvr>
+    <a:masterClrMapping/>
+  </p:clrMapOvr>
+</p:notes>
+</file>
+
+<file path=ppt/notesSlides/notesSlide11.xml><?xml version="1.0" encoding="utf-8"?>
+<p:notes xmlns:a="http://schemas.openxmlformats.org/drawingml/2006/main" xmlns:r="http://schemas.openxmlformats.org/officeDocument/2006/relationships" xmlns:mc="http://schemas.openxmlformats.org/markup-compatibility/2006" xmlns:mv="urn:schemas-microsoft-com:mac:vml" xmlns:p="http://schemas.openxmlformats.org/presentationml/2006/main" xmlns:c="http://schemas.openxmlformats.org/drawingml/2006/chart" xmlns:dgm="http://schemas.openxmlformats.org/drawingml/2006/diagram" xmlns:o="urn:schemas-microsoft-com:office:office" xmlns:v="urn:schemas-microsoft-com:vml" xmlns:pvml="urn:schemas-microsoft-com:office:powerpoint" xmlns:com="http://schemas.openxmlformats.org/drawingml/2006/compatibility" xmlns:p14="http://schemas.microsoft.com/office/powerpoint/2010/main" xmlns:p15="http://schemas.microsoft.com/office/powerpoint/2012/main" xmlns:ahyp="http://schemas.microsoft.com/office/drawing/2018/hyperlinkcolor" showMasterPhAnim="0" showMasterSp="0">
+  <p:cSld>
+    <p:spTree>
+      <p:nvGrpSpPr>
+        <p:cNvPr id="111" name="Shape 111"/>
+        <p:cNvGrpSpPr/>
+        <p:nvPr/>
+      </p:nvGrpSpPr>
+      <p:grpSpPr>
+        <a:xfrm>
+          <a:off x="0" y="0"/>
+          <a:ext cx="0" cy="0"/>
+          <a:chOff x="0" y="0"/>
+          <a:chExt cx="0" cy="0"/>
+        </a:xfrm>
+      </p:grpSpPr>
+      <p:sp>
+        <p:nvSpPr>
+          <p:cNvPr id="112" name="Google Shape;112;g9faee993de_0_17:notes"/>
+          <p:cNvSpPr/>
+          <p:nvPr>
+            <p:ph idx="2" type="sldImg"/>
+          </p:nvPr>
+        </p:nvSpPr>
+        <p:spPr>
+          <a:xfrm>
+            <a:off x="381300" y="685800"/>
+            <a:ext cx="6096000" cy="3429000"/>
+          </a:xfrm>
+          <a:custGeom>
+            <a:rect b="b" l="l" r="r" t="t"/>
+            <a:pathLst>
+              <a:path extrusionOk="0" h="120000" w="120000">
+                <a:moveTo>
+                  <a:pt x="0" y="0"/>
+                </a:moveTo>
+                <a:lnTo>
+                  <a:pt x="120000" y="0"/>
+                </a:lnTo>
+                <a:lnTo>
+                  <a:pt x="120000" y="120000"/>
+                </a:lnTo>
+                <a:lnTo>
+                  <a:pt x="0" y="120000"/>
+                </a:lnTo>
+                <a:close/>
+              </a:path>
+            </a:pathLst>
+          </a:custGeom>
+        </p:spPr>
+      </p:sp>
+      <p:sp>
+        <p:nvSpPr>
+          <p:cNvPr id="113" name="Google Shape;113;g9faee993de_0_17:notes"/>
+          <p:cNvSpPr txBox="1"/>
+          <p:nvPr>
+            <p:ph idx="1" type="body"/>
+          </p:nvPr>
+        </p:nvSpPr>
+        <p:spPr>
+          <a:xfrm>
+            <a:off x="685800" y="4343400"/>
+            <a:ext cx="5486400" cy="4114800"/>
+          </a:xfrm>
+          <a:prstGeom prst="rect">
+            <a:avLst/>
+          </a:prstGeom>
+        </p:spPr>
+        <p:txBody>
+          <a:bodyPr anchorCtr="0" anchor="t" bIns="91425" lIns="91425" spcFirstLastPara="1" rIns="91425" wrap="square" tIns="91425">
+            <a:noAutofit/>
+          </a:bodyPr>
+          <a:lstStyle/>
+          <a:p>
+            <a:pPr indent="0" lvl="0" marL="0" rtl="0" algn="l">
+              <a:spcBef>
+                <a:spcPts val="0"/>
+              </a:spcBef>
+              <a:spcAft>
+                <a:spcPts val="0"/>
+              </a:spcAft>
+              <a:buNone/>
+            </a:pPr>
+            <a:r>
+              <a:t/>
+            </a:r>
+            <a:endParaRPr/>
+          </a:p>
+        </p:txBody>
+      </p:sp>
+    </p:spTree>
+  </p:cSld>
+  <p:clrMapOvr>
+    <a:masterClrMapping/>
+  </p:clrMapOvr>
+</p:notes>
+</file>
+
+<file path=ppt/notesSlides/notesSlide12.xml><?xml version="1.0" encoding="utf-8"?>
+<p:notes xmlns:a="http://schemas.openxmlformats.org/drawingml/2006/main" xmlns:r="http://schemas.openxmlformats.org/officeDocument/2006/relationships" xmlns:mc="http://schemas.openxmlformats.org/markup-compatibility/2006" xmlns:mv="urn:schemas-microsoft-com:mac:vml" xmlns:p="http://schemas.openxmlformats.org/presentationml/2006/main" xmlns:c="http://schemas.openxmlformats.org/drawingml/2006/chart" xmlns:dgm="http://schemas.openxmlformats.org/drawingml/2006/diagram" xmlns:o="urn:schemas-microsoft-com:office:office" xmlns:v="urn:schemas-microsoft-com:vml" xmlns:pvml="urn:schemas-microsoft-com:office:powerpoint" xmlns:com="http://schemas.openxmlformats.org/drawingml/2006/compatibility" xmlns:p14="http://schemas.microsoft.com/office/powerpoint/2010/main" xmlns:p15="http://schemas.microsoft.com/office/powerpoint/2012/main" xmlns:ahyp="http://schemas.microsoft.com/office/drawing/2018/hyperlinkcolor" showMasterPhAnim="0" showMasterSp="0">
+  <p:cSld>
+    <p:spTree>
+      <p:nvGrpSpPr>
+        <p:cNvPr id="117" name="Shape 117"/>
+        <p:cNvGrpSpPr/>
+        <p:nvPr/>
+      </p:nvGrpSpPr>
+      <p:grpSpPr>
+        <a:xfrm>
+          <a:off x="0" y="0"/>
+          <a:ext cx="0" cy="0"/>
+          <a:chOff x="0" y="0"/>
+          <a:chExt cx="0" cy="0"/>
+        </a:xfrm>
+      </p:grpSpPr>
+      <p:sp>
+        <p:nvSpPr>
+          <p:cNvPr id="118" name="Google Shape;118;g9faee993de_0_29:notes"/>
+          <p:cNvSpPr/>
+          <p:nvPr>
+            <p:ph idx="2" type="sldImg"/>
+          </p:nvPr>
+        </p:nvSpPr>
+        <p:spPr>
+          <a:xfrm>
+            <a:off x="381300" y="685800"/>
+            <a:ext cx="6096000" cy="3429000"/>
+          </a:xfrm>
+          <a:custGeom>
+            <a:rect b="b" l="l" r="r" t="t"/>
+            <a:pathLst>
+              <a:path extrusionOk="0" h="120000" w="120000">
+                <a:moveTo>
+                  <a:pt x="0" y="0"/>
+                </a:moveTo>
+                <a:lnTo>
+                  <a:pt x="120000" y="0"/>
+                </a:lnTo>
+                <a:lnTo>
+                  <a:pt x="120000" y="120000"/>
+                </a:lnTo>
+                <a:lnTo>
+                  <a:pt x="0" y="120000"/>
+                </a:lnTo>
+                <a:close/>
+              </a:path>
+            </a:pathLst>
+          </a:custGeom>
+        </p:spPr>
+      </p:sp>
+      <p:sp>
+        <p:nvSpPr>
+          <p:cNvPr id="119" name="Google Shape;119;g9faee993de_0_29:notes"/>
           <p:cNvSpPr txBox="1"/>
           <p:nvPr>
             <p:ph idx="1" type="body"/>
@@ -806,7 +1112,7 @@
       </p:grpSpPr>
       <p:sp>
         <p:nvSpPr>
-          <p:cNvPr id="57" name="Google Shape;57;ga3bf6a83b6_0_0:notes"/>
+          <p:cNvPr id="57" name="Google Shape;57;ga3bf6a83b6_0_6:notes"/>
           <p:cNvSpPr/>
           <p:nvPr>
             <p:ph idx="2" type="sldImg"/>
@@ -841,7 +1147,7 @@
       </p:sp>
       <p:sp>
         <p:nvSpPr>
-          <p:cNvPr id="58" name="Google Shape;58;ga3bf6a83b6_0_0:notes"/>
+          <p:cNvPr id="58" name="Google Shape;58;ga3bf6a83b6_0_6:notes"/>
           <p:cNvSpPr txBox="1"/>
           <p:nvPr>
             <p:ph idx="1" type="body"/>
@@ -891,7 +1197,7 @@
   <p:cSld>
     <p:spTree>
       <p:nvGrpSpPr>
-        <p:cNvPr id="62" name="Shape 62"/>
+        <p:cNvPr id="63" name="Shape 63"/>
         <p:cNvGrpSpPr/>
         <p:nvPr/>
       </p:nvGrpSpPr>
@@ -905,7 +1211,7 @@
       </p:grpSpPr>
       <p:sp>
         <p:nvSpPr>
-          <p:cNvPr id="63" name="Google Shape;63;ga3bf6a83b6_0_6:notes"/>
+          <p:cNvPr id="64" name="Google Shape;64;g9faee993de_0_6:notes"/>
           <p:cNvSpPr/>
           <p:nvPr>
             <p:ph idx="2" type="sldImg"/>
@@ -940,7 +1246,601 @@
       </p:sp>
       <p:sp>
         <p:nvSpPr>
-          <p:cNvPr id="64" name="Google Shape;64;ga3bf6a83b6_0_6:notes"/>
+          <p:cNvPr id="65" name="Google Shape;65;g9faee993de_0_6:notes"/>
+          <p:cNvSpPr txBox="1"/>
+          <p:nvPr>
+            <p:ph idx="1" type="body"/>
+          </p:nvPr>
+        </p:nvSpPr>
+        <p:spPr>
+          <a:xfrm>
+            <a:off x="685800" y="4343400"/>
+            <a:ext cx="5486400" cy="4114800"/>
+          </a:xfrm>
+          <a:prstGeom prst="rect">
+            <a:avLst/>
+          </a:prstGeom>
+        </p:spPr>
+        <p:txBody>
+          <a:bodyPr anchorCtr="0" anchor="t" bIns="91425" lIns="91425" spcFirstLastPara="1" rIns="91425" wrap="square" tIns="91425">
+            <a:noAutofit/>
+          </a:bodyPr>
+          <a:lstStyle/>
+          <a:p>
+            <a:pPr indent="0" lvl="0" marL="0" rtl="0" algn="l">
+              <a:spcBef>
+                <a:spcPts val="0"/>
+              </a:spcBef>
+              <a:spcAft>
+                <a:spcPts val="0"/>
+              </a:spcAft>
+              <a:buNone/>
+            </a:pPr>
+            <a:r>
+              <a:t/>
+            </a:r>
+            <a:endParaRPr/>
+          </a:p>
+        </p:txBody>
+      </p:sp>
+    </p:spTree>
+  </p:cSld>
+  <p:clrMapOvr>
+    <a:masterClrMapping/>
+  </p:clrMapOvr>
+</p:notes>
+</file>
+
+<file path=ppt/notesSlides/notesSlide4.xml><?xml version="1.0" encoding="utf-8"?>
+<p:notes xmlns:a="http://schemas.openxmlformats.org/drawingml/2006/main" xmlns:r="http://schemas.openxmlformats.org/officeDocument/2006/relationships" xmlns:mc="http://schemas.openxmlformats.org/markup-compatibility/2006" xmlns:mv="urn:schemas-microsoft-com:mac:vml" xmlns:p="http://schemas.openxmlformats.org/presentationml/2006/main" xmlns:c="http://schemas.openxmlformats.org/drawingml/2006/chart" xmlns:dgm="http://schemas.openxmlformats.org/drawingml/2006/diagram" xmlns:o="urn:schemas-microsoft-com:office:office" xmlns:v="urn:schemas-microsoft-com:vml" xmlns:pvml="urn:schemas-microsoft-com:office:powerpoint" xmlns:com="http://schemas.openxmlformats.org/drawingml/2006/compatibility" xmlns:p14="http://schemas.microsoft.com/office/powerpoint/2010/main" xmlns:p15="http://schemas.microsoft.com/office/powerpoint/2012/main" xmlns:ahyp="http://schemas.microsoft.com/office/drawing/2018/hyperlinkcolor" showMasterPhAnim="0" showMasterSp="0">
+  <p:cSld>
+    <p:spTree>
+      <p:nvGrpSpPr>
+        <p:cNvPr id="69" name="Shape 69"/>
+        <p:cNvGrpSpPr/>
+        <p:nvPr/>
+      </p:nvGrpSpPr>
+      <p:grpSpPr>
+        <a:xfrm>
+          <a:off x="0" y="0"/>
+          <a:ext cx="0" cy="0"/>
+          <a:chOff x="0" y="0"/>
+          <a:chExt cx="0" cy="0"/>
+        </a:xfrm>
+      </p:grpSpPr>
+      <p:sp>
+        <p:nvSpPr>
+          <p:cNvPr id="70" name="Google Shape;70;ga52a419110_0_57:notes"/>
+          <p:cNvSpPr/>
+          <p:nvPr>
+            <p:ph idx="2" type="sldImg"/>
+          </p:nvPr>
+        </p:nvSpPr>
+        <p:spPr>
+          <a:xfrm>
+            <a:off x="381300" y="685800"/>
+            <a:ext cx="6096000" cy="3429000"/>
+          </a:xfrm>
+          <a:custGeom>
+            <a:rect b="b" l="l" r="r" t="t"/>
+            <a:pathLst>
+              <a:path extrusionOk="0" h="120000" w="120000">
+                <a:moveTo>
+                  <a:pt x="0" y="0"/>
+                </a:moveTo>
+                <a:lnTo>
+                  <a:pt x="120000" y="0"/>
+                </a:lnTo>
+                <a:lnTo>
+                  <a:pt x="120000" y="120000"/>
+                </a:lnTo>
+                <a:lnTo>
+                  <a:pt x="0" y="120000"/>
+                </a:lnTo>
+                <a:close/>
+              </a:path>
+            </a:pathLst>
+          </a:custGeom>
+        </p:spPr>
+      </p:sp>
+      <p:sp>
+        <p:nvSpPr>
+          <p:cNvPr id="71" name="Google Shape;71;ga52a419110_0_57:notes"/>
+          <p:cNvSpPr txBox="1"/>
+          <p:nvPr>
+            <p:ph idx="1" type="body"/>
+          </p:nvPr>
+        </p:nvSpPr>
+        <p:spPr>
+          <a:xfrm>
+            <a:off x="685800" y="4343400"/>
+            <a:ext cx="5486400" cy="4114800"/>
+          </a:xfrm>
+          <a:prstGeom prst="rect">
+            <a:avLst/>
+          </a:prstGeom>
+        </p:spPr>
+        <p:txBody>
+          <a:bodyPr anchorCtr="0" anchor="t" bIns="91425" lIns="91425" spcFirstLastPara="1" rIns="91425" wrap="square" tIns="91425">
+            <a:noAutofit/>
+          </a:bodyPr>
+          <a:lstStyle/>
+          <a:p>
+            <a:pPr indent="0" lvl="0" marL="0" rtl="0" algn="l">
+              <a:spcBef>
+                <a:spcPts val="0"/>
+              </a:spcBef>
+              <a:spcAft>
+                <a:spcPts val="0"/>
+              </a:spcAft>
+              <a:buNone/>
+            </a:pPr>
+            <a:r>
+              <a:t/>
+            </a:r>
+            <a:endParaRPr/>
+          </a:p>
+        </p:txBody>
+      </p:sp>
+    </p:spTree>
+  </p:cSld>
+  <p:clrMapOvr>
+    <a:masterClrMapping/>
+  </p:clrMapOvr>
+</p:notes>
+</file>
+
+<file path=ppt/notesSlides/notesSlide5.xml><?xml version="1.0" encoding="utf-8"?>
+<p:notes xmlns:a="http://schemas.openxmlformats.org/drawingml/2006/main" xmlns:r="http://schemas.openxmlformats.org/officeDocument/2006/relationships" xmlns:mc="http://schemas.openxmlformats.org/markup-compatibility/2006" xmlns:mv="urn:schemas-microsoft-com:mac:vml" xmlns:p="http://schemas.openxmlformats.org/presentationml/2006/main" xmlns:c="http://schemas.openxmlformats.org/drawingml/2006/chart" xmlns:dgm="http://schemas.openxmlformats.org/drawingml/2006/diagram" xmlns:o="urn:schemas-microsoft-com:office:office" xmlns:v="urn:schemas-microsoft-com:vml" xmlns:pvml="urn:schemas-microsoft-com:office:powerpoint" xmlns:com="http://schemas.openxmlformats.org/drawingml/2006/compatibility" xmlns:p14="http://schemas.microsoft.com/office/powerpoint/2010/main" xmlns:p15="http://schemas.microsoft.com/office/powerpoint/2012/main" xmlns:ahyp="http://schemas.microsoft.com/office/drawing/2018/hyperlinkcolor" showMasterPhAnim="0" showMasterSp="0">
+  <p:cSld>
+    <p:spTree>
+      <p:nvGrpSpPr>
+        <p:cNvPr id="75" name="Shape 75"/>
+        <p:cNvGrpSpPr/>
+        <p:nvPr/>
+      </p:nvGrpSpPr>
+      <p:grpSpPr>
+        <a:xfrm>
+          <a:off x="0" y="0"/>
+          <a:ext cx="0" cy="0"/>
+          <a:chOff x="0" y="0"/>
+          <a:chExt cx="0" cy="0"/>
+        </a:xfrm>
+      </p:grpSpPr>
+      <p:sp>
+        <p:nvSpPr>
+          <p:cNvPr id="76" name="Google Shape;76;g9faee993de_0_11:notes"/>
+          <p:cNvSpPr/>
+          <p:nvPr>
+            <p:ph idx="2" type="sldImg"/>
+          </p:nvPr>
+        </p:nvSpPr>
+        <p:spPr>
+          <a:xfrm>
+            <a:off x="381300" y="685800"/>
+            <a:ext cx="6096000" cy="3429000"/>
+          </a:xfrm>
+          <a:custGeom>
+            <a:rect b="b" l="l" r="r" t="t"/>
+            <a:pathLst>
+              <a:path extrusionOk="0" h="120000" w="120000">
+                <a:moveTo>
+                  <a:pt x="0" y="0"/>
+                </a:moveTo>
+                <a:lnTo>
+                  <a:pt x="120000" y="0"/>
+                </a:lnTo>
+                <a:lnTo>
+                  <a:pt x="120000" y="120000"/>
+                </a:lnTo>
+                <a:lnTo>
+                  <a:pt x="0" y="120000"/>
+                </a:lnTo>
+                <a:close/>
+              </a:path>
+            </a:pathLst>
+          </a:custGeom>
+        </p:spPr>
+      </p:sp>
+      <p:sp>
+        <p:nvSpPr>
+          <p:cNvPr id="77" name="Google Shape;77;g9faee993de_0_11:notes"/>
+          <p:cNvSpPr txBox="1"/>
+          <p:nvPr>
+            <p:ph idx="1" type="body"/>
+          </p:nvPr>
+        </p:nvSpPr>
+        <p:spPr>
+          <a:xfrm>
+            <a:off x="685800" y="4343400"/>
+            <a:ext cx="5486400" cy="4114800"/>
+          </a:xfrm>
+          <a:prstGeom prst="rect">
+            <a:avLst/>
+          </a:prstGeom>
+        </p:spPr>
+        <p:txBody>
+          <a:bodyPr anchorCtr="0" anchor="t" bIns="91425" lIns="91425" spcFirstLastPara="1" rIns="91425" wrap="square" tIns="91425">
+            <a:noAutofit/>
+          </a:bodyPr>
+          <a:lstStyle/>
+          <a:p>
+            <a:pPr indent="0" lvl="0" marL="0" rtl="0" algn="l">
+              <a:spcBef>
+                <a:spcPts val="0"/>
+              </a:spcBef>
+              <a:spcAft>
+                <a:spcPts val="0"/>
+              </a:spcAft>
+              <a:buNone/>
+            </a:pPr>
+            <a:r>
+              <a:t/>
+            </a:r>
+            <a:endParaRPr/>
+          </a:p>
+        </p:txBody>
+      </p:sp>
+    </p:spTree>
+  </p:cSld>
+  <p:clrMapOvr>
+    <a:masterClrMapping/>
+  </p:clrMapOvr>
+</p:notes>
+</file>
+
+<file path=ppt/notesSlides/notesSlide6.xml><?xml version="1.0" encoding="utf-8"?>
+<p:notes xmlns:a="http://schemas.openxmlformats.org/drawingml/2006/main" xmlns:r="http://schemas.openxmlformats.org/officeDocument/2006/relationships" xmlns:mc="http://schemas.openxmlformats.org/markup-compatibility/2006" xmlns:mv="urn:schemas-microsoft-com:mac:vml" xmlns:p="http://schemas.openxmlformats.org/presentationml/2006/main" xmlns:c="http://schemas.openxmlformats.org/drawingml/2006/chart" xmlns:dgm="http://schemas.openxmlformats.org/drawingml/2006/diagram" xmlns:o="urn:schemas-microsoft-com:office:office" xmlns:v="urn:schemas-microsoft-com:vml" xmlns:pvml="urn:schemas-microsoft-com:office:powerpoint" xmlns:com="http://schemas.openxmlformats.org/drawingml/2006/compatibility" xmlns:p14="http://schemas.microsoft.com/office/powerpoint/2010/main" xmlns:p15="http://schemas.microsoft.com/office/powerpoint/2012/main" xmlns:ahyp="http://schemas.microsoft.com/office/drawing/2018/hyperlinkcolor" showMasterPhAnim="0" showMasterSp="0">
+  <p:cSld>
+    <p:spTree>
+      <p:nvGrpSpPr>
+        <p:cNvPr id="81" name="Shape 81"/>
+        <p:cNvGrpSpPr/>
+        <p:nvPr/>
+      </p:nvGrpSpPr>
+      <p:grpSpPr>
+        <a:xfrm>
+          <a:off x="0" y="0"/>
+          <a:ext cx="0" cy="0"/>
+          <a:chOff x="0" y="0"/>
+          <a:chExt cx="0" cy="0"/>
+        </a:xfrm>
+      </p:grpSpPr>
+      <p:sp>
+        <p:nvSpPr>
+          <p:cNvPr id="82" name="Google Shape;82;g9faee993de_0_0:notes"/>
+          <p:cNvSpPr/>
+          <p:nvPr>
+            <p:ph idx="2" type="sldImg"/>
+          </p:nvPr>
+        </p:nvSpPr>
+        <p:spPr>
+          <a:xfrm>
+            <a:off x="381300" y="685800"/>
+            <a:ext cx="6096000" cy="3429000"/>
+          </a:xfrm>
+          <a:custGeom>
+            <a:rect b="b" l="l" r="r" t="t"/>
+            <a:pathLst>
+              <a:path extrusionOk="0" h="120000" w="120000">
+                <a:moveTo>
+                  <a:pt x="0" y="0"/>
+                </a:moveTo>
+                <a:lnTo>
+                  <a:pt x="120000" y="0"/>
+                </a:lnTo>
+                <a:lnTo>
+                  <a:pt x="120000" y="120000"/>
+                </a:lnTo>
+                <a:lnTo>
+                  <a:pt x="0" y="120000"/>
+                </a:lnTo>
+                <a:close/>
+              </a:path>
+            </a:pathLst>
+          </a:custGeom>
+        </p:spPr>
+      </p:sp>
+      <p:sp>
+        <p:nvSpPr>
+          <p:cNvPr id="83" name="Google Shape;83;g9faee993de_0_0:notes"/>
+          <p:cNvSpPr txBox="1"/>
+          <p:nvPr>
+            <p:ph idx="1" type="body"/>
+          </p:nvPr>
+        </p:nvSpPr>
+        <p:spPr>
+          <a:xfrm>
+            <a:off x="685800" y="4343400"/>
+            <a:ext cx="5486400" cy="4114800"/>
+          </a:xfrm>
+          <a:prstGeom prst="rect">
+            <a:avLst/>
+          </a:prstGeom>
+        </p:spPr>
+        <p:txBody>
+          <a:bodyPr anchorCtr="0" anchor="t" bIns="91425" lIns="91425" spcFirstLastPara="1" rIns="91425" wrap="square" tIns="91425">
+            <a:noAutofit/>
+          </a:bodyPr>
+          <a:lstStyle/>
+          <a:p>
+            <a:pPr indent="0" lvl="0" marL="0" rtl="0" algn="l">
+              <a:spcBef>
+                <a:spcPts val="0"/>
+              </a:spcBef>
+              <a:spcAft>
+                <a:spcPts val="0"/>
+              </a:spcAft>
+              <a:buNone/>
+            </a:pPr>
+            <a:r>
+              <a:t/>
+            </a:r>
+            <a:endParaRPr/>
+          </a:p>
+        </p:txBody>
+      </p:sp>
+    </p:spTree>
+  </p:cSld>
+  <p:clrMapOvr>
+    <a:masterClrMapping/>
+  </p:clrMapOvr>
+</p:notes>
+</file>
+
+<file path=ppt/notesSlides/notesSlide7.xml><?xml version="1.0" encoding="utf-8"?>
+<p:notes xmlns:a="http://schemas.openxmlformats.org/drawingml/2006/main" xmlns:r="http://schemas.openxmlformats.org/officeDocument/2006/relationships" xmlns:mc="http://schemas.openxmlformats.org/markup-compatibility/2006" xmlns:mv="urn:schemas-microsoft-com:mac:vml" xmlns:p="http://schemas.openxmlformats.org/presentationml/2006/main" xmlns:c="http://schemas.openxmlformats.org/drawingml/2006/chart" xmlns:dgm="http://schemas.openxmlformats.org/drawingml/2006/diagram" xmlns:o="urn:schemas-microsoft-com:office:office" xmlns:v="urn:schemas-microsoft-com:vml" xmlns:pvml="urn:schemas-microsoft-com:office:powerpoint" xmlns:com="http://schemas.openxmlformats.org/drawingml/2006/compatibility" xmlns:p14="http://schemas.microsoft.com/office/powerpoint/2010/main" xmlns:p15="http://schemas.microsoft.com/office/powerpoint/2012/main" xmlns:ahyp="http://schemas.microsoft.com/office/drawing/2018/hyperlinkcolor" showMasterPhAnim="0" showMasterSp="0">
+  <p:cSld>
+    <p:spTree>
+      <p:nvGrpSpPr>
+        <p:cNvPr id="87" name="Shape 87"/>
+        <p:cNvGrpSpPr/>
+        <p:nvPr/>
+      </p:nvGrpSpPr>
+      <p:grpSpPr>
+        <a:xfrm>
+          <a:off x="0" y="0"/>
+          <a:ext cx="0" cy="0"/>
+          <a:chOff x="0" y="0"/>
+          <a:chExt cx="0" cy="0"/>
+        </a:xfrm>
+      </p:grpSpPr>
+      <p:sp>
+        <p:nvSpPr>
+          <p:cNvPr id="88" name="Google Shape;88;ga53c47efc0_0_6:notes"/>
+          <p:cNvSpPr/>
+          <p:nvPr>
+            <p:ph idx="2" type="sldImg"/>
+          </p:nvPr>
+        </p:nvSpPr>
+        <p:spPr>
+          <a:xfrm>
+            <a:off x="381300" y="685800"/>
+            <a:ext cx="6096000" cy="3429000"/>
+          </a:xfrm>
+          <a:custGeom>
+            <a:rect b="b" l="l" r="r" t="t"/>
+            <a:pathLst>
+              <a:path extrusionOk="0" h="120000" w="120000">
+                <a:moveTo>
+                  <a:pt x="0" y="0"/>
+                </a:moveTo>
+                <a:lnTo>
+                  <a:pt x="120000" y="0"/>
+                </a:lnTo>
+                <a:lnTo>
+                  <a:pt x="120000" y="120000"/>
+                </a:lnTo>
+                <a:lnTo>
+                  <a:pt x="0" y="120000"/>
+                </a:lnTo>
+                <a:close/>
+              </a:path>
+            </a:pathLst>
+          </a:custGeom>
+        </p:spPr>
+      </p:sp>
+      <p:sp>
+        <p:nvSpPr>
+          <p:cNvPr id="89" name="Google Shape;89;ga53c47efc0_0_6:notes"/>
+          <p:cNvSpPr txBox="1"/>
+          <p:nvPr>
+            <p:ph idx="1" type="body"/>
+          </p:nvPr>
+        </p:nvSpPr>
+        <p:spPr>
+          <a:xfrm>
+            <a:off x="685800" y="4343400"/>
+            <a:ext cx="5486400" cy="4114800"/>
+          </a:xfrm>
+          <a:prstGeom prst="rect">
+            <a:avLst/>
+          </a:prstGeom>
+        </p:spPr>
+        <p:txBody>
+          <a:bodyPr anchorCtr="0" anchor="t" bIns="91425" lIns="91425" spcFirstLastPara="1" rIns="91425" wrap="square" tIns="91425">
+            <a:noAutofit/>
+          </a:bodyPr>
+          <a:lstStyle/>
+          <a:p>
+            <a:pPr indent="0" lvl="0" marL="0" rtl="0" algn="l">
+              <a:spcBef>
+                <a:spcPts val="0"/>
+              </a:spcBef>
+              <a:spcAft>
+                <a:spcPts val="0"/>
+              </a:spcAft>
+              <a:buNone/>
+            </a:pPr>
+            <a:r>
+              <a:t/>
+            </a:r>
+            <a:endParaRPr/>
+          </a:p>
+        </p:txBody>
+      </p:sp>
+    </p:spTree>
+  </p:cSld>
+  <p:clrMapOvr>
+    <a:masterClrMapping/>
+  </p:clrMapOvr>
+</p:notes>
+</file>
+
+<file path=ppt/notesSlides/notesSlide8.xml><?xml version="1.0" encoding="utf-8"?>
+<p:notes xmlns:a="http://schemas.openxmlformats.org/drawingml/2006/main" xmlns:r="http://schemas.openxmlformats.org/officeDocument/2006/relationships" xmlns:mc="http://schemas.openxmlformats.org/markup-compatibility/2006" xmlns:mv="urn:schemas-microsoft-com:mac:vml" xmlns:p="http://schemas.openxmlformats.org/presentationml/2006/main" xmlns:c="http://schemas.openxmlformats.org/drawingml/2006/chart" xmlns:dgm="http://schemas.openxmlformats.org/drawingml/2006/diagram" xmlns:o="urn:schemas-microsoft-com:office:office" xmlns:v="urn:schemas-microsoft-com:vml" xmlns:pvml="urn:schemas-microsoft-com:office:powerpoint" xmlns:com="http://schemas.openxmlformats.org/drawingml/2006/compatibility" xmlns:p14="http://schemas.microsoft.com/office/powerpoint/2010/main" xmlns:p15="http://schemas.microsoft.com/office/powerpoint/2012/main" xmlns:ahyp="http://schemas.microsoft.com/office/drawing/2018/hyperlinkcolor" showMasterPhAnim="0" showMasterSp="0">
+  <p:cSld>
+    <p:spTree>
+      <p:nvGrpSpPr>
+        <p:cNvPr id="93" name="Shape 93"/>
+        <p:cNvGrpSpPr/>
+        <p:nvPr/>
+      </p:nvGrpSpPr>
+      <p:grpSpPr>
+        <a:xfrm>
+          <a:off x="0" y="0"/>
+          <a:ext cx="0" cy="0"/>
+          <a:chOff x="0" y="0"/>
+          <a:chExt cx="0" cy="0"/>
+        </a:xfrm>
+      </p:grpSpPr>
+      <p:sp>
+        <p:nvSpPr>
+          <p:cNvPr id="94" name="Google Shape;94;ga52a419110_0_5:notes"/>
+          <p:cNvSpPr/>
+          <p:nvPr>
+            <p:ph idx="2" type="sldImg"/>
+          </p:nvPr>
+        </p:nvSpPr>
+        <p:spPr>
+          <a:xfrm>
+            <a:off x="381300" y="685800"/>
+            <a:ext cx="6096000" cy="3429000"/>
+          </a:xfrm>
+          <a:custGeom>
+            <a:rect b="b" l="l" r="r" t="t"/>
+            <a:pathLst>
+              <a:path extrusionOk="0" h="120000" w="120000">
+                <a:moveTo>
+                  <a:pt x="0" y="0"/>
+                </a:moveTo>
+                <a:lnTo>
+                  <a:pt x="120000" y="0"/>
+                </a:lnTo>
+                <a:lnTo>
+                  <a:pt x="120000" y="120000"/>
+                </a:lnTo>
+                <a:lnTo>
+                  <a:pt x="0" y="120000"/>
+                </a:lnTo>
+                <a:close/>
+              </a:path>
+            </a:pathLst>
+          </a:custGeom>
+        </p:spPr>
+      </p:sp>
+      <p:sp>
+        <p:nvSpPr>
+          <p:cNvPr id="95" name="Google Shape;95;ga52a419110_0_5:notes"/>
+          <p:cNvSpPr txBox="1"/>
+          <p:nvPr>
+            <p:ph idx="1" type="body"/>
+          </p:nvPr>
+        </p:nvSpPr>
+        <p:spPr>
+          <a:xfrm>
+            <a:off x="685800" y="4343400"/>
+            <a:ext cx="5486400" cy="4114800"/>
+          </a:xfrm>
+          <a:prstGeom prst="rect">
+            <a:avLst/>
+          </a:prstGeom>
+        </p:spPr>
+        <p:txBody>
+          <a:bodyPr anchorCtr="0" anchor="t" bIns="91425" lIns="91425" spcFirstLastPara="1" rIns="91425" wrap="square" tIns="91425">
+            <a:noAutofit/>
+          </a:bodyPr>
+          <a:lstStyle/>
+          <a:p>
+            <a:pPr indent="0" lvl="0" marL="0" rtl="0" algn="l">
+              <a:spcBef>
+                <a:spcPts val="0"/>
+              </a:spcBef>
+              <a:spcAft>
+                <a:spcPts val="0"/>
+              </a:spcAft>
+              <a:buNone/>
+            </a:pPr>
+            <a:r>
+              <a:t/>
+            </a:r>
+            <a:endParaRPr/>
+          </a:p>
+        </p:txBody>
+      </p:sp>
+    </p:spTree>
+  </p:cSld>
+  <p:clrMapOvr>
+    <a:masterClrMapping/>
+  </p:clrMapOvr>
+</p:notes>
+</file>
+
+<file path=ppt/notesSlides/notesSlide9.xml><?xml version="1.0" encoding="utf-8"?>
+<p:notes xmlns:a="http://schemas.openxmlformats.org/drawingml/2006/main" xmlns:r="http://schemas.openxmlformats.org/officeDocument/2006/relationships" xmlns:mc="http://schemas.openxmlformats.org/markup-compatibility/2006" xmlns:mv="urn:schemas-microsoft-com:mac:vml" xmlns:p="http://schemas.openxmlformats.org/presentationml/2006/main" xmlns:c="http://schemas.openxmlformats.org/drawingml/2006/chart" xmlns:dgm="http://schemas.openxmlformats.org/drawingml/2006/diagram" xmlns:o="urn:schemas-microsoft-com:office:office" xmlns:v="urn:schemas-microsoft-com:vml" xmlns:pvml="urn:schemas-microsoft-com:office:powerpoint" xmlns:com="http://schemas.openxmlformats.org/drawingml/2006/compatibility" xmlns:p14="http://schemas.microsoft.com/office/powerpoint/2010/main" xmlns:p15="http://schemas.microsoft.com/office/powerpoint/2012/main" xmlns:ahyp="http://schemas.microsoft.com/office/drawing/2018/hyperlinkcolor" showMasterPhAnim="0" showMasterSp="0">
+  <p:cSld>
+    <p:spTree>
+      <p:nvGrpSpPr>
+        <p:cNvPr id="99" name="Shape 99"/>
+        <p:cNvGrpSpPr/>
+        <p:nvPr/>
+      </p:nvGrpSpPr>
+      <p:grpSpPr>
+        <a:xfrm>
+          <a:off x="0" y="0"/>
+          <a:ext cx="0" cy="0"/>
+          <a:chOff x="0" y="0"/>
+          <a:chExt cx="0" cy="0"/>
+        </a:xfrm>
+      </p:grpSpPr>
+      <p:sp>
+        <p:nvSpPr>
+          <p:cNvPr id="100" name="Google Shape;100;ga52a419110_0_0:notes"/>
+          <p:cNvSpPr/>
+          <p:nvPr>
+            <p:ph idx="2" type="sldImg"/>
+          </p:nvPr>
+        </p:nvSpPr>
+        <p:spPr>
+          <a:xfrm>
+            <a:off x="381300" y="685800"/>
+            <a:ext cx="6096000" cy="3429000"/>
+          </a:xfrm>
+          <a:custGeom>
+            <a:rect b="b" l="l" r="r" t="t"/>
+            <a:pathLst>
+              <a:path extrusionOk="0" h="120000" w="120000">
+                <a:moveTo>
+                  <a:pt x="0" y="0"/>
+                </a:moveTo>
+                <a:lnTo>
+                  <a:pt x="120000" y="0"/>
+                </a:lnTo>
+                <a:lnTo>
+                  <a:pt x="120000" y="120000"/>
+                </a:lnTo>
+                <a:lnTo>
+                  <a:pt x="0" y="120000"/>
+                </a:lnTo>
+                <a:close/>
+              </a:path>
+            </a:pathLst>
+          </a:custGeom>
+        </p:spPr>
+      </p:sp>
+      <p:sp>
+        <p:nvSpPr>
+          <p:cNvPr id="101" name="Google Shape;101;ga52a419110_0_0:notes"/>
           <p:cNvSpPr txBox="1"/>
           <p:nvPr>
             <p:ph idx="1" type="body"/>
@@ -3709,14 +4609,14 @@
         </p:nvSpPr>
         <p:spPr>
           <a:xfrm>
-            <a:off x="4572000" y="-125"/>
+            <a:off x="4572000" y="25"/>
             <a:ext cx="4572000" cy="5143500"/>
           </a:xfrm>
           <a:prstGeom prst="rect">
             <a:avLst/>
           </a:prstGeom>
           <a:solidFill>
-            <a:schemeClr val="lt2"/>
+            <a:schemeClr val="dk2"/>
           </a:solidFill>
           <a:ln>
             <a:noFill/>
@@ -4031,7 +4931,7 @@
         </p:nvSpPr>
         <p:spPr>
           <a:xfrm>
-            <a:off x="4939500" y="724075"/>
+            <a:off x="4939500" y="724200"/>
             <a:ext cx="3837000" cy="3695100"/>
           </a:xfrm>
           <a:prstGeom prst="rect">
@@ -4050,9 +4950,16 @@
               <a:spcAft>
                 <a:spcPts val="0"/>
               </a:spcAft>
+              <a:buClr>
+                <a:schemeClr val="dk1"/>
+              </a:buClr>
               <a:buSzPts val="1800"/>
               <a:buChar char="●"/>
-              <a:defRPr/>
+              <a:defRPr>
+                <a:solidFill>
+                  <a:schemeClr val="dk1"/>
+                </a:solidFill>
+              </a:defRPr>
             </a:lvl1pPr>
             <a:lvl2pPr indent="-317500" lvl="1" marL="914400">
               <a:spcBef>
@@ -4061,9 +4968,16 @@
               <a:spcAft>
                 <a:spcPts val="0"/>
               </a:spcAft>
+              <a:buClr>
+                <a:schemeClr val="dk1"/>
+              </a:buClr>
               <a:buSzPts val="1400"/>
               <a:buChar char="○"/>
-              <a:defRPr/>
+              <a:defRPr>
+                <a:solidFill>
+                  <a:schemeClr val="dk1"/>
+                </a:solidFill>
+              </a:defRPr>
             </a:lvl2pPr>
             <a:lvl3pPr indent="-317500" lvl="2" marL="1371600">
               <a:spcBef>
@@ -4072,9 +4986,16 @@
               <a:spcAft>
                 <a:spcPts val="0"/>
               </a:spcAft>
+              <a:buClr>
+                <a:schemeClr val="dk1"/>
+              </a:buClr>
               <a:buSzPts val="1400"/>
               <a:buChar char="■"/>
-              <a:defRPr/>
+              <a:defRPr>
+                <a:solidFill>
+                  <a:schemeClr val="dk1"/>
+                </a:solidFill>
+              </a:defRPr>
             </a:lvl3pPr>
             <a:lvl4pPr indent="-317500" lvl="3" marL="1828800">
               <a:spcBef>
@@ -4083,9 +5004,16 @@
               <a:spcAft>
                 <a:spcPts val="0"/>
               </a:spcAft>
+              <a:buClr>
+                <a:schemeClr val="dk1"/>
+              </a:buClr>
               <a:buSzPts val="1400"/>
               <a:buChar char="●"/>
-              <a:defRPr/>
+              <a:defRPr>
+                <a:solidFill>
+                  <a:schemeClr val="dk1"/>
+                </a:solidFill>
+              </a:defRPr>
             </a:lvl4pPr>
             <a:lvl5pPr indent="-317500" lvl="4" marL="2286000">
               <a:spcBef>
@@ -4094,9 +5022,16 @@
               <a:spcAft>
                 <a:spcPts val="0"/>
               </a:spcAft>
+              <a:buClr>
+                <a:schemeClr val="dk1"/>
+              </a:buClr>
               <a:buSzPts val="1400"/>
               <a:buChar char="○"/>
-              <a:defRPr/>
+              <a:defRPr>
+                <a:solidFill>
+                  <a:schemeClr val="dk1"/>
+                </a:solidFill>
+              </a:defRPr>
             </a:lvl5pPr>
             <a:lvl6pPr indent="-317500" lvl="5" marL="2743200">
               <a:spcBef>
@@ -4105,9 +5040,16 @@
               <a:spcAft>
                 <a:spcPts val="0"/>
               </a:spcAft>
+              <a:buClr>
+                <a:schemeClr val="dk1"/>
+              </a:buClr>
               <a:buSzPts val="1400"/>
               <a:buChar char="■"/>
-              <a:defRPr/>
+              <a:defRPr>
+                <a:solidFill>
+                  <a:schemeClr val="dk1"/>
+                </a:solidFill>
+              </a:defRPr>
             </a:lvl6pPr>
             <a:lvl7pPr indent="-317500" lvl="6" marL="3200400">
               <a:spcBef>
@@ -4116,9 +5058,16 @@
               <a:spcAft>
                 <a:spcPts val="0"/>
               </a:spcAft>
+              <a:buClr>
+                <a:schemeClr val="dk1"/>
+              </a:buClr>
               <a:buSzPts val="1400"/>
               <a:buChar char="●"/>
-              <a:defRPr/>
+              <a:defRPr>
+                <a:solidFill>
+                  <a:schemeClr val="dk1"/>
+                </a:solidFill>
+              </a:defRPr>
             </a:lvl7pPr>
             <a:lvl8pPr indent="-317500" lvl="7" marL="3657600">
               <a:spcBef>
@@ -4127,9 +5076,16 @@
               <a:spcAft>
                 <a:spcPts val="0"/>
               </a:spcAft>
+              <a:buClr>
+                <a:schemeClr val="dk1"/>
+              </a:buClr>
               <a:buSzPts val="1400"/>
               <a:buChar char="○"/>
-              <a:defRPr/>
+              <a:defRPr>
+                <a:solidFill>
+                  <a:schemeClr val="dk1"/>
+                </a:solidFill>
+              </a:defRPr>
             </a:lvl8pPr>
             <a:lvl9pPr indent="-317500" lvl="8" marL="4114800">
               <a:spcBef>
@@ -4138,9 +5094,16 @@
               <a:spcAft>
                 <a:spcPts val="1600"/>
               </a:spcAft>
+              <a:buClr>
+                <a:schemeClr val="dk1"/>
+              </a:buClr>
               <a:buSzPts val="1400"/>
               <a:buChar char="■"/>
-              <a:defRPr/>
+              <a:defRPr>
+                <a:solidFill>
+                  <a:schemeClr val="dk1"/>
+                </a:solidFill>
+              </a:defRPr>
             </a:lvl9pPr>
           </a:lstStyle>
           <a:p/>
@@ -4375,7 +5338,7 @@
 
 <file path=ppt/slideMasters/slideMaster1.xml><?xml version="1.0" encoding="utf-8"?>
 <p:sldMaster xmlns:a="http://schemas.openxmlformats.org/drawingml/2006/main" xmlns:r="http://schemas.openxmlformats.org/officeDocument/2006/relationships" xmlns:mc="http://schemas.openxmlformats.org/markup-compatibility/2006" xmlns:mv="urn:schemas-microsoft-com:mac:vml" xmlns:p="http://schemas.openxmlformats.org/presentationml/2006/main" xmlns:c="http://schemas.openxmlformats.org/drawingml/2006/chart" xmlns:dgm="http://schemas.openxmlformats.org/drawingml/2006/diagram" xmlns:o="urn:schemas-microsoft-com:office:office" xmlns:v="urn:schemas-microsoft-com:vml" xmlns:pvml="urn:schemas-microsoft-com:office:powerpoint" xmlns:com="http://schemas.openxmlformats.org/drawingml/2006/compatibility" xmlns:p14="http://schemas.microsoft.com/office/powerpoint/2010/main" xmlns:p15="http://schemas.microsoft.com/office/powerpoint/2012/main" xmlns:ahyp="http://schemas.microsoft.com/office/drawing/2018/hyperlinkcolor">
-  <p:cSld name="simple-light-2">
+  <p:cSld name="simple-dark-2">
     <p:bg>
       <p:bgPr>
         <a:solidFill>
@@ -4626,13 +5589,13 @@
                 <a:spcPts val="0"/>
               </a:spcAft>
               <a:buClr>
-                <a:schemeClr val="dk2"/>
+                <a:schemeClr val="lt2"/>
               </a:buClr>
               <a:buSzPts val="1800"/>
               <a:buChar char="●"/>
               <a:defRPr sz="1800">
                 <a:solidFill>
-                  <a:schemeClr val="dk2"/>
+                  <a:schemeClr val="lt2"/>
                 </a:solidFill>
               </a:defRPr>
             </a:lvl1pPr>
@@ -4647,13 +5610,13 @@
                 <a:spcPts val="0"/>
               </a:spcAft>
               <a:buClr>
-                <a:schemeClr val="dk2"/>
+                <a:schemeClr val="lt2"/>
               </a:buClr>
               <a:buSzPts val="1400"/>
               <a:buChar char="○"/>
               <a:defRPr>
                 <a:solidFill>
-                  <a:schemeClr val="dk2"/>
+                  <a:schemeClr val="lt2"/>
                 </a:solidFill>
               </a:defRPr>
             </a:lvl2pPr>
@@ -4668,13 +5631,13 @@
                 <a:spcPts val="0"/>
               </a:spcAft>
               <a:buClr>
-                <a:schemeClr val="dk2"/>
+                <a:schemeClr val="lt2"/>
               </a:buClr>
               <a:buSzPts val="1400"/>
               <a:buChar char="■"/>
               <a:defRPr>
                 <a:solidFill>
-                  <a:schemeClr val="dk2"/>
+                  <a:schemeClr val="lt2"/>
                 </a:solidFill>
               </a:defRPr>
             </a:lvl3pPr>
@@ -4689,13 +5652,13 @@
                 <a:spcPts val="0"/>
               </a:spcAft>
               <a:buClr>
-                <a:schemeClr val="dk2"/>
+                <a:schemeClr val="lt2"/>
               </a:buClr>
               <a:buSzPts val="1400"/>
               <a:buChar char="●"/>
               <a:defRPr>
                 <a:solidFill>
-                  <a:schemeClr val="dk2"/>
+                  <a:schemeClr val="lt2"/>
                 </a:solidFill>
               </a:defRPr>
             </a:lvl4pPr>
@@ -4710,13 +5673,13 @@
                 <a:spcPts val="0"/>
               </a:spcAft>
               <a:buClr>
-                <a:schemeClr val="dk2"/>
+                <a:schemeClr val="lt2"/>
               </a:buClr>
               <a:buSzPts val="1400"/>
               <a:buChar char="○"/>
               <a:defRPr>
                 <a:solidFill>
-                  <a:schemeClr val="dk2"/>
+                  <a:schemeClr val="lt2"/>
                 </a:solidFill>
               </a:defRPr>
             </a:lvl5pPr>
@@ -4731,13 +5694,13 @@
                 <a:spcPts val="0"/>
               </a:spcAft>
               <a:buClr>
-                <a:schemeClr val="dk2"/>
+                <a:schemeClr val="lt2"/>
               </a:buClr>
               <a:buSzPts val="1400"/>
               <a:buChar char="■"/>
               <a:defRPr>
                 <a:solidFill>
-                  <a:schemeClr val="dk2"/>
+                  <a:schemeClr val="lt2"/>
                 </a:solidFill>
               </a:defRPr>
             </a:lvl6pPr>
@@ -4752,13 +5715,13 @@
                 <a:spcPts val="0"/>
               </a:spcAft>
               <a:buClr>
-                <a:schemeClr val="dk2"/>
+                <a:schemeClr val="lt2"/>
               </a:buClr>
               <a:buSzPts val="1400"/>
               <a:buChar char="●"/>
               <a:defRPr>
                 <a:solidFill>
-                  <a:schemeClr val="dk2"/>
+                  <a:schemeClr val="lt2"/>
                 </a:solidFill>
               </a:defRPr>
             </a:lvl7pPr>
@@ -4773,13 +5736,13 @@
                 <a:spcPts val="0"/>
               </a:spcAft>
               <a:buClr>
-                <a:schemeClr val="dk2"/>
+                <a:schemeClr val="lt2"/>
               </a:buClr>
               <a:buSzPts val="1400"/>
               <a:buChar char="○"/>
               <a:defRPr>
                 <a:solidFill>
-                  <a:schemeClr val="dk2"/>
+                  <a:schemeClr val="lt2"/>
                 </a:solidFill>
               </a:defRPr>
             </a:lvl8pPr>
@@ -4794,13 +5757,13 @@
                 <a:spcPts val="1600"/>
               </a:spcAft>
               <a:buClr>
-                <a:schemeClr val="dk2"/>
+                <a:schemeClr val="lt2"/>
               </a:buClr>
               <a:buSzPts val="1400"/>
               <a:buChar char="■"/>
               <a:defRPr>
                 <a:solidFill>
-                  <a:schemeClr val="dk2"/>
+                  <a:schemeClr val="lt2"/>
                 </a:solidFill>
               </a:defRPr>
             </a:lvl9pPr>
@@ -4838,7 +5801,7 @@
               <a:buNone/>
               <a:defRPr sz="1000">
                 <a:solidFill>
-                  <a:schemeClr val="dk2"/>
+                  <a:schemeClr val="lt2"/>
                 </a:solidFill>
               </a:defRPr>
             </a:lvl1pPr>
@@ -4846,7 +5809,7 @@
               <a:buNone/>
               <a:defRPr sz="1000">
                 <a:solidFill>
-                  <a:schemeClr val="dk2"/>
+                  <a:schemeClr val="lt2"/>
                 </a:solidFill>
               </a:defRPr>
             </a:lvl2pPr>
@@ -4854,7 +5817,7 @@
               <a:buNone/>
               <a:defRPr sz="1000">
                 <a:solidFill>
-                  <a:schemeClr val="dk2"/>
+                  <a:schemeClr val="lt2"/>
                 </a:solidFill>
               </a:defRPr>
             </a:lvl3pPr>
@@ -4862,7 +5825,7 @@
               <a:buNone/>
               <a:defRPr sz="1000">
                 <a:solidFill>
-                  <a:schemeClr val="dk2"/>
+                  <a:schemeClr val="lt2"/>
                 </a:solidFill>
               </a:defRPr>
             </a:lvl4pPr>
@@ -4870,7 +5833,7 @@
               <a:buNone/>
               <a:defRPr sz="1000">
                 <a:solidFill>
-                  <a:schemeClr val="dk2"/>
+                  <a:schemeClr val="lt2"/>
                 </a:solidFill>
               </a:defRPr>
             </a:lvl5pPr>
@@ -4878,7 +5841,7 @@
               <a:buNone/>
               <a:defRPr sz="1000">
                 <a:solidFill>
-                  <a:schemeClr val="dk2"/>
+                  <a:schemeClr val="lt2"/>
                 </a:solidFill>
               </a:defRPr>
             </a:lvl6pPr>
@@ -4886,7 +5849,7 @@
               <a:buNone/>
               <a:defRPr sz="1000">
                 <a:solidFill>
-                  <a:schemeClr val="dk2"/>
+                  <a:schemeClr val="lt2"/>
                 </a:solidFill>
               </a:defRPr>
             </a:lvl7pPr>
@@ -4894,7 +5857,7 @@
               <a:buNone/>
               <a:defRPr sz="1000">
                 <a:solidFill>
-                  <a:schemeClr val="dk2"/>
+                  <a:schemeClr val="lt2"/>
                 </a:solidFill>
               </a:defRPr>
             </a:lvl8pPr>
@@ -4902,7 +5865,7 @@
               <a:buNone/>
               <a:defRPr sz="1000">
                 <a:solidFill>
-                  <a:schemeClr val="dk2"/>
+                  <a:schemeClr val="lt2"/>
                 </a:solidFill>
               </a:defRPr>
             </a:lvl9pPr>
@@ -5656,52 +6619,13 @@
           <p:cNvPr id="54" name="Google Shape;54;p13"/>
           <p:cNvSpPr txBox="1"/>
           <p:nvPr>
-            <p:ph type="ctrTitle"/>
+            <p:ph type="title"/>
           </p:nvPr>
         </p:nvSpPr>
         <p:spPr>
           <a:xfrm>
-            <a:off x="311708" y="744575"/>
-            <a:ext cx="8520600" cy="2052600"/>
-          </a:xfrm>
-          <a:prstGeom prst="rect">
-            <a:avLst/>
-          </a:prstGeom>
-        </p:spPr>
-        <p:txBody>
-          <a:bodyPr anchorCtr="0" anchor="b" bIns="91425" lIns="91425" spcFirstLastPara="1" rIns="91425" wrap="square" tIns="91425">
-            <a:noAutofit/>
-          </a:bodyPr>
-          <a:lstStyle/>
-          <a:p>
-            <a:pPr indent="0" lvl="0" marL="0" rtl="0" algn="ctr">
-              <a:spcBef>
-                <a:spcPts val="0"/>
-              </a:spcBef>
-              <a:spcAft>
-                <a:spcPts val="0"/>
-              </a:spcAft>
-              <a:buNone/>
-            </a:pPr>
-            <a:r>
-              <a:t/>
-            </a:r>
-            <a:endParaRPr/>
-          </a:p>
-        </p:txBody>
-      </p:sp>
-      <p:sp>
-        <p:nvSpPr>
-          <p:cNvPr id="55" name="Google Shape;55;p13"/>
-          <p:cNvSpPr txBox="1"/>
-          <p:nvPr>
-            <p:ph idx="1" type="subTitle"/>
-          </p:nvPr>
-        </p:nvSpPr>
-        <p:spPr>
-          <a:xfrm>
-            <a:off x="311700" y="2834125"/>
-            <a:ext cx="8520600" cy="792600"/>
+            <a:off x="311700" y="359850"/>
+            <a:ext cx="8520600" cy="644100"/>
           </a:xfrm>
           <a:prstGeom prst="rect">
             <a:avLst/>
@@ -5713,7 +6637,7 @@
           </a:bodyPr>
           <a:lstStyle/>
           <a:p>
-            <a:pPr indent="0" lvl="0" marL="0" rtl="0" algn="ctr">
+            <a:pPr indent="0" lvl="0" marL="0" rtl="0" algn="l">
               <a:spcBef>
                 <a:spcPts val="0"/>
               </a:spcBef>
@@ -5723,9 +6647,489 @@
               <a:buNone/>
             </a:pPr>
             <a:r>
-              <a:t/>
+              <a:rPr lang="en" sz="3300"/>
+              <a:t>Project Overview</a:t>
+            </a:r>
+            <a:endParaRPr sz="3700"/>
+          </a:p>
+        </p:txBody>
+      </p:sp>
+      <p:sp>
+        <p:nvSpPr>
+          <p:cNvPr id="55" name="Google Shape;55;p13"/>
+          <p:cNvSpPr txBox="1"/>
+          <p:nvPr>
+            <p:ph idx="1" type="body"/>
+          </p:nvPr>
+        </p:nvSpPr>
+        <p:spPr>
+          <a:xfrm>
+            <a:off x="311700" y="1003950"/>
+            <a:ext cx="8520600" cy="3859200"/>
+          </a:xfrm>
+          <a:prstGeom prst="rect">
+            <a:avLst/>
+          </a:prstGeom>
+        </p:spPr>
+        <p:txBody>
+          <a:bodyPr anchorCtr="0" anchor="t" bIns="91425" lIns="91425" spcFirstLastPara="1" rIns="91425" wrap="square" tIns="91425">
+            <a:noAutofit/>
+          </a:bodyPr>
+          <a:lstStyle/>
+          <a:p>
+            <a:pPr indent="0" lvl="0" marL="0" rtl="0" algn="l">
+              <a:spcBef>
+                <a:spcPts val="0"/>
+              </a:spcBef>
+              <a:spcAft>
+                <a:spcPts val="0"/>
+              </a:spcAft>
+              <a:buNone/>
+            </a:pPr>
+            <a:r>
+              <a:rPr lang="en" sz="2700">
+                <a:solidFill>
+                  <a:srgbClr val="FFFFFF"/>
+                </a:solidFill>
+              </a:rPr>
+              <a:t>Blackwell Electronics - Customer Buying Patterns</a:t>
+            </a:r>
+            <a:endParaRPr sz="2700">
+              <a:solidFill>
+                <a:srgbClr val="FFFFFF"/>
+              </a:solidFill>
+            </a:endParaRPr>
+          </a:p>
+          <a:p>
+            <a:pPr indent="0" lvl="0" marL="0" rtl="0" algn="l">
+              <a:spcBef>
+                <a:spcPts val="1600"/>
+              </a:spcBef>
+              <a:spcAft>
+                <a:spcPts val="0"/>
+              </a:spcAft>
+              <a:buNone/>
+            </a:pPr>
+            <a:r>
+              <a:rPr lang="en" sz="2700">
+                <a:solidFill>
+                  <a:srgbClr val="FFFFFF"/>
+                </a:solidFill>
+              </a:rPr>
+              <a:t>Find out the following:</a:t>
+            </a:r>
+            <a:endParaRPr sz="2700">
+              <a:solidFill>
+                <a:srgbClr val="FFFFFF"/>
+              </a:solidFill>
+            </a:endParaRPr>
+          </a:p>
+          <a:p>
+            <a:pPr indent="-374650" lvl="0" marL="457200" rtl="0" algn="l">
+              <a:spcBef>
+                <a:spcPts val="1600"/>
+              </a:spcBef>
+              <a:spcAft>
+                <a:spcPts val="0"/>
+              </a:spcAft>
+              <a:buClr>
+                <a:srgbClr val="FFFFFF"/>
+              </a:buClr>
+              <a:buSzPts val="2300"/>
+              <a:buAutoNum type="alphaUcPeriod"/>
+            </a:pPr>
+            <a:r>
+              <a:rPr lang="en" sz="2300">
+                <a:solidFill>
+                  <a:srgbClr val="FFFFFF"/>
+                </a:solidFill>
+              </a:rPr>
+              <a:t>Do customers in different regions spend more per transaction?</a:t>
+            </a:r>
+            <a:endParaRPr sz="2300">
+              <a:solidFill>
+                <a:srgbClr val="FFFFFF"/>
+              </a:solidFill>
+            </a:endParaRPr>
+          </a:p>
+          <a:p>
+            <a:pPr indent="-374650" lvl="0" marL="457200" rtl="0" algn="l">
+              <a:spcBef>
+                <a:spcPts val="0"/>
+              </a:spcBef>
+              <a:spcAft>
+                <a:spcPts val="0"/>
+              </a:spcAft>
+              <a:buClr>
+                <a:srgbClr val="FFFFFF"/>
+              </a:buClr>
+              <a:buSzPts val="2300"/>
+              <a:buAutoNum type="alphaUcPeriod"/>
+            </a:pPr>
+            <a:r>
+              <a:rPr lang="en" sz="2300">
+                <a:solidFill>
+                  <a:srgbClr val="FFFFFF"/>
+                </a:solidFill>
+              </a:rPr>
+              <a:t>Which regions spend the most/least?</a:t>
+            </a:r>
+            <a:endParaRPr sz="2300">
+              <a:solidFill>
+                <a:srgbClr val="FFFFFF"/>
+              </a:solidFill>
+            </a:endParaRPr>
+          </a:p>
+          <a:p>
+            <a:pPr indent="-374650" lvl="0" marL="457200" rtl="0" algn="l">
+              <a:spcBef>
+                <a:spcPts val="0"/>
+              </a:spcBef>
+              <a:spcAft>
+                <a:spcPts val="0"/>
+              </a:spcAft>
+              <a:buClr>
+                <a:srgbClr val="FFFFFF"/>
+              </a:buClr>
+              <a:buSzPts val="2300"/>
+              <a:buAutoNum type="alphaUcPeriod"/>
+            </a:pPr>
+            <a:r>
+              <a:rPr lang="en" sz="2300">
+                <a:solidFill>
+                  <a:srgbClr val="FFFFFF"/>
+                </a:solidFill>
+              </a:rPr>
+              <a:t>Is there a relationship between number of items purchased and amount spent?</a:t>
+            </a:r>
+            <a:endParaRPr sz="2300">
+              <a:solidFill>
+                <a:srgbClr val="FFFFFF"/>
+              </a:solidFill>
+            </a:endParaRPr>
+          </a:p>
+        </p:txBody>
+      </p:sp>
+    </p:spTree>
+  </p:cSld>
+  <p:clrMapOvr>
+    <a:masterClrMapping/>
+  </p:clrMapOvr>
+</p:sld>
+</file>
+
+<file path=ppt/slides/slide10.xml><?xml version="1.0" encoding="utf-8"?>
+<p:sld xmlns:a="http://schemas.openxmlformats.org/drawingml/2006/main" xmlns:r="http://schemas.openxmlformats.org/officeDocument/2006/relationships" xmlns:mc="http://schemas.openxmlformats.org/markup-compatibility/2006" xmlns:mv="urn:schemas-microsoft-com:mac:vml" xmlns:p="http://schemas.openxmlformats.org/presentationml/2006/main" xmlns:c="http://schemas.openxmlformats.org/drawingml/2006/chart" xmlns:dgm="http://schemas.openxmlformats.org/drawingml/2006/diagram" xmlns:o="urn:schemas-microsoft-com:office:office" xmlns:v="urn:schemas-microsoft-com:vml" xmlns:pvml="urn:schemas-microsoft-com:office:powerpoint" xmlns:com="http://schemas.openxmlformats.org/drawingml/2006/compatibility" xmlns:p14="http://schemas.microsoft.com/office/powerpoint/2010/main" xmlns:p15="http://schemas.microsoft.com/office/powerpoint/2012/main" xmlns:ahyp="http://schemas.microsoft.com/office/drawing/2018/hyperlinkcolor">
+  <p:cSld>
+    <p:spTree>
+      <p:nvGrpSpPr>
+        <p:cNvPr id="108" name="Shape 108"/>
+        <p:cNvGrpSpPr/>
+        <p:nvPr/>
+      </p:nvGrpSpPr>
+      <p:grpSpPr>
+        <a:xfrm>
+          <a:off x="0" y="0"/>
+          <a:ext cx="0" cy="0"/>
+          <a:chOff x="0" y="0"/>
+          <a:chExt cx="0" cy="0"/>
+        </a:xfrm>
+      </p:grpSpPr>
+      <p:sp>
+        <p:nvSpPr>
+          <p:cNvPr id="109" name="Google Shape;109;p22"/>
+          <p:cNvSpPr txBox="1"/>
+          <p:nvPr>
+            <p:ph type="title"/>
+          </p:nvPr>
+        </p:nvSpPr>
+        <p:spPr>
+          <a:xfrm>
+            <a:off x="418275" y="253225"/>
+            <a:ext cx="8520600" cy="572700"/>
+          </a:xfrm>
+          <a:prstGeom prst="rect">
+            <a:avLst/>
+          </a:prstGeom>
+        </p:spPr>
+        <p:txBody>
+          <a:bodyPr anchorCtr="0" anchor="t" bIns="91425" lIns="91425" spcFirstLastPara="1" rIns="91425" wrap="square" tIns="91425">
+            <a:noAutofit/>
+          </a:bodyPr>
+          <a:lstStyle/>
+          <a:p>
+            <a:pPr indent="0" lvl="0" marL="0" rtl="0" algn="l">
+              <a:spcBef>
+                <a:spcPts val="0"/>
+              </a:spcBef>
+              <a:spcAft>
+                <a:spcPts val="0"/>
+              </a:spcAft>
+              <a:buNone/>
+            </a:pPr>
+            <a:r>
+              <a:rPr lang="en" sz="2600"/>
+              <a:t>Bar Graph</a:t>
+            </a:r>
+            <a:r>
+              <a:rPr lang="en" sz="2600"/>
+              <a:t>: Average Amount for Transaction w/ X Items</a:t>
+            </a:r>
+            <a:endParaRPr sz="2600"/>
+          </a:p>
+        </p:txBody>
+      </p:sp>
+      <p:pic>
+        <p:nvPicPr>
+          <p:cNvPr id="110" name="Google Shape;110;p22"/>
+          <p:cNvPicPr preferRelativeResize="0"/>
+          <p:nvPr/>
+        </p:nvPicPr>
+        <p:blipFill>
+          <a:blip r:embed="rId3">
+            <a:alphaModFix/>
+          </a:blip>
+          <a:stretch>
+            <a:fillRect/>
+          </a:stretch>
+        </p:blipFill>
+        <p:spPr>
+          <a:xfrm>
+            <a:off x="1939625" y="1042250"/>
+            <a:ext cx="5477899" cy="3852925"/>
+          </a:xfrm>
+          <a:prstGeom prst="rect">
+            <a:avLst/>
+          </a:prstGeom>
+          <a:noFill/>
+          <a:ln>
+            <a:noFill/>
+          </a:ln>
+        </p:spPr>
+      </p:pic>
+    </p:spTree>
+  </p:cSld>
+  <p:clrMapOvr>
+    <a:masterClrMapping/>
+  </p:clrMapOvr>
+</p:sld>
+</file>
+
+<file path=ppt/slides/slide11.xml><?xml version="1.0" encoding="utf-8"?>
+<p:sld xmlns:a="http://schemas.openxmlformats.org/drawingml/2006/main" xmlns:r="http://schemas.openxmlformats.org/officeDocument/2006/relationships" xmlns:mc="http://schemas.openxmlformats.org/markup-compatibility/2006" xmlns:mv="urn:schemas-microsoft-com:mac:vml" xmlns:p="http://schemas.openxmlformats.org/presentationml/2006/main" xmlns:c="http://schemas.openxmlformats.org/drawingml/2006/chart" xmlns:dgm="http://schemas.openxmlformats.org/drawingml/2006/diagram" xmlns:o="urn:schemas-microsoft-com:office:office" xmlns:v="urn:schemas-microsoft-com:vml" xmlns:pvml="urn:schemas-microsoft-com:office:powerpoint" xmlns:com="http://schemas.openxmlformats.org/drawingml/2006/compatibility" xmlns:p14="http://schemas.microsoft.com/office/powerpoint/2010/main" xmlns:p15="http://schemas.microsoft.com/office/powerpoint/2012/main" xmlns:ahyp="http://schemas.microsoft.com/office/drawing/2018/hyperlinkcolor">
+  <p:cSld>
+    <p:spTree>
+      <p:nvGrpSpPr>
+        <p:cNvPr id="114" name="Shape 114"/>
+        <p:cNvGrpSpPr/>
+        <p:nvPr/>
+      </p:nvGrpSpPr>
+      <p:grpSpPr>
+        <a:xfrm>
+          <a:off x="0" y="0"/>
+          <a:ext cx="0" cy="0"/>
+          <a:chOff x="0" y="0"/>
+          <a:chExt cx="0" cy="0"/>
+        </a:xfrm>
+      </p:grpSpPr>
+      <p:sp>
+        <p:nvSpPr>
+          <p:cNvPr id="115" name="Google Shape;115;p23"/>
+          <p:cNvSpPr txBox="1"/>
+          <p:nvPr>
+            <p:ph type="title"/>
+          </p:nvPr>
+        </p:nvSpPr>
+        <p:spPr>
+          <a:xfrm>
+            <a:off x="418275" y="231900"/>
+            <a:ext cx="8520600" cy="572700"/>
+          </a:xfrm>
+          <a:prstGeom prst="rect">
+            <a:avLst/>
+          </a:prstGeom>
+        </p:spPr>
+        <p:txBody>
+          <a:bodyPr anchorCtr="0" anchor="t" bIns="91425" lIns="91425" spcFirstLastPara="1" rIns="91425" wrap="square" tIns="91425">
+            <a:noAutofit/>
+          </a:bodyPr>
+          <a:lstStyle/>
+          <a:p>
+            <a:pPr indent="0" lvl="0" marL="0" rtl="0" algn="l">
+              <a:spcBef>
+                <a:spcPts val="0"/>
+              </a:spcBef>
+              <a:spcAft>
+                <a:spcPts val="0"/>
+              </a:spcAft>
+              <a:buNone/>
+            </a:pPr>
+            <a:r>
+              <a:rPr lang="en"/>
+              <a:t>Box</a:t>
+            </a:r>
+            <a:r>
+              <a:rPr lang="en"/>
+              <a:t> Plots: Amounts for Transactions w/ X Items</a:t>
             </a:r>
             <a:endParaRPr/>
+          </a:p>
+        </p:txBody>
+      </p:sp>
+      <p:pic>
+        <p:nvPicPr>
+          <p:cNvPr id="116" name="Google Shape;116;p23"/>
+          <p:cNvPicPr preferRelativeResize="0"/>
+          <p:nvPr/>
+        </p:nvPicPr>
+        <p:blipFill>
+          <a:blip r:embed="rId3">
+            <a:alphaModFix/>
+          </a:blip>
+          <a:stretch>
+            <a:fillRect/>
+          </a:stretch>
+        </p:blipFill>
+        <p:spPr>
+          <a:xfrm>
+            <a:off x="1972263" y="1063575"/>
+            <a:ext cx="5199483" cy="3852925"/>
+          </a:xfrm>
+          <a:prstGeom prst="rect">
+            <a:avLst/>
+          </a:prstGeom>
+          <a:noFill/>
+          <a:ln>
+            <a:noFill/>
+          </a:ln>
+        </p:spPr>
+      </p:pic>
+    </p:spTree>
+  </p:cSld>
+  <p:clrMapOvr>
+    <a:masterClrMapping/>
+  </p:clrMapOvr>
+</p:sld>
+</file>
+
+<file path=ppt/slides/slide12.xml><?xml version="1.0" encoding="utf-8"?>
+<p:sld xmlns:a="http://schemas.openxmlformats.org/drawingml/2006/main" xmlns:r="http://schemas.openxmlformats.org/officeDocument/2006/relationships" xmlns:mc="http://schemas.openxmlformats.org/markup-compatibility/2006" xmlns:mv="urn:schemas-microsoft-com:mac:vml" xmlns:p="http://schemas.openxmlformats.org/presentationml/2006/main" xmlns:c="http://schemas.openxmlformats.org/drawingml/2006/chart" xmlns:dgm="http://schemas.openxmlformats.org/drawingml/2006/diagram" xmlns:o="urn:schemas-microsoft-com:office:office" xmlns:v="urn:schemas-microsoft-com:vml" xmlns:pvml="urn:schemas-microsoft-com:office:powerpoint" xmlns:com="http://schemas.openxmlformats.org/drawingml/2006/compatibility" xmlns:p14="http://schemas.microsoft.com/office/powerpoint/2010/main" xmlns:p15="http://schemas.microsoft.com/office/powerpoint/2012/main" xmlns:ahyp="http://schemas.microsoft.com/office/drawing/2018/hyperlinkcolor">
+  <p:cSld>
+    <p:spTree>
+      <p:nvGrpSpPr>
+        <p:cNvPr id="120" name="Shape 120"/>
+        <p:cNvGrpSpPr/>
+        <p:nvPr/>
+      </p:nvGrpSpPr>
+      <p:grpSpPr>
+        <a:xfrm>
+          <a:off x="0" y="0"/>
+          <a:ext cx="0" cy="0"/>
+          <a:chOff x="0" y="0"/>
+          <a:chExt cx="0" cy="0"/>
+        </a:xfrm>
+      </p:grpSpPr>
+      <p:sp>
+        <p:nvSpPr>
+          <p:cNvPr id="121" name="Google Shape;121;p24"/>
+          <p:cNvSpPr txBox="1"/>
+          <p:nvPr>
+            <p:ph type="title"/>
+          </p:nvPr>
+        </p:nvSpPr>
+        <p:spPr>
+          <a:xfrm>
+            <a:off x="311700" y="445025"/>
+            <a:ext cx="8520600" cy="572700"/>
+          </a:xfrm>
+          <a:prstGeom prst="rect">
+            <a:avLst/>
+          </a:prstGeom>
+        </p:spPr>
+        <p:txBody>
+          <a:bodyPr anchorCtr="0" anchor="t" bIns="91425" lIns="91425" spcFirstLastPara="1" rIns="91425" wrap="square" tIns="91425">
+            <a:noAutofit/>
+          </a:bodyPr>
+          <a:lstStyle/>
+          <a:p>
+            <a:pPr indent="0" lvl="0" marL="0" rtl="0" algn="l">
+              <a:spcBef>
+                <a:spcPts val="0"/>
+              </a:spcBef>
+              <a:spcAft>
+                <a:spcPts val="0"/>
+              </a:spcAft>
+              <a:buNone/>
+            </a:pPr>
+            <a:r>
+              <a:rPr lang="en"/>
+              <a:t>Implications</a:t>
+            </a:r>
+            <a:endParaRPr/>
+          </a:p>
+        </p:txBody>
+      </p:sp>
+      <p:sp>
+        <p:nvSpPr>
+          <p:cNvPr id="122" name="Google Shape;122;p24"/>
+          <p:cNvSpPr txBox="1"/>
+          <p:nvPr>
+            <p:ph idx="1" type="body"/>
+          </p:nvPr>
+        </p:nvSpPr>
+        <p:spPr>
+          <a:xfrm>
+            <a:off x="311700" y="1152475"/>
+            <a:ext cx="8520600" cy="3416400"/>
+          </a:xfrm>
+          <a:prstGeom prst="rect">
+            <a:avLst/>
+          </a:prstGeom>
+        </p:spPr>
+        <p:txBody>
+          <a:bodyPr anchorCtr="0" anchor="t" bIns="91425" lIns="91425" spcFirstLastPara="1" rIns="91425" wrap="square" tIns="91425">
+            <a:noAutofit/>
+          </a:bodyPr>
+          <a:lstStyle/>
+          <a:p>
+            <a:pPr indent="0" lvl="0" marL="0" rtl="0" algn="l">
+              <a:spcBef>
+                <a:spcPts val="0"/>
+              </a:spcBef>
+              <a:spcAft>
+                <a:spcPts val="1600"/>
+              </a:spcAft>
+              <a:buNone/>
+            </a:pPr>
+            <a:r>
+              <a:rPr lang="en">
+                <a:solidFill>
+                  <a:srgbClr val="FFFFFF"/>
+                </a:solidFill>
+              </a:rPr>
+              <a:t>Items seems to have no </a:t>
+            </a:r>
+            <a:r>
+              <a:rPr lang="en">
+                <a:solidFill>
+                  <a:srgbClr val="FFFFFF"/>
+                </a:solidFill>
+              </a:rPr>
+              <a:t>correlation</a:t>
+            </a:r>
+            <a:r>
+              <a:rPr lang="en">
+                <a:solidFill>
+                  <a:srgbClr val="FFFFFF"/>
+                </a:solidFill>
+              </a:rPr>
+              <a:t> to amount spent on a transactions</a:t>
+            </a:r>
+            <a:endParaRPr>
+              <a:solidFill>
+                <a:srgbClr val="FFFFFF"/>
+              </a:solidFill>
+            </a:endParaRPr>
           </a:p>
         </p:txBody>
       </p:sp>
@@ -5765,7 +7169,7 @@
         <p:spPr>
           <a:xfrm>
             <a:off x="311700" y="445025"/>
-            <a:ext cx="8520600" cy="1038600"/>
+            <a:ext cx="8520600" cy="606900"/>
           </a:xfrm>
           <a:prstGeom prst="rect">
             <a:avLst/>
@@ -5788,28 +7192,58 @@
             </a:pPr>
             <a:r>
               <a:rPr lang="en"/>
-              <a:t>Do customers in different regions spend more per transaction? Which regions spend the most/least?</a:t>
+              <a:t>Data Overview</a:t>
             </a:r>
             <a:endParaRPr/>
           </a:p>
         </p:txBody>
       </p:sp>
-      <p:sp>
-        <p:nvSpPr>
+      <p:pic>
+        <p:nvPicPr>
           <p:cNvPr id="61" name="Google Shape;61;p14"/>
-          <p:cNvSpPr txBox="1"/>
-          <p:nvPr>
-            <p:ph idx="1" type="body"/>
-          </p:nvPr>
-        </p:nvSpPr>
+          <p:cNvPicPr preferRelativeResize="0"/>
+          <p:nvPr/>
+        </p:nvPicPr>
+        <p:blipFill>
+          <a:blip r:embed="rId3">
+            <a:alphaModFix/>
+          </a:blip>
+          <a:stretch>
+            <a:fillRect/>
+          </a:stretch>
+        </p:blipFill>
         <p:spPr>
           <a:xfrm>
-            <a:off x="311700" y="1571625"/>
-            <a:ext cx="8520600" cy="2997000"/>
+            <a:off x="311700" y="1051925"/>
+            <a:ext cx="3920609" cy="3267174"/>
           </a:xfrm>
           <a:prstGeom prst="rect">
             <a:avLst/>
           </a:prstGeom>
+          <a:noFill/>
+          <a:ln>
+            <a:noFill/>
+          </a:ln>
+        </p:spPr>
+      </p:pic>
+      <p:sp>
+        <p:nvSpPr>
+          <p:cNvPr id="62" name="Google Shape;62;p14"/>
+          <p:cNvSpPr txBox="1"/>
+          <p:nvPr/>
+        </p:nvSpPr>
+        <p:spPr>
+          <a:xfrm>
+            <a:off x="4549100" y="1084525"/>
+            <a:ext cx="4187700" cy="3267300"/>
+          </a:xfrm>
+          <a:prstGeom prst="rect">
+            <a:avLst/>
+          </a:prstGeom>
+          <a:noFill/>
+          <a:ln>
+            <a:noFill/>
+          </a:ln>
         </p:spPr>
         <p:txBody>
           <a:bodyPr anchorCtr="0" anchor="t" bIns="91425" lIns="91425" spcFirstLastPara="1" rIns="91425" wrap="square" tIns="91425">
@@ -5817,19 +7251,404 @@
           </a:bodyPr>
           <a:lstStyle/>
           <a:p>
-            <a:pPr indent="0" lvl="0" marL="0" rtl="0" algn="l">
-              <a:spcBef>
-                <a:spcPts val="0"/>
-              </a:spcBef>
-              <a:spcAft>
-                <a:spcPts val="1600"/>
-              </a:spcAft>
-              <a:buNone/>
+            <a:pPr indent="-311150" lvl="0" marL="457200" rtl="0" algn="l">
+              <a:spcBef>
+                <a:spcPts val="0"/>
+              </a:spcBef>
+              <a:spcAft>
+                <a:spcPts val="0"/>
+              </a:spcAft>
+              <a:buClr>
+                <a:srgbClr val="FFFFFF"/>
+              </a:buClr>
+              <a:buSzPts val="1300"/>
+              <a:buChar char="-"/>
             </a:pPr>
             <a:r>
-              <a:t/>
+              <a:rPr lang="en" sz="1300">
+                <a:solidFill>
+                  <a:srgbClr val="FFFFFF"/>
+                </a:solidFill>
+              </a:rPr>
+              <a:t>in-store</a:t>
             </a:r>
-            <a:endParaRPr/>
+            <a:endParaRPr sz="1300">
+              <a:solidFill>
+                <a:srgbClr val="FFFFFF"/>
+              </a:solidFill>
+            </a:endParaRPr>
+          </a:p>
+          <a:p>
+            <a:pPr indent="-311150" lvl="1" marL="914400" rtl="0" algn="l">
+              <a:spcBef>
+                <a:spcPts val="0"/>
+              </a:spcBef>
+              <a:spcAft>
+                <a:spcPts val="0"/>
+              </a:spcAft>
+              <a:buClr>
+                <a:srgbClr val="FFFFFF"/>
+              </a:buClr>
+              <a:buSzPts val="1300"/>
+              <a:buChar char="-"/>
+            </a:pPr>
+            <a:r>
+              <a:rPr lang="en" sz="1300">
+                <a:solidFill>
+                  <a:srgbClr val="FFFFFF"/>
+                </a:solidFill>
+              </a:rPr>
+              <a:t>Where the transaction took place</a:t>
+            </a:r>
+            <a:endParaRPr sz="1300">
+              <a:solidFill>
+                <a:srgbClr val="FFFFFF"/>
+              </a:solidFill>
+            </a:endParaRPr>
+          </a:p>
+          <a:p>
+            <a:pPr indent="-311150" lvl="2" marL="1371600" rtl="0" algn="l">
+              <a:spcBef>
+                <a:spcPts val="0"/>
+              </a:spcBef>
+              <a:spcAft>
+                <a:spcPts val="0"/>
+              </a:spcAft>
+              <a:buClr>
+                <a:srgbClr val="FFFFFF"/>
+              </a:buClr>
+              <a:buSzPts val="1300"/>
+              <a:buChar char="-"/>
+            </a:pPr>
+            <a:r>
+              <a:rPr lang="en" sz="1300">
+                <a:solidFill>
+                  <a:srgbClr val="FFFFFF"/>
+                </a:solidFill>
+              </a:rPr>
+              <a:t>0: Online Transaction</a:t>
+            </a:r>
+            <a:endParaRPr sz="1300">
+              <a:solidFill>
+                <a:srgbClr val="FFFFFF"/>
+              </a:solidFill>
+            </a:endParaRPr>
+          </a:p>
+          <a:p>
+            <a:pPr indent="-311150" lvl="2" marL="1371600" rtl="0" algn="l">
+              <a:spcBef>
+                <a:spcPts val="0"/>
+              </a:spcBef>
+              <a:spcAft>
+                <a:spcPts val="0"/>
+              </a:spcAft>
+              <a:buClr>
+                <a:srgbClr val="FFFFFF"/>
+              </a:buClr>
+              <a:buSzPts val="1300"/>
+              <a:buChar char="-"/>
+            </a:pPr>
+            <a:r>
+              <a:rPr lang="en" sz="1300">
+                <a:solidFill>
+                  <a:srgbClr val="FFFFFF"/>
+                </a:solidFill>
+              </a:rPr>
+              <a:t>1: In-Store Transa</a:t>
+            </a:r>
+            <a:r>
+              <a:rPr lang="en" sz="1300">
+                <a:solidFill>
+                  <a:srgbClr val="FFFFFF"/>
+                </a:solidFill>
+              </a:rPr>
+              <a:t>ction	</a:t>
+            </a:r>
+            <a:endParaRPr sz="1300">
+              <a:solidFill>
+                <a:srgbClr val="FFFFFF"/>
+              </a:solidFill>
+            </a:endParaRPr>
+          </a:p>
+          <a:p>
+            <a:pPr indent="-311150" lvl="0" marL="457200" rtl="0" algn="l">
+              <a:spcBef>
+                <a:spcPts val="0"/>
+              </a:spcBef>
+              <a:spcAft>
+                <a:spcPts val="0"/>
+              </a:spcAft>
+              <a:buClr>
+                <a:srgbClr val="FFFFFF"/>
+              </a:buClr>
+              <a:buSzPts val="1300"/>
+              <a:buChar char="-"/>
+            </a:pPr>
+            <a:r>
+              <a:rPr lang="en" sz="1300">
+                <a:solidFill>
+                  <a:srgbClr val="FFFFFF"/>
+                </a:solidFill>
+              </a:rPr>
+              <a:t>age</a:t>
+            </a:r>
+            <a:endParaRPr sz="1300">
+              <a:solidFill>
+                <a:srgbClr val="FFFFFF"/>
+              </a:solidFill>
+            </a:endParaRPr>
+          </a:p>
+          <a:p>
+            <a:pPr indent="-311150" lvl="1" marL="914400" rtl="0" algn="l">
+              <a:spcBef>
+                <a:spcPts val="0"/>
+              </a:spcBef>
+              <a:spcAft>
+                <a:spcPts val="0"/>
+              </a:spcAft>
+              <a:buClr>
+                <a:srgbClr val="FFFFFF"/>
+              </a:buClr>
+              <a:buSzPts val="1300"/>
+              <a:buChar char="-"/>
+            </a:pPr>
+            <a:r>
+              <a:rPr lang="en" sz="1300">
+                <a:solidFill>
+                  <a:srgbClr val="FFFFFF"/>
+                </a:solidFill>
+              </a:rPr>
+              <a:t>Age of person making the transaction</a:t>
+            </a:r>
+            <a:endParaRPr sz="1300">
+              <a:solidFill>
+                <a:srgbClr val="FFFFFF"/>
+              </a:solidFill>
+            </a:endParaRPr>
+          </a:p>
+          <a:p>
+            <a:pPr indent="-311150" lvl="0" marL="457200" rtl="0" algn="l">
+              <a:spcBef>
+                <a:spcPts val="0"/>
+              </a:spcBef>
+              <a:spcAft>
+                <a:spcPts val="0"/>
+              </a:spcAft>
+              <a:buClr>
+                <a:srgbClr val="FFFFFF"/>
+              </a:buClr>
+              <a:buSzPts val="1300"/>
+              <a:buChar char="-"/>
+            </a:pPr>
+            <a:r>
+              <a:rPr lang="en" sz="1300">
+                <a:solidFill>
+                  <a:srgbClr val="FFFFFF"/>
+                </a:solidFill>
+              </a:rPr>
+              <a:t>items</a:t>
+            </a:r>
+            <a:endParaRPr sz="1300">
+              <a:solidFill>
+                <a:srgbClr val="FFFFFF"/>
+              </a:solidFill>
+            </a:endParaRPr>
+          </a:p>
+          <a:p>
+            <a:pPr indent="-311150" lvl="1" marL="914400" rtl="0" algn="l">
+              <a:spcBef>
+                <a:spcPts val="0"/>
+              </a:spcBef>
+              <a:spcAft>
+                <a:spcPts val="0"/>
+              </a:spcAft>
+              <a:buClr>
+                <a:srgbClr val="FFFFFF"/>
+              </a:buClr>
+              <a:buSzPts val="1300"/>
+              <a:buChar char="-"/>
+            </a:pPr>
+            <a:r>
+              <a:rPr lang="en" sz="1300">
+                <a:solidFill>
+                  <a:srgbClr val="FFFFFF"/>
+                </a:solidFill>
+              </a:rPr>
+              <a:t>Number of items purchased for transaction</a:t>
+            </a:r>
+            <a:endParaRPr sz="1300">
+              <a:solidFill>
+                <a:srgbClr val="FFFFFF"/>
+              </a:solidFill>
+            </a:endParaRPr>
+          </a:p>
+          <a:p>
+            <a:pPr indent="-311150" lvl="0" marL="457200" rtl="0" algn="l">
+              <a:spcBef>
+                <a:spcPts val="0"/>
+              </a:spcBef>
+              <a:spcAft>
+                <a:spcPts val="0"/>
+              </a:spcAft>
+              <a:buClr>
+                <a:srgbClr val="FFFFFF"/>
+              </a:buClr>
+              <a:buSzPts val="1300"/>
+              <a:buChar char="-"/>
+            </a:pPr>
+            <a:r>
+              <a:rPr lang="en" sz="1300">
+                <a:solidFill>
+                  <a:srgbClr val="FFFFFF"/>
+                </a:solidFill>
+              </a:rPr>
+              <a:t>amount</a:t>
+            </a:r>
+            <a:endParaRPr sz="1300">
+              <a:solidFill>
+                <a:srgbClr val="FFFFFF"/>
+              </a:solidFill>
+            </a:endParaRPr>
+          </a:p>
+          <a:p>
+            <a:pPr indent="-311150" lvl="1" marL="914400" rtl="0" algn="l">
+              <a:spcBef>
+                <a:spcPts val="0"/>
+              </a:spcBef>
+              <a:spcAft>
+                <a:spcPts val="0"/>
+              </a:spcAft>
+              <a:buClr>
+                <a:srgbClr val="FFFFFF"/>
+              </a:buClr>
+              <a:buSzPts val="1300"/>
+              <a:buChar char="-"/>
+            </a:pPr>
+            <a:r>
+              <a:rPr lang="en" sz="1300">
+                <a:solidFill>
+                  <a:srgbClr val="FFFFFF"/>
+                </a:solidFill>
+              </a:rPr>
+              <a:t>total amount paid for transaction</a:t>
+            </a:r>
+            <a:endParaRPr sz="1300">
+              <a:solidFill>
+                <a:srgbClr val="FFFFFF"/>
+              </a:solidFill>
+            </a:endParaRPr>
+          </a:p>
+          <a:p>
+            <a:pPr indent="-311150" lvl="0" marL="457200" rtl="0" algn="l">
+              <a:spcBef>
+                <a:spcPts val="0"/>
+              </a:spcBef>
+              <a:spcAft>
+                <a:spcPts val="0"/>
+              </a:spcAft>
+              <a:buClr>
+                <a:srgbClr val="FFFFFF"/>
+              </a:buClr>
+              <a:buSzPts val="1300"/>
+              <a:buChar char="-"/>
+            </a:pPr>
+            <a:r>
+              <a:rPr lang="en" sz="1300">
+                <a:solidFill>
+                  <a:srgbClr val="FFFFFF"/>
+                </a:solidFill>
+              </a:rPr>
+              <a:t>region</a:t>
+            </a:r>
+            <a:endParaRPr sz="1300">
+              <a:solidFill>
+                <a:srgbClr val="FFFFFF"/>
+              </a:solidFill>
+            </a:endParaRPr>
+          </a:p>
+          <a:p>
+            <a:pPr indent="-311150" lvl="1" marL="914400" rtl="0" algn="l">
+              <a:spcBef>
+                <a:spcPts val="0"/>
+              </a:spcBef>
+              <a:spcAft>
+                <a:spcPts val="0"/>
+              </a:spcAft>
+              <a:buClr>
+                <a:srgbClr val="FFFFFF"/>
+              </a:buClr>
+              <a:buSzPts val="1300"/>
+              <a:buChar char="-"/>
+            </a:pPr>
+            <a:r>
+              <a:rPr lang="en" sz="1300">
+                <a:solidFill>
+                  <a:srgbClr val="FFFFFF"/>
+                </a:solidFill>
+              </a:rPr>
+              <a:t>Which region the transaction took place</a:t>
+            </a:r>
+            <a:endParaRPr sz="1300">
+              <a:solidFill>
+                <a:srgbClr val="FFFFFF"/>
+              </a:solidFill>
+            </a:endParaRPr>
+          </a:p>
+          <a:p>
+            <a:pPr indent="-311150" lvl="2" marL="1371600" rtl="0" algn="l">
+              <a:spcBef>
+                <a:spcPts val="0"/>
+              </a:spcBef>
+              <a:spcAft>
+                <a:spcPts val="0"/>
+              </a:spcAft>
+              <a:buClr>
+                <a:srgbClr val="FFFFFF"/>
+              </a:buClr>
+              <a:buSzPts val="1300"/>
+              <a:buChar char="-"/>
+            </a:pPr>
+            <a:r>
+              <a:rPr lang="en" sz="1300">
+                <a:solidFill>
+                  <a:srgbClr val="FFFFFF"/>
+                </a:solidFill>
+              </a:rPr>
+              <a:t>1: North	-    2: South</a:t>
+            </a:r>
+            <a:endParaRPr sz="1300">
+              <a:solidFill>
+                <a:srgbClr val="FFFFFF"/>
+              </a:solidFill>
+            </a:endParaRPr>
+          </a:p>
+          <a:p>
+            <a:pPr indent="-311150" lvl="2" marL="1371600" rtl="0" algn="l">
+              <a:spcBef>
+                <a:spcPts val="0"/>
+              </a:spcBef>
+              <a:spcAft>
+                <a:spcPts val="0"/>
+              </a:spcAft>
+              <a:buClr>
+                <a:srgbClr val="FFFFFF"/>
+              </a:buClr>
+              <a:buSzPts val="1300"/>
+              <a:buChar char="-"/>
+            </a:pPr>
+            <a:r>
+              <a:rPr lang="en" sz="1300">
+                <a:solidFill>
+                  <a:srgbClr val="FFFFFF"/>
+                </a:solidFill>
+              </a:rPr>
+              <a:t>3: East	-    4: West</a:t>
+            </a:r>
+            <a:endParaRPr sz="1300">
+              <a:solidFill>
+                <a:srgbClr val="FFFFFF"/>
+              </a:solidFill>
+            </a:endParaRPr>
           </a:p>
         </p:txBody>
       </p:sp>
@@ -5846,7 +7665,7 @@
   <p:cSld>
     <p:spTree>
       <p:nvGrpSpPr>
-        <p:cNvPr id="65" name="Shape 65"/>
+        <p:cNvPr id="66" name="Shape 66"/>
         <p:cNvGrpSpPr/>
         <p:nvPr/>
       </p:nvGrpSpPr>
@@ -5860,7 +7679,7 @@
       </p:grpSpPr>
       <p:sp>
         <p:nvSpPr>
-          <p:cNvPr id="66" name="Google Shape;66;p15"/>
+          <p:cNvPr id="67" name="Google Shape;67;p15"/>
           <p:cNvSpPr txBox="1"/>
           <p:nvPr>
             <p:ph type="title"/>
@@ -5868,8 +7687,8 @@
         </p:nvSpPr>
         <p:spPr>
           <a:xfrm>
-            <a:off x="311700" y="445025"/>
-            <a:ext cx="8520600" cy="1126500"/>
+            <a:off x="311700" y="232375"/>
+            <a:ext cx="8520600" cy="1015800"/>
           </a:xfrm>
           <a:prstGeom prst="rect">
             <a:avLst/>
@@ -5892,7 +7711,38 @@
             </a:pPr>
             <a:r>
               <a:rPr lang="en"/>
-              <a:t>Is there a relationship between the number of items purchased and amount spent?</a:t>
+              <a:t>Analysis:</a:t>
+            </a:r>
+            <a:endParaRPr/>
+          </a:p>
+          <a:p>
+            <a:pPr indent="0" lvl="0" marL="0" rtl="0" algn="l">
+              <a:spcBef>
+                <a:spcPts val="0"/>
+              </a:spcBef>
+              <a:spcAft>
+                <a:spcPts val="0"/>
+              </a:spcAft>
+              <a:buNone/>
+            </a:pPr>
+            <a:r>
+              <a:rPr lang="en" sz="2100"/>
+              <a:t>Consumers patterns in each region</a:t>
+            </a:r>
+            <a:endParaRPr sz="2100"/>
+          </a:p>
+          <a:p>
+            <a:pPr indent="0" lvl="0" marL="0" rtl="0" algn="l">
+              <a:spcBef>
+                <a:spcPts val="0"/>
+              </a:spcBef>
+              <a:spcAft>
+                <a:spcPts val="0"/>
+              </a:spcAft>
+              <a:buNone/>
+            </a:pPr>
+            <a:r>
+              <a:t/>
             </a:r>
             <a:endParaRPr/>
           </a:p>
@@ -5900,7 +7750,7 @@
       </p:sp>
       <p:sp>
         <p:nvSpPr>
-          <p:cNvPr id="67" name="Google Shape;67;p15"/>
+          <p:cNvPr id="68" name="Google Shape;68;p15"/>
           <p:cNvSpPr txBox="1"/>
           <p:nvPr>
             <p:ph idx="1" type="body"/>
@@ -5908,8 +7758,169 @@
         </p:nvSpPr>
         <p:spPr>
           <a:xfrm>
-            <a:off x="311700" y="1688850"/>
-            <a:ext cx="8520600" cy="2880000"/>
+            <a:off x="311700" y="1346250"/>
+            <a:ext cx="8520600" cy="3222600"/>
+          </a:xfrm>
+          <a:prstGeom prst="rect">
+            <a:avLst/>
+          </a:prstGeom>
+        </p:spPr>
+        <p:txBody>
+          <a:bodyPr anchorCtr="0" anchor="t" bIns="91425" lIns="91425" spcFirstLastPara="1" rIns="91425" wrap="square" tIns="91425">
+            <a:noAutofit/>
+          </a:bodyPr>
+          <a:lstStyle/>
+          <a:p>
+            <a:pPr indent="-368300" lvl="0" marL="457200" rtl="0" algn="l">
+              <a:spcBef>
+                <a:spcPts val="0"/>
+              </a:spcBef>
+              <a:spcAft>
+                <a:spcPts val="0"/>
+              </a:spcAft>
+              <a:buClr>
+                <a:srgbClr val="FFFFFF"/>
+              </a:buClr>
+              <a:buSzPts val="2200"/>
+              <a:buChar char="-"/>
+            </a:pPr>
+            <a:r>
+              <a:rPr lang="en" sz="2200">
+                <a:solidFill>
+                  <a:srgbClr val="FFFFFF"/>
+                </a:solidFill>
+              </a:rPr>
+              <a:t>Histograms: Amount in transaction for each region</a:t>
+            </a:r>
+            <a:endParaRPr sz="2200">
+              <a:solidFill>
+                <a:srgbClr val="FFFFFF"/>
+              </a:solidFill>
+            </a:endParaRPr>
+          </a:p>
+          <a:p>
+            <a:pPr indent="-368300" lvl="0" marL="457200" rtl="0" algn="l">
+              <a:spcBef>
+                <a:spcPts val="0"/>
+              </a:spcBef>
+              <a:spcAft>
+                <a:spcPts val="0"/>
+              </a:spcAft>
+              <a:buClr>
+                <a:srgbClr val="FFFFFF"/>
+              </a:buClr>
+              <a:buSzPts val="2200"/>
+              <a:buChar char="-"/>
+            </a:pPr>
+            <a:r>
+              <a:rPr lang="en" sz="2200">
+                <a:solidFill>
+                  <a:srgbClr val="FFFFFF"/>
+                </a:solidFill>
+              </a:rPr>
+              <a:t>Box Plots: Amounts of transactions for each region</a:t>
+            </a:r>
+            <a:endParaRPr sz="2200">
+              <a:solidFill>
+                <a:schemeClr val="dk1"/>
+              </a:solidFill>
+            </a:endParaRPr>
+          </a:p>
+          <a:p>
+            <a:pPr indent="-368300" lvl="0" marL="457200" rtl="0" algn="l">
+              <a:spcBef>
+                <a:spcPts val="0"/>
+              </a:spcBef>
+              <a:spcAft>
+                <a:spcPts val="0"/>
+              </a:spcAft>
+              <a:buClr>
+                <a:schemeClr val="dk1"/>
+              </a:buClr>
+              <a:buSzPts val="2200"/>
+              <a:buChar char="-"/>
+            </a:pPr>
+            <a:r>
+              <a:rPr lang="en" sz="2200">
+                <a:solidFill>
+                  <a:schemeClr val="dk1"/>
+                </a:solidFill>
+              </a:rPr>
+              <a:t>Line Plots: Avg Amount spent for each Age for each region</a:t>
+            </a:r>
+            <a:endParaRPr sz="2200">
+              <a:solidFill>
+                <a:srgbClr val="FFFFFF"/>
+              </a:solidFill>
+            </a:endParaRPr>
+          </a:p>
+          <a:p>
+            <a:pPr indent="-368300" lvl="0" marL="457200" rtl="0" algn="l">
+              <a:spcBef>
+                <a:spcPts val="0"/>
+              </a:spcBef>
+              <a:spcAft>
+                <a:spcPts val="0"/>
+              </a:spcAft>
+              <a:buClr>
+                <a:schemeClr val="dk1"/>
+              </a:buClr>
+              <a:buSzPts val="2200"/>
+              <a:buChar char="-"/>
+            </a:pPr>
+            <a:r>
+              <a:rPr lang="en" sz="2200">
+                <a:solidFill>
+                  <a:schemeClr val="dk1"/>
+                </a:solidFill>
+              </a:rPr>
+              <a:t>Scatter Plots: Amount vs Age for each region</a:t>
+            </a:r>
+            <a:endParaRPr sz="2200">
+              <a:solidFill>
+                <a:schemeClr val="dk1"/>
+              </a:solidFill>
+            </a:endParaRPr>
+          </a:p>
+        </p:txBody>
+      </p:sp>
+    </p:spTree>
+  </p:cSld>
+  <p:clrMapOvr>
+    <a:masterClrMapping/>
+  </p:clrMapOvr>
+</p:sld>
+</file>
+
+<file path=ppt/slides/slide4.xml><?xml version="1.0" encoding="utf-8"?>
+<p:sld xmlns:a="http://schemas.openxmlformats.org/drawingml/2006/main" xmlns:r="http://schemas.openxmlformats.org/officeDocument/2006/relationships" xmlns:mc="http://schemas.openxmlformats.org/markup-compatibility/2006" xmlns:mv="urn:schemas-microsoft-com:mac:vml" xmlns:p="http://schemas.openxmlformats.org/presentationml/2006/main" xmlns:c="http://schemas.openxmlformats.org/drawingml/2006/chart" xmlns:dgm="http://schemas.openxmlformats.org/drawingml/2006/diagram" xmlns:o="urn:schemas-microsoft-com:office:office" xmlns:v="urn:schemas-microsoft-com:vml" xmlns:pvml="urn:schemas-microsoft-com:office:powerpoint" xmlns:com="http://schemas.openxmlformats.org/drawingml/2006/compatibility" xmlns:p14="http://schemas.microsoft.com/office/powerpoint/2010/main" xmlns:p15="http://schemas.microsoft.com/office/powerpoint/2012/main" xmlns:ahyp="http://schemas.microsoft.com/office/drawing/2018/hyperlinkcolor">
+  <p:cSld>
+    <p:spTree>
+      <p:nvGrpSpPr>
+        <p:cNvPr id="72" name="Shape 72"/>
+        <p:cNvGrpSpPr/>
+        <p:nvPr/>
+      </p:nvGrpSpPr>
+      <p:grpSpPr>
+        <a:xfrm>
+          <a:off x="0" y="0"/>
+          <a:ext cx="0" cy="0"/>
+          <a:chOff x="0" y="0"/>
+          <a:chExt cx="0" cy="0"/>
+        </a:xfrm>
+      </p:grpSpPr>
+      <p:sp>
+        <p:nvSpPr>
+          <p:cNvPr id="73" name="Google Shape;73;p16"/>
+          <p:cNvSpPr txBox="1"/>
+          <p:nvPr>
+            <p:ph type="title"/>
+          </p:nvPr>
+        </p:nvSpPr>
+        <p:spPr>
+          <a:xfrm>
+            <a:off x="311713" y="232375"/>
+            <a:ext cx="8520600" cy="572700"/>
           </a:xfrm>
           <a:prstGeom prst="rect">
             <a:avLst/>
@@ -5926,7 +7937,724 @@
                 <a:spcPts val="0"/>
               </a:spcBef>
               <a:spcAft>
-                <a:spcPts val="1600"/>
+                <a:spcPts val="0"/>
+              </a:spcAft>
+              <a:buNone/>
+            </a:pPr>
+            <a:r>
+              <a:rPr lang="en"/>
+              <a:t>Histogram: Amounts for each region</a:t>
+            </a:r>
+            <a:endParaRPr/>
+          </a:p>
+        </p:txBody>
+      </p:sp>
+      <p:pic>
+        <p:nvPicPr>
+          <p:cNvPr id="74" name="Google Shape;74;p16"/>
+          <p:cNvPicPr preferRelativeResize="0"/>
+          <p:nvPr/>
+        </p:nvPicPr>
+        <p:blipFill>
+          <a:blip r:embed="rId3">
+            <a:alphaModFix/>
+          </a:blip>
+          <a:stretch>
+            <a:fillRect/>
+          </a:stretch>
+        </p:blipFill>
+        <p:spPr>
+          <a:xfrm>
+            <a:off x="1892663" y="968650"/>
+            <a:ext cx="5358684" cy="3820975"/>
+          </a:xfrm>
+          <a:prstGeom prst="rect">
+            <a:avLst/>
+          </a:prstGeom>
+          <a:noFill/>
+          <a:ln>
+            <a:noFill/>
+          </a:ln>
+        </p:spPr>
+      </p:pic>
+    </p:spTree>
+  </p:cSld>
+  <p:clrMapOvr>
+    <a:masterClrMapping/>
+  </p:clrMapOvr>
+</p:sld>
+</file>
+
+<file path=ppt/slides/slide5.xml><?xml version="1.0" encoding="utf-8"?>
+<p:sld xmlns:a="http://schemas.openxmlformats.org/drawingml/2006/main" xmlns:r="http://schemas.openxmlformats.org/officeDocument/2006/relationships" xmlns:mc="http://schemas.openxmlformats.org/markup-compatibility/2006" xmlns:mv="urn:schemas-microsoft-com:mac:vml" xmlns:p="http://schemas.openxmlformats.org/presentationml/2006/main" xmlns:c="http://schemas.openxmlformats.org/drawingml/2006/chart" xmlns:dgm="http://schemas.openxmlformats.org/drawingml/2006/diagram" xmlns:o="urn:schemas-microsoft-com:office:office" xmlns:v="urn:schemas-microsoft-com:vml" xmlns:pvml="urn:schemas-microsoft-com:office:powerpoint" xmlns:com="http://schemas.openxmlformats.org/drawingml/2006/compatibility" xmlns:p14="http://schemas.microsoft.com/office/powerpoint/2010/main" xmlns:p15="http://schemas.microsoft.com/office/powerpoint/2012/main" xmlns:ahyp="http://schemas.microsoft.com/office/drawing/2018/hyperlinkcolor">
+  <p:cSld>
+    <p:spTree>
+      <p:nvGrpSpPr>
+        <p:cNvPr id="78" name="Shape 78"/>
+        <p:cNvGrpSpPr/>
+        <p:nvPr/>
+      </p:nvGrpSpPr>
+      <p:grpSpPr>
+        <a:xfrm>
+          <a:off x="0" y="0"/>
+          <a:ext cx="0" cy="0"/>
+          <a:chOff x="0" y="0"/>
+          <a:chExt cx="0" cy="0"/>
+        </a:xfrm>
+      </p:grpSpPr>
+      <p:sp>
+        <p:nvSpPr>
+          <p:cNvPr id="79" name="Google Shape;79;p17"/>
+          <p:cNvSpPr txBox="1"/>
+          <p:nvPr>
+            <p:ph type="title"/>
+          </p:nvPr>
+        </p:nvSpPr>
+        <p:spPr>
+          <a:xfrm>
+            <a:off x="311713" y="232375"/>
+            <a:ext cx="8520600" cy="572700"/>
+          </a:xfrm>
+          <a:prstGeom prst="rect">
+            <a:avLst/>
+          </a:prstGeom>
+        </p:spPr>
+        <p:txBody>
+          <a:bodyPr anchorCtr="0" anchor="t" bIns="91425" lIns="91425" spcFirstLastPara="1" rIns="91425" wrap="square" tIns="91425">
+            <a:noAutofit/>
+          </a:bodyPr>
+          <a:lstStyle/>
+          <a:p>
+            <a:pPr indent="0" lvl="0" marL="0" rtl="0" algn="l">
+              <a:spcBef>
+                <a:spcPts val="0"/>
+              </a:spcBef>
+              <a:spcAft>
+                <a:spcPts val="0"/>
+              </a:spcAft>
+              <a:buNone/>
+            </a:pPr>
+            <a:r>
+              <a:rPr lang="en"/>
+              <a:t>Histogram: Amounts for each region</a:t>
+            </a:r>
+            <a:endParaRPr/>
+          </a:p>
+        </p:txBody>
+      </p:sp>
+      <p:pic>
+        <p:nvPicPr>
+          <p:cNvPr id="80" name="Google Shape;80;p17"/>
+          <p:cNvPicPr preferRelativeResize="0"/>
+          <p:nvPr/>
+        </p:nvPicPr>
+        <p:blipFill>
+          <a:blip r:embed="rId3">
+            <a:alphaModFix/>
+          </a:blip>
+          <a:stretch>
+            <a:fillRect/>
+          </a:stretch>
+        </p:blipFill>
+        <p:spPr>
+          <a:xfrm>
+            <a:off x="1836250" y="872225"/>
+            <a:ext cx="5734438" cy="4033624"/>
+          </a:xfrm>
+          <a:prstGeom prst="rect">
+            <a:avLst/>
+          </a:prstGeom>
+          <a:noFill/>
+          <a:ln>
+            <a:noFill/>
+          </a:ln>
+        </p:spPr>
+      </p:pic>
+    </p:spTree>
+  </p:cSld>
+  <p:clrMapOvr>
+    <a:masterClrMapping/>
+  </p:clrMapOvr>
+</p:sld>
+</file>
+
+<file path=ppt/slides/slide6.xml><?xml version="1.0" encoding="utf-8"?>
+<p:sld xmlns:a="http://schemas.openxmlformats.org/drawingml/2006/main" xmlns:r="http://schemas.openxmlformats.org/officeDocument/2006/relationships" xmlns:mc="http://schemas.openxmlformats.org/markup-compatibility/2006" xmlns:mv="urn:schemas-microsoft-com:mac:vml" xmlns:p="http://schemas.openxmlformats.org/presentationml/2006/main" xmlns:c="http://schemas.openxmlformats.org/drawingml/2006/chart" xmlns:dgm="http://schemas.openxmlformats.org/drawingml/2006/diagram" xmlns:o="urn:schemas-microsoft-com:office:office" xmlns:v="urn:schemas-microsoft-com:vml" xmlns:pvml="urn:schemas-microsoft-com:office:powerpoint" xmlns:com="http://schemas.openxmlformats.org/drawingml/2006/compatibility" xmlns:p14="http://schemas.microsoft.com/office/powerpoint/2010/main" xmlns:p15="http://schemas.microsoft.com/office/powerpoint/2012/main" xmlns:ahyp="http://schemas.microsoft.com/office/drawing/2018/hyperlinkcolor">
+  <p:cSld>
+    <p:spTree>
+      <p:nvGrpSpPr>
+        <p:cNvPr id="84" name="Shape 84"/>
+        <p:cNvGrpSpPr/>
+        <p:nvPr/>
+      </p:nvGrpSpPr>
+      <p:grpSpPr>
+        <a:xfrm>
+          <a:off x="0" y="0"/>
+          <a:ext cx="0" cy="0"/>
+          <a:chOff x="0" y="0"/>
+          <a:chExt cx="0" cy="0"/>
+        </a:xfrm>
+      </p:grpSpPr>
+      <p:sp>
+        <p:nvSpPr>
+          <p:cNvPr id="85" name="Google Shape;85;p18"/>
+          <p:cNvSpPr txBox="1"/>
+          <p:nvPr>
+            <p:ph type="title"/>
+          </p:nvPr>
+        </p:nvSpPr>
+        <p:spPr>
+          <a:xfrm>
+            <a:off x="418275" y="413075"/>
+            <a:ext cx="8520600" cy="572700"/>
+          </a:xfrm>
+          <a:prstGeom prst="rect">
+            <a:avLst/>
+          </a:prstGeom>
+        </p:spPr>
+        <p:txBody>
+          <a:bodyPr anchorCtr="0" anchor="t" bIns="91425" lIns="91425" spcFirstLastPara="1" rIns="91425" wrap="square" tIns="91425">
+            <a:noAutofit/>
+          </a:bodyPr>
+          <a:lstStyle/>
+          <a:p>
+            <a:pPr indent="0" lvl="0" marL="0" rtl="0" algn="l">
+              <a:spcBef>
+                <a:spcPts val="0"/>
+              </a:spcBef>
+              <a:spcAft>
+                <a:spcPts val="0"/>
+              </a:spcAft>
+              <a:buNone/>
+            </a:pPr>
+            <a:r>
+              <a:rPr lang="en"/>
+              <a:t>Line Plot: Average Amount Spent per Age</a:t>
+            </a:r>
+            <a:endParaRPr/>
+          </a:p>
+        </p:txBody>
+      </p:sp>
+      <p:pic>
+        <p:nvPicPr>
+          <p:cNvPr id="86" name="Google Shape;86;p18"/>
+          <p:cNvPicPr preferRelativeResize="0"/>
+          <p:nvPr/>
+        </p:nvPicPr>
+        <p:blipFill>
+          <a:blip r:embed="rId3">
+            <a:alphaModFix/>
+          </a:blip>
+          <a:stretch>
+            <a:fillRect/>
+          </a:stretch>
+        </p:blipFill>
+        <p:spPr>
+          <a:xfrm>
+            <a:off x="311700" y="1349660"/>
+            <a:ext cx="8520599" cy="2893440"/>
+          </a:xfrm>
+          <a:prstGeom prst="rect">
+            <a:avLst/>
+          </a:prstGeom>
+          <a:noFill/>
+          <a:ln>
+            <a:noFill/>
+          </a:ln>
+        </p:spPr>
+      </p:pic>
+    </p:spTree>
+  </p:cSld>
+  <p:clrMapOvr>
+    <a:masterClrMapping/>
+  </p:clrMapOvr>
+</p:sld>
+</file>
+
+<file path=ppt/slides/slide7.xml><?xml version="1.0" encoding="utf-8"?>
+<p:sld xmlns:a="http://schemas.openxmlformats.org/drawingml/2006/main" xmlns:r="http://schemas.openxmlformats.org/officeDocument/2006/relationships" xmlns:mc="http://schemas.openxmlformats.org/markup-compatibility/2006" xmlns:mv="urn:schemas-microsoft-com:mac:vml" xmlns:p="http://schemas.openxmlformats.org/presentationml/2006/main" xmlns:c="http://schemas.openxmlformats.org/drawingml/2006/chart" xmlns:dgm="http://schemas.openxmlformats.org/drawingml/2006/diagram" xmlns:o="urn:schemas-microsoft-com:office:office" xmlns:v="urn:schemas-microsoft-com:vml" xmlns:pvml="urn:schemas-microsoft-com:office:powerpoint" xmlns:com="http://schemas.openxmlformats.org/drawingml/2006/compatibility" xmlns:p14="http://schemas.microsoft.com/office/powerpoint/2010/main" xmlns:p15="http://schemas.microsoft.com/office/powerpoint/2012/main" xmlns:ahyp="http://schemas.microsoft.com/office/drawing/2018/hyperlinkcolor">
+  <p:cSld>
+    <p:spTree>
+      <p:nvGrpSpPr>
+        <p:cNvPr id="90" name="Shape 90"/>
+        <p:cNvGrpSpPr/>
+        <p:nvPr/>
+      </p:nvGrpSpPr>
+      <p:grpSpPr>
+        <a:xfrm>
+          <a:off x="0" y="0"/>
+          <a:ext cx="0" cy="0"/>
+          <a:chOff x="0" y="0"/>
+          <a:chExt cx="0" cy="0"/>
+        </a:xfrm>
+      </p:grpSpPr>
+      <p:sp>
+        <p:nvSpPr>
+          <p:cNvPr id="91" name="Google Shape;91;p19"/>
+          <p:cNvSpPr txBox="1"/>
+          <p:nvPr>
+            <p:ph type="title"/>
+          </p:nvPr>
+        </p:nvSpPr>
+        <p:spPr>
+          <a:xfrm>
+            <a:off x="311700" y="379600"/>
+            <a:ext cx="8520600" cy="572700"/>
+          </a:xfrm>
+          <a:prstGeom prst="rect">
+            <a:avLst/>
+          </a:prstGeom>
+        </p:spPr>
+        <p:txBody>
+          <a:bodyPr anchorCtr="0" anchor="t" bIns="91425" lIns="91425" spcFirstLastPara="1" rIns="91425" wrap="square" tIns="91425">
+            <a:noAutofit/>
+          </a:bodyPr>
+          <a:lstStyle/>
+          <a:p>
+            <a:pPr indent="0" lvl="0" marL="0" rtl="0" algn="l">
+              <a:spcBef>
+                <a:spcPts val="0"/>
+              </a:spcBef>
+              <a:spcAft>
+                <a:spcPts val="0"/>
+              </a:spcAft>
+              <a:buNone/>
+            </a:pPr>
+            <a:r>
+              <a:rPr lang="en"/>
+              <a:t>Scatter Plots: Amount vs. Age for each Region</a:t>
+            </a:r>
+            <a:endParaRPr/>
+          </a:p>
+        </p:txBody>
+      </p:sp>
+      <p:pic>
+        <p:nvPicPr>
+          <p:cNvPr id="92" name="Google Shape;92;p19"/>
+          <p:cNvPicPr preferRelativeResize="0"/>
+          <p:nvPr/>
+        </p:nvPicPr>
+        <p:blipFill>
+          <a:blip r:embed="rId3">
+            <a:alphaModFix/>
+          </a:blip>
+          <a:stretch>
+            <a:fillRect/>
+          </a:stretch>
+        </p:blipFill>
+        <p:spPr>
+          <a:xfrm>
+            <a:off x="561113" y="1376624"/>
+            <a:ext cx="8021773" cy="2390249"/>
+          </a:xfrm>
+          <a:prstGeom prst="rect">
+            <a:avLst/>
+          </a:prstGeom>
+          <a:noFill/>
+          <a:ln>
+            <a:noFill/>
+          </a:ln>
+        </p:spPr>
+      </p:pic>
+    </p:spTree>
+  </p:cSld>
+  <p:clrMapOvr>
+    <a:masterClrMapping/>
+  </p:clrMapOvr>
+</p:sld>
+</file>
+
+<file path=ppt/slides/slide8.xml><?xml version="1.0" encoding="utf-8"?>
+<p:sld xmlns:a="http://schemas.openxmlformats.org/drawingml/2006/main" xmlns:r="http://schemas.openxmlformats.org/officeDocument/2006/relationships" xmlns:mc="http://schemas.openxmlformats.org/markup-compatibility/2006" xmlns:mv="urn:schemas-microsoft-com:mac:vml" xmlns:p="http://schemas.openxmlformats.org/presentationml/2006/main" xmlns:c="http://schemas.openxmlformats.org/drawingml/2006/chart" xmlns:dgm="http://schemas.openxmlformats.org/drawingml/2006/diagram" xmlns:o="urn:schemas-microsoft-com:office:office" xmlns:v="urn:schemas-microsoft-com:vml" xmlns:pvml="urn:schemas-microsoft-com:office:powerpoint" xmlns:com="http://schemas.openxmlformats.org/drawingml/2006/compatibility" xmlns:p14="http://schemas.microsoft.com/office/powerpoint/2010/main" xmlns:p15="http://schemas.microsoft.com/office/powerpoint/2012/main" xmlns:ahyp="http://schemas.microsoft.com/office/drawing/2018/hyperlinkcolor">
+  <p:cSld>
+    <p:spTree>
+      <p:nvGrpSpPr>
+        <p:cNvPr id="96" name="Shape 96"/>
+        <p:cNvGrpSpPr/>
+        <p:nvPr/>
+      </p:nvGrpSpPr>
+      <p:grpSpPr>
+        <a:xfrm>
+          <a:off x="0" y="0"/>
+          <a:ext cx="0" cy="0"/>
+          <a:chOff x="0" y="0"/>
+          <a:chExt cx="0" cy="0"/>
+        </a:xfrm>
+      </p:grpSpPr>
+      <p:sp>
+        <p:nvSpPr>
+          <p:cNvPr id="97" name="Google Shape;97;p20"/>
+          <p:cNvSpPr txBox="1"/>
+          <p:nvPr>
+            <p:ph type="title"/>
+          </p:nvPr>
+        </p:nvSpPr>
+        <p:spPr>
+          <a:xfrm>
+            <a:off x="311700" y="445025"/>
+            <a:ext cx="8520600" cy="572700"/>
+          </a:xfrm>
+          <a:prstGeom prst="rect">
+            <a:avLst/>
+          </a:prstGeom>
+        </p:spPr>
+        <p:txBody>
+          <a:bodyPr anchorCtr="0" anchor="t" bIns="91425" lIns="91425" spcFirstLastPara="1" rIns="91425" wrap="square" tIns="91425">
+            <a:noAutofit/>
+          </a:bodyPr>
+          <a:lstStyle/>
+          <a:p>
+            <a:pPr indent="0" lvl="0" marL="0" rtl="0" algn="l">
+              <a:spcBef>
+                <a:spcPts val="0"/>
+              </a:spcBef>
+              <a:spcAft>
+                <a:spcPts val="0"/>
+              </a:spcAft>
+              <a:buNone/>
+            </a:pPr>
+            <a:r>
+              <a:rPr lang="en"/>
+              <a:t>Implications</a:t>
+            </a:r>
+            <a:endParaRPr/>
+          </a:p>
+        </p:txBody>
+      </p:sp>
+      <p:sp>
+        <p:nvSpPr>
+          <p:cNvPr id="98" name="Google Shape;98;p20"/>
+          <p:cNvSpPr txBox="1"/>
+          <p:nvPr>
+            <p:ph idx="1" type="body"/>
+          </p:nvPr>
+        </p:nvSpPr>
+        <p:spPr>
+          <a:xfrm>
+            <a:off x="311700" y="1152475"/>
+            <a:ext cx="8520600" cy="3416400"/>
+          </a:xfrm>
+          <a:prstGeom prst="rect">
+            <a:avLst/>
+          </a:prstGeom>
+        </p:spPr>
+        <p:txBody>
+          <a:bodyPr anchorCtr="0" anchor="t" bIns="91425" lIns="91425" spcFirstLastPara="1" rIns="91425" wrap="square" tIns="91425">
+            <a:noAutofit/>
+          </a:bodyPr>
+          <a:lstStyle/>
+          <a:p>
+            <a:pPr indent="-342900" lvl="0" marL="457200" rtl="0" algn="l">
+              <a:spcBef>
+                <a:spcPts val="0"/>
+              </a:spcBef>
+              <a:spcAft>
+                <a:spcPts val="0"/>
+              </a:spcAft>
+              <a:buClr>
+                <a:srgbClr val="FFFFFF"/>
+              </a:buClr>
+              <a:buSzPts val="1800"/>
+              <a:buChar char="-"/>
+            </a:pPr>
+            <a:r>
+              <a:rPr lang="en">
+                <a:solidFill>
+                  <a:srgbClr val="FFFFFF"/>
+                </a:solidFill>
+              </a:rPr>
+              <a:t>Regions show to have a pattern in how much they spend</a:t>
+            </a:r>
+            <a:endParaRPr>
+              <a:solidFill>
+                <a:srgbClr val="FFFFFF"/>
+              </a:solidFill>
+            </a:endParaRPr>
+          </a:p>
+          <a:p>
+            <a:pPr indent="-342900" lvl="0" marL="457200" rtl="0" algn="l">
+              <a:spcBef>
+                <a:spcPts val="0"/>
+              </a:spcBef>
+              <a:spcAft>
+                <a:spcPts val="0"/>
+              </a:spcAft>
+              <a:buClr>
+                <a:srgbClr val="FFFFFF"/>
+              </a:buClr>
+              <a:buSzPts val="1800"/>
+              <a:buChar char="-"/>
+            </a:pPr>
+            <a:r>
+              <a:rPr lang="en">
+                <a:solidFill>
+                  <a:srgbClr val="FFFFFF"/>
+                </a:solidFill>
+              </a:rPr>
+              <a:t>Ages in each regions seem to have a pattern on how they individually spend</a:t>
+            </a:r>
+            <a:endParaRPr>
+              <a:solidFill>
+                <a:srgbClr val="FFFFFF"/>
+              </a:solidFill>
+            </a:endParaRPr>
+          </a:p>
+          <a:p>
+            <a:pPr indent="-342900" lvl="0" marL="457200" rtl="0" algn="l">
+              <a:spcBef>
+                <a:spcPts val="0"/>
+              </a:spcBef>
+              <a:spcAft>
+                <a:spcPts val="0"/>
+              </a:spcAft>
+              <a:buClr>
+                <a:srgbClr val="FFFFFF"/>
+              </a:buClr>
+              <a:buSzPts val="1800"/>
+              <a:buChar char="-"/>
+            </a:pPr>
+            <a:r>
+              <a:rPr lang="en">
+                <a:solidFill>
+                  <a:srgbClr val="FFFFFF"/>
+                </a:solidFill>
+              </a:rPr>
+              <a:t>West spends the most overall on the average transaction</a:t>
+            </a:r>
+            <a:endParaRPr>
+              <a:solidFill>
+                <a:srgbClr val="FFFFFF"/>
+              </a:solidFill>
+            </a:endParaRPr>
+          </a:p>
+          <a:p>
+            <a:pPr indent="-342900" lvl="0" marL="457200" rtl="0" algn="l">
+              <a:spcBef>
+                <a:spcPts val="0"/>
+              </a:spcBef>
+              <a:spcAft>
+                <a:spcPts val="0"/>
+              </a:spcAft>
+              <a:buClr>
+                <a:srgbClr val="FFFFFF"/>
+              </a:buClr>
+              <a:buSzPts val="1800"/>
+              <a:buChar char="-"/>
+            </a:pPr>
+            <a:r>
+              <a:rPr lang="en">
+                <a:solidFill>
+                  <a:srgbClr val="FFFFFF"/>
+                </a:solidFill>
+              </a:rPr>
+              <a:t>South does seems to have very spread out transactions</a:t>
+            </a:r>
+            <a:endParaRPr>
+              <a:solidFill>
+                <a:srgbClr val="FFFFFF"/>
+              </a:solidFill>
+            </a:endParaRPr>
+          </a:p>
+          <a:p>
+            <a:pPr indent="-342900" lvl="0" marL="457200" rtl="0" algn="l">
+              <a:spcBef>
+                <a:spcPts val="0"/>
+              </a:spcBef>
+              <a:spcAft>
+                <a:spcPts val="0"/>
+              </a:spcAft>
+              <a:buClr>
+                <a:srgbClr val="FFFFFF"/>
+              </a:buClr>
+              <a:buSzPts val="1800"/>
+              <a:buChar char="-"/>
+            </a:pPr>
+            <a:r>
+              <a:rPr lang="en">
+                <a:solidFill>
+                  <a:srgbClr val="FFFFFF"/>
+                </a:solidFill>
+              </a:rPr>
+              <a:t>North and East have a sharp cliff of transactions after the amounts are greater than 1000</a:t>
+            </a:r>
+            <a:endParaRPr>
+              <a:solidFill>
+                <a:srgbClr val="FFFFFF"/>
+              </a:solidFill>
+            </a:endParaRPr>
+          </a:p>
+          <a:p>
+            <a:pPr indent="-317500" lvl="1" marL="914400" rtl="0" algn="l">
+              <a:spcBef>
+                <a:spcPts val="0"/>
+              </a:spcBef>
+              <a:spcAft>
+                <a:spcPts val="0"/>
+              </a:spcAft>
+              <a:buClr>
+                <a:srgbClr val="FFFFFF"/>
+              </a:buClr>
+              <a:buSzPts val="1400"/>
+              <a:buChar char="-"/>
+            </a:pPr>
+            <a:r>
+              <a:rPr lang="en">
+                <a:solidFill>
+                  <a:srgbClr val="FFFFFF"/>
+                </a:solidFill>
+              </a:rPr>
+              <a:t>Most likely due to the 60+ years old customers do not make transactions &gt; 1000 in these regions</a:t>
+            </a:r>
+            <a:endParaRPr>
+              <a:solidFill>
+                <a:srgbClr val="FFFFFF"/>
+              </a:solidFill>
+            </a:endParaRPr>
+          </a:p>
+          <a:p>
+            <a:pPr indent="-342900" lvl="0" marL="457200" rtl="0" algn="l">
+              <a:spcBef>
+                <a:spcPts val="0"/>
+              </a:spcBef>
+              <a:spcAft>
+                <a:spcPts val="0"/>
+              </a:spcAft>
+              <a:buClr>
+                <a:srgbClr val="FFFFFF"/>
+              </a:buClr>
+              <a:buSzPts val="1800"/>
+              <a:buChar char="-"/>
+            </a:pPr>
+            <a:r>
+              <a:rPr lang="en">
+                <a:solidFill>
+                  <a:srgbClr val="FFFFFF"/>
+                </a:solidFill>
+              </a:rPr>
+              <a:t>West has a similar cliff of transaction after the amounts are greater than 2000</a:t>
+            </a:r>
+            <a:endParaRPr>
+              <a:solidFill>
+                <a:srgbClr val="FFFFFF"/>
+              </a:solidFill>
+            </a:endParaRPr>
+          </a:p>
+          <a:p>
+            <a:pPr indent="-317500" lvl="1" marL="914400" rtl="0" algn="l">
+              <a:spcBef>
+                <a:spcPts val="0"/>
+              </a:spcBef>
+              <a:spcAft>
+                <a:spcPts val="0"/>
+              </a:spcAft>
+              <a:buClr>
+                <a:srgbClr val="FFFFFF"/>
+              </a:buClr>
+              <a:buSzPts val="1400"/>
+              <a:buChar char="-"/>
+            </a:pPr>
+            <a:r>
+              <a:rPr lang="en">
+                <a:solidFill>
+                  <a:srgbClr val="FFFFFF"/>
+                </a:solidFill>
+              </a:rPr>
+              <a:t>Does not have a spending pattern with age or amount</a:t>
+            </a:r>
+            <a:endParaRPr>
+              <a:solidFill>
+                <a:srgbClr val="FFFFFF"/>
+              </a:solidFill>
+            </a:endParaRPr>
+          </a:p>
+        </p:txBody>
+      </p:sp>
+    </p:spTree>
+  </p:cSld>
+  <p:clrMapOvr>
+    <a:masterClrMapping/>
+  </p:clrMapOvr>
+</p:sld>
+</file>
+
+<file path=ppt/slides/slide9.xml><?xml version="1.0" encoding="utf-8"?>
+<p:sld xmlns:a="http://schemas.openxmlformats.org/drawingml/2006/main" xmlns:r="http://schemas.openxmlformats.org/officeDocument/2006/relationships" xmlns:mc="http://schemas.openxmlformats.org/markup-compatibility/2006" xmlns:mv="urn:schemas-microsoft-com:mac:vml" xmlns:p="http://schemas.openxmlformats.org/presentationml/2006/main" xmlns:c="http://schemas.openxmlformats.org/drawingml/2006/chart" xmlns:dgm="http://schemas.openxmlformats.org/drawingml/2006/diagram" xmlns:o="urn:schemas-microsoft-com:office:office" xmlns:v="urn:schemas-microsoft-com:vml" xmlns:pvml="urn:schemas-microsoft-com:office:powerpoint" xmlns:com="http://schemas.openxmlformats.org/drawingml/2006/compatibility" xmlns:p14="http://schemas.microsoft.com/office/powerpoint/2010/main" xmlns:p15="http://schemas.microsoft.com/office/powerpoint/2012/main" xmlns:ahyp="http://schemas.microsoft.com/office/drawing/2018/hyperlinkcolor">
+  <p:cSld>
+    <p:spTree>
+      <p:nvGrpSpPr>
+        <p:cNvPr id="102" name="Shape 102"/>
+        <p:cNvGrpSpPr/>
+        <p:nvPr/>
+      </p:nvGrpSpPr>
+      <p:grpSpPr>
+        <a:xfrm>
+          <a:off x="0" y="0"/>
+          <a:ext cx="0" cy="0"/>
+          <a:chOff x="0" y="0"/>
+          <a:chExt cx="0" cy="0"/>
+        </a:xfrm>
+      </p:grpSpPr>
+      <p:sp>
+        <p:nvSpPr>
+          <p:cNvPr id="103" name="Google Shape;103;p21"/>
+          <p:cNvSpPr txBox="1"/>
+          <p:nvPr>
+            <p:ph type="title"/>
+          </p:nvPr>
+        </p:nvSpPr>
+        <p:spPr>
+          <a:xfrm>
+            <a:off x="311700" y="232375"/>
+            <a:ext cx="8520600" cy="1015800"/>
+          </a:xfrm>
+          <a:prstGeom prst="rect">
+            <a:avLst/>
+          </a:prstGeom>
+        </p:spPr>
+        <p:txBody>
+          <a:bodyPr anchorCtr="0" anchor="t" bIns="91425" lIns="91425" spcFirstLastPara="1" rIns="91425" wrap="square" tIns="91425">
+            <a:noAutofit/>
+          </a:bodyPr>
+          <a:lstStyle/>
+          <a:p>
+            <a:pPr indent="0" lvl="0" marL="0" rtl="0" algn="l">
+              <a:spcBef>
+                <a:spcPts val="0"/>
+              </a:spcBef>
+              <a:spcAft>
+                <a:spcPts val="0"/>
+              </a:spcAft>
+              <a:buNone/>
+            </a:pPr>
+            <a:r>
+              <a:rPr lang="en"/>
+              <a:t>Analysis:</a:t>
+            </a:r>
+            <a:endParaRPr/>
+          </a:p>
+          <a:p>
+            <a:pPr indent="0" lvl="0" marL="0" rtl="0" algn="l">
+              <a:spcBef>
+                <a:spcPts val="0"/>
+              </a:spcBef>
+              <a:spcAft>
+                <a:spcPts val="0"/>
+              </a:spcAft>
+              <a:buNone/>
+            </a:pPr>
+            <a:r>
+              <a:rPr lang="en" sz="2100"/>
+              <a:t>Relationship between # of items and amount</a:t>
+            </a:r>
+            <a:endParaRPr sz="2100"/>
+          </a:p>
+          <a:p>
+            <a:pPr indent="0" lvl="0" marL="0" rtl="0" algn="l">
+              <a:spcBef>
+                <a:spcPts val="0"/>
+              </a:spcBef>
+              <a:spcAft>
+                <a:spcPts val="0"/>
               </a:spcAft>
               <a:buNone/>
             </a:pPr>
@@ -5934,6 +8662,86 @@
               <a:t/>
             </a:r>
             <a:endParaRPr/>
+          </a:p>
+        </p:txBody>
+      </p:sp>
+      <p:sp>
+        <p:nvSpPr>
+          <p:cNvPr id="104" name="Google Shape;104;p21"/>
+          <p:cNvSpPr txBox="1"/>
+          <p:nvPr>
+            <p:ph idx="1" type="body"/>
+          </p:nvPr>
+        </p:nvSpPr>
+        <p:spPr>
+          <a:xfrm>
+            <a:off x="311700" y="1346250"/>
+            <a:ext cx="8520600" cy="3222600"/>
+          </a:xfrm>
+          <a:prstGeom prst="rect">
+            <a:avLst/>
+          </a:prstGeom>
+        </p:spPr>
+        <p:txBody>
+          <a:bodyPr anchorCtr="0" anchor="t" bIns="91425" lIns="91425" spcFirstLastPara="1" rIns="91425" wrap="square" tIns="91425">
+            <a:noAutofit/>
+          </a:bodyPr>
+          <a:lstStyle/>
+          <a:p>
+            <a:pPr indent="-368300" lvl="0" marL="457200" rtl="0" algn="l">
+              <a:spcBef>
+                <a:spcPts val="0"/>
+              </a:spcBef>
+              <a:spcAft>
+                <a:spcPts val="0"/>
+              </a:spcAft>
+              <a:buClr>
+                <a:srgbClr val="FFFFFF"/>
+              </a:buClr>
+              <a:buSzPts val="2200"/>
+              <a:buChar char="-"/>
+            </a:pPr>
+            <a:r>
+              <a:rPr lang="en" sz="2200">
+                <a:solidFill>
+                  <a:srgbClr val="FFFFFF"/>
+                </a:solidFill>
+              </a:rPr>
+              <a:t>Bar Graph: Average Amount Cost for Transaction with X items</a:t>
+            </a:r>
+            <a:endParaRPr sz="2200">
+              <a:solidFill>
+                <a:schemeClr val="dk1"/>
+              </a:solidFill>
+            </a:endParaRPr>
+          </a:p>
+          <a:p>
+            <a:pPr indent="-368300" lvl="0" marL="457200" rtl="0" algn="l">
+              <a:spcBef>
+                <a:spcPts val="0"/>
+              </a:spcBef>
+              <a:spcAft>
+                <a:spcPts val="0"/>
+              </a:spcAft>
+              <a:buClr>
+                <a:srgbClr val="FFFFFF"/>
+              </a:buClr>
+              <a:buSzPts val="2200"/>
+              <a:buChar char="-"/>
+            </a:pPr>
+            <a:r>
+              <a:rPr lang="en" sz="2200">
+                <a:solidFill>
+                  <a:schemeClr val="dk1"/>
+                </a:solidFill>
+              </a:rPr>
+              <a:t>Box Plot: Amount per Transaction with X Items</a:t>
+            </a:r>
+            <a:endParaRPr sz="2200">
+              <a:solidFill>
+                <a:srgbClr val="FFFFFF"/>
+              </a:solidFill>
+            </a:endParaRPr>
           </a:p>
         </p:txBody>
       </p:sp>
@@ -5946,26 +8754,26 @@
 </file>
 
 <file path=ppt/theme/theme1.xml><?xml version="1.0" encoding="utf-8"?>
-<a:theme xmlns:a="http://schemas.openxmlformats.org/drawingml/2006/main" xmlns:r="http://schemas.openxmlformats.org/officeDocument/2006/relationships" name="Simple Light">
+<a:theme xmlns:a="http://schemas.openxmlformats.org/drawingml/2006/main" xmlns:r="http://schemas.openxmlformats.org/officeDocument/2006/relationships" name="Simple Dark">
   <a:themeElements>
-    <a:clrScheme name="Simple Light">
+    <a:clrScheme name="Simple Dark">
       <a:dk1>
-        <a:srgbClr val="000000"/>
+        <a:srgbClr val="FFFFFF"/>
       </a:dk1>
       <a:lt1>
-        <a:srgbClr val="FFFFFF"/>
+        <a:srgbClr val="212121"/>
       </a:lt1>
       <a:dk2>
-        <a:srgbClr val="595959"/>
+        <a:srgbClr val="303030"/>
       </a:dk2>
       <a:lt2>
-        <a:srgbClr val="EEEEEE"/>
+        <a:srgbClr val="ADADAD"/>
       </a:lt2>
       <a:accent1>
-        <a:srgbClr val="FFAB40"/>
+        <a:srgbClr val="009688"/>
       </a:accent1>
       <a:accent2>
-        <a:srgbClr val="212121"/>
+        <a:srgbClr val="EEEEEE"/>
       </a:accent2>
       <a:accent3>
         <a:srgbClr val="78909C"/>
@@ -5974,16 +8782,16 @@
         <a:srgbClr val="FFAB40"/>
       </a:accent4>
       <a:accent5>
-        <a:srgbClr val="0097A7"/>
+        <a:srgbClr val="4DD0E1"/>
       </a:accent5>
       <a:accent6>
         <a:srgbClr val="EEFF41"/>
       </a:accent6>
       <a:hlink>
-        <a:srgbClr val="0097A7"/>
+        <a:srgbClr val="4DD0E1"/>
       </a:hlink>
       <a:folHlink>
-        <a:srgbClr val="0097A7"/>
+        <a:srgbClr val="4DD0E1"/>
       </a:folHlink>
     </a:clrScheme>
     <a:fontScheme name="Office">

</xml_diff>

<commit_message>
Updating powerpoint and playing around with the bin parameters
</commit_message>
<xml_diff>
--- a/Task1.pptx
+++ b/Task1.pptx
@@ -16,10 +16,6 @@
     <p:sldId id="261" r:id="rId11"/>
     <p:sldId id="262" r:id="rId12"/>
     <p:sldId id="263" r:id="rId13"/>
-    <p:sldId id="264" r:id="rId14"/>
-    <p:sldId id="265" r:id="rId15"/>
-    <p:sldId id="266" r:id="rId16"/>
-    <p:sldId id="267" r:id="rId17"/>
   </p:sldIdLst>
   <p:sldSz cy="5143500" cx="9144000"/>
   <p:notesSz cx="6858000" cy="9144000"/>
@@ -796,303 +792,6 @@
 </p:notes>
 </file>
 
-<file path=ppt/notesSlides/notesSlide10.xml><?xml version="1.0" encoding="utf-8"?>
-<p:notes xmlns:a="http://schemas.openxmlformats.org/drawingml/2006/main" xmlns:r="http://schemas.openxmlformats.org/officeDocument/2006/relationships" xmlns:mc="http://schemas.openxmlformats.org/markup-compatibility/2006" xmlns:mv="urn:schemas-microsoft-com:mac:vml" xmlns:p="http://schemas.openxmlformats.org/presentationml/2006/main" xmlns:c="http://schemas.openxmlformats.org/drawingml/2006/chart" xmlns:dgm="http://schemas.openxmlformats.org/drawingml/2006/diagram" xmlns:o="urn:schemas-microsoft-com:office:office" xmlns:v="urn:schemas-microsoft-com:vml" xmlns:pvml="urn:schemas-microsoft-com:office:powerpoint" xmlns:com="http://schemas.openxmlformats.org/drawingml/2006/compatibility" xmlns:p14="http://schemas.microsoft.com/office/powerpoint/2010/main" xmlns:p15="http://schemas.microsoft.com/office/powerpoint/2012/main" xmlns:ahyp="http://schemas.microsoft.com/office/drawing/2018/hyperlinkcolor" showMasterPhAnim="0" showMasterSp="0">
-  <p:cSld>
-    <p:spTree>
-      <p:nvGrpSpPr>
-        <p:cNvPr id="105" name="Shape 105"/>
-        <p:cNvGrpSpPr/>
-        <p:nvPr/>
-      </p:nvGrpSpPr>
-      <p:grpSpPr>
-        <a:xfrm>
-          <a:off x="0" y="0"/>
-          <a:ext cx="0" cy="0"/>
-          <a:chOff x="0" y="0"/>
-          <a:chExt cx="0" cy="0"/>
-        </a:xfrm>
-      </p:grpSpPr>
-      <p:sp>
-        <p:nvSpPr>
-          <p:cNvPr id="106" name="Google Shape;106;g9faee993de_0_22:notes"/>
-          <p:cNvSpPr/>
-          <p:nvPr>
-            <p:ph idx="2" type="sldImg"/>
-          </p:nvPr>
-        </p:nvSpPr>
-        <p:spPr>
-          <a:xfrm>
-            <a:off x="381300" y="685800"/>
-            <a:ext cx="6096000" cy="3429000"/>
-          </a:xfrm>
-          <a:custGeom>
-            <a:rect b="b" l="l" r="r" t="t"/>
-            <a:pathLst>
-              <a:path extrusionOk="0" h="120000" w="120000">
-                <a:moveTo>
-                  <a:pt x="0" y="0"/>
-                </a:moveTo>
-                <a:lnTo>
-                  <a:pt x="120000" y="0"/>
-                </a:lnTo>
-                <a:lnTo>
-                  <a:pt x="120000" y="120000"/>
-                </a:lnTo>
-                <a:lnTo>
-                  <a:pt x="0" y="120000"/>
-                </a:lnTo>
-                <a:close/>
-              </a:path>
-            </a:pathLst>
-          </a:custGeom>
-        </p:spPr>
-      </p:sp>
-      <p:sp>
-        <p:nvSpPr>
-          <p:cNvPr id="107" name="Google Shape;107;g9faee993de_0_22:notes"/>
-          <p:cNvSpPr txBox="1"/>
-          <p:nvPr>
-            <p:ph idx="1" type="body"/>
-          </p:nvPr>
-        </p:nvSpPr>
-        <p:spPr>
-          <a:xfrm>
-            <a:off x="685800" y="4343400"/>
-            <a:ext cx="5486400" cy="4114800"/>
-          </a:xfrm>
-          <a:prstGeom prst="rect">
-            <a:avLst/>
-          </a:prstGeom>
-        </p:spPr>
-        <p:txBody>
-          <a:bodyPr anchorCtr="0" anchor="t" bIns="91425" lIns="91425" spcFirstLastPara="1" rIns="91425" wrap="square" tIns="91425">
-            <a:noAutofit/>
-          </a:bodyPr>
-          <a:lstStyle/>
-          <a:p>
-            <a:pPr indent="0" lvl="0" marL="0" rtl="0" algn="l">
-              <a:spcBef>
-                <a:spcPts val="0"/>
-              </a:spcBef>
-              <a:spcAft>
-                <a:spcPts val="0"/>
-              </a:spcAft>
-              <a:buNone/>
-            </a:pPr>
-            <a:r>
-              <a:t/>
-            </a:r>
-            <a:endParaRPr/>
-          </a:p>
-        </p:txBody>
-      </p:sp>
-    </p:spTree>
-  </p:cSld>
-  <p:clrMapOvr>
-    <a:masterClrMapping/>
-  </p:clrMapOvr>
-</p:notes>
-</file>
-
-<file path=ppt/notesSlides/notesSlide11.xml><?xml version="1.0" encoding="utf-8"?>
-<p:notes xmlns:a="http://schemas.openxmlformats.org/drawingml/2006/main" xmlns:r="http://schemas.openxmlformats.org/officeDocument/2006/relationships" xmlns:mc="http://schemas.openxmlformats.org/markup-compatibility/2006" xmlns:mv="urn:schemas-microsoft-com:mac:vml" xmlns:p="http://schemas.openxmlformats.org/presentationml/2006/main" xmlns:c="http://schemas.openxmlformats.org/drawingml/2006/chart" xmlns:dgm="http://schemas.openxmlformats.org/drawingml/2006/diagram" xmlns:o="urn:schemas-microsoft-com:office:office" xmlns:v="urn:schemas-microsoft-com:vml" xmlns:pvml="urn:schemas-microsoft-com:office:powerpoint" xmlns:com="http://schemas.openxmlformats.org/drawingml/2006/compatibility" xmlns:p14="http://schemas.microsoft.com/office/powerpoint/2010/main" xmlns:p15="http://schemas.microsoft.com/office/powerpoint/2012/main" xmlns:ahyp="http://schemas.microsoft.com/office/drawing/2018/hyperlinkcolor" showMasterPhAnim="0" showMasterSp="0">
-  <p:cSld>
-    <p:spTree>
-      <p:nvGrpSpPr>
-        <p:cNvPr id="111" name="Shape 111"/>
-        <p:cNvGrpSpPr/>
-        <p:nvPr/>
-      </p:nvGrpSpPr>
-      <p:grpSpPr>
-        <a:xfrm>
-          <a:off x="0" y="0"/>
-          <a:ext cx="0" cy="0"/>
-          <a:chOff x="0" y="0"/>
-          <a:chExt cx="0" cy="0"/>
-        </a:xfrm>
-      </p:grpSpPr>
-      <p:sp>
-        <p:nvSpPr>
-          <p:cNvPr id="112" name="Google Shape;112;g9faee993de_0_17:notes"/>
-          <p:cNvSpPr/>
-          <p:nvPr>
-            <p:ph idx="2" type="sldImg"/>
-          </p:nvPr>
-        </p:nvSpPr>
-        <p:spPr>
-          <a:xfrm>
-            <a:off x="381300" y="685800"/>
-            <a:ext cx="6096000" cy="3429000"/>
-          </a:xfrm>
-          <a:custGeom>
-            <a:rect b="b" l="l" r="r" t="t"/>
-            <a:pathLst>
-              <a:path extrusionOk="0" h="120000" w="120000">
-                <a:moveTo>
-                  <a:pt x="0" y="0"/>
-                </a:moveTo>
-                <a:lnTo>
-                  <a:pt x="120000" y="0"/>
-                </a:lnTo>
-                <a:lnTo>
-                  <a:pt x="120000" y="120000"/>
-                </a:lnTo>
-                <a:lnTo>
-                  <a:pt x="0" y="120000"/>
-                </a:lnTo>
-                <a:close/>
-              </a:path>
-            </a:pathLst>
-          </a:custGeom>
-        </p:spPr>
-      </p:sp>
-      <p:sp>
-        <p:nvSpPr>
-          <p:cNvPr id="113" name="Google Shape;113;g9faee993de_0_17:notes"/>
-          <p:cNvSpPr txBox="1"/>
-          <p:nvPr>
-            <p:ph idx="1" type="body"/>
-          </p:nvPr>
-        </p:nvSpPr>
-        <p:spPr>
-          <a:xfrm>
-            <a:off x="685800" y="4343400"/>
-            <a:ext cx="5486400" cy="4114800"/>
-          </a:xfrm>
-          <a:prstGeom prst="rect">
-            <a:avLst/>
-          </a:prstGeom>
-        </p:spPr>
-        <p:txBody>
-          <a:bodyPr anchorCtr="0" anchor="t" bIns="91425" lIns="91425" spcFirstLastPara="1" rIns="91425" wrap="square" tIns="91425">
-            <a:noAutofit/>
-          </a:bodyPr>
-          <a:lstStyle/>
-          <a:p>
-            <a:pPr indent="0" lvl="0" marL="0" rtl="0" algn="l">
-              <a:spcBef>
-                <a:spcPts val="0"/>
-              </a:spcBef>
-              <a:spcAft>
-                <a:spcPts val="0"/>
-              </a:spcAft>
-              <a:buNone/>
-            </a:pPr>
-            <a:r>
-              <a:t/>
-            </a:r>
-            <a:endParaRPr/>
-          </a:p>
-        </p:txBody>
-      </p:sp>
-    </p:spTree>
-  </p:cSld>
-  <p:clrMapOvr>
-    <a:masterClrMapping/>
-  </p:clrMapOvr>
-</p:notes>
-</file>
-
-<file path=ppt/notesSlides/notesSlide12.xml><?xml version="1.0" encoding="utf-8"?>
-<p:notes xmlns:a="http://schemas.openxmlformats.org/drawingml/2006/main" xmlns:r="http://schemas.openxmlformats.org/officeDocument/2006/relationships" xmlns:mc="http://schemas.openxmlformats.org/markup-compatibility/2006" xmlns:mv="urn:schemas-microsoft-com:mac:vml" xmlns:p="http://schemas.openxmlformats.org/presentationml/2006/main" xmlns:c="http://schemas.openxmlformats.org/drawingml/2006/chart" xmlns:dgm="http://schemas.openxmlformats.org/drawingml/2006/diagram" xmlns:o="urn:schemas-microsoft-com:office:office" xmlns:v="urn:schemas-microsoft-com:vml" xmlns:pvml="urn:schemas-microsoft-com:office:powerpoint" xmlns:com="http://schemas.openxmlformats.org/drawingml/2006/compatibility" xmlns:p14="http://schemas.microsoft.com/office/powerpoint/2010/main" xmlns:p15="http://schemas.microsoft.com/office/powerpoint/2012/main" xmlns:ahyp="http://schemas.microsoft.com/office/drawing/2018/hyperlinkcolor" showMasterPhAnim="0" showMasterSp="0">
-  <p:cSld>
-    <p:spTree>
-      <p:nvGrpSpPr>
-        <p:cNvPr id="117" name="Shape 117"/>
-        <p:cNvGrpSpPr/>
-        <p:nvPr/>
-      </p:nvGrpSpPr>
-      <p:grpSpPr>
-        <a:xfrm>
-          <a:off x="0" y="0"/>
-          <a:ext cx="0" cy="0"/>
-          <a:chOff x="0" y="0"/>
-          <a:chExt cx="0" cy="0"/>
-        </a:xfrm>
-      </p:grpSpPr>
-      <p:sp>
-        <p:nvSpPr>
-          <p:cNvPr id="118" name="Google Shape;118;g9faee993de_0_29:notes"/>
-          <p:cNvSpPr/>
-          <p:nvPr>
-            <p:ph idx="2" type="sldImg"/>
-          </p:nvPr>
-        </p:nvSpPr>
-        <p:spPr>
-          <a:xfrm>
-            <a:off x="381300" y="685800"/>
-            <a:ext cx="6096000" cy="3429000"/>
-          </a:xfrm>
-          <a:custGeom>
-            <a:rect b="b" l="l" r="r" t="t"/>
-            <a:pathLst>
-              <a:path extrusionOk="0" h="120000" w="120000">
-                <a:moveTo>
-                  <a:pt x="0" y="0"/>
-                </a:moveTo>
-                <a:lnTo>
-                  <a:pt x="120000" y="0"/>
-                </a:lnTo>
-                <a:lnTo>
-                  <a:pt x="120000" y="120000"/>
-                </a:lnTo>
-                <a:lnTo>
-                  <a:pt x="0" y="120000"/>
-                </a:lnTo>
-                <a:close/>
-              </a:path>
-            </a:pathLst>
-          </a:custGeom>
-        </p:spPr>
-      </p:sp>
-      <p:sp>
-        <p:nvSpPr>
-          <p:cNvPr id="119" name="Google Shape;119;g9faee993de_0_29:notes"/>
-          <p:cNvSpPr txBox="1"/>
-          <p:nvPr>
-            <p:ph idx="1" type="body"/>
-          </p:nvPr>
-        </p:nvSpPr>
-        <p:spPr>
-          <a:xfrm>
-            <a:off x="685800" y="4343400"/>
-            <a:ext cx="5486400" cy="4114800"/>
-          </a:xfrm>
-          <a:prstGeom prst="rect">
-            <a:avLst/>
-          </a:prstGeom>
-        </p:spPr>
-        <p:txBody>
-          <a:bodyPr anchorCtr="0" anchor="t" bIns="91425" lIns="91425" spcFirstLastPara="1" rIns="91425" wrap="square" tIns="91425">
-            <a:noAutofit/>
-          </a:bodyPr>
-          <a:lstStyle/>
-          <a:p>
-            <a:pPr indent="0" lvl="0" marL="0" rtl="0" algn="l">
-              <a:spcBef>
-                <a:spcPts val="0"/>
-              </a:spcBef>
-              <a:spcAft>
-                <a:spcPts val="0"/>
-              </a:spcAft>
-              <a:buNone/>
-            </a:pPr>
-            <a:r>
-              <a:t/>
-            </a:r>
-            <a:endParaRPr/>
-          </a:p>
-        </p:txBody>
-      </p:sp>
-    </p:spTree>
-  </p:cSld>
-  <p:clrMapOvr>
-    <a:masterClrMapping/>
-  </p:clrMapOvr>
-</p:notes>
-</file>
-
 <file path=ppt/notesSlides/notesSlide2.xml><?xml version="1.0" encoding="utf-8"?>
 <p:notes xmlns:a="http://schemas.openxmlformats.org/drawingml/2006/main" xmlns:r="http://schemas.openxmlformats.org/officeDocument/2006/relationships" xmlns:mc="http://schemas.openxmlformats.org/markup-compatibility/2006" xmlns:mv="urn:schemas-microsoft-com:mac:vml" xmlns:p="http://schemas.openxmlformats.org/presentationml/2006/main" xmlns:c="http://schemas.openxmlformats.org/drawingml/2006/chart" xmlns:dgm="http://schemas.openxmlformats.org/drawingml/2006/diagram" xmlns:o="urn:schemas-microsoft-com:office:office" xmlns:v="urn:schemas-microsoft-com:vml" xmlns:pvml="urn:schemas-microsoft-com:office:powerpoint" xmlns:com="http://schemas.openxmlformats.org/drawingml/2006/compatibility" xmlns:p14="http://schemas.microsoft.com/office/powerpoint/2010/main" xmlns:p15="http://schemas.microsoft.com/office/powerpoint/2012/main" xmlns:ahyp="http://schemas.microsoft.com/office/drawing/2018/hyperlinkcolor" showMasterPhAnim="0" showMasterSp="0">
   <p:cSld>
@@ -1310,7 +1009,7 @@
       </p:grpSpPr>
       <p:sp>
         <p:nvSpPr>
-          <p:cNvPr id="70" name="Google Shape;70;ga52a419110_0_57:notes"/>
+          <p:cNvPr id="70" name="Google Shape;70;g9faee993de_0_11:notes"/>
           <p:cNvSpPr/>
           <p:nvPr>
             <p:ph idx="2" type="sldImg"/>
@@ -1345,7 +1044,7 @@
       </p:sp>
       <p:sp>
         <p:nvSpPr>
-          <p:cNvPr id="71" name="Google Shape;71;ga52a419110_0_57:notes"/>
+          <p:cNvPr id="71" name="Google Shape;71;g9faee993de_0_11:notes"/>
           <p:cNvSpPr txBox="1"/>
           <p:nvPr>
             <p:ph idx="1" type="body"/>
@@ -1395,7 +1094,7 @@
   <p:cSld>
     <p:spTree>
       <p:nvGrpSpPr>
-        <p:cNvPr id="75" name="Shape 75"/>
+        <p:cNvPr id="76" name="Shape 76"/>
         <p:cNvGrpSpPr/>
         <p:nvPr/>
       </p:nvGrpSpPr>
@@ -1409,7 +1108,7 @@
       </p:grpSpPr>
       <p:sp>
         <p:nvSpPr>
-          <p:cNvPr id="76" name="Google Shape;76;g9faee993de_0_11:notes"/>
+          <p:cNvPr id="77" name="Google Shape;77;ga52a419110_0_57:notes"/>
           <p:cNvSpPr/>
           <p:nvPr>
             <p:ph idx="2" type="sldImg"/>
@@ -1444,7 +1143,7 @@
       </p:sp>
       <p:sp>
         <p:nvSpPr>
-          <p:cNvPr id="77" name="Google Shape;77;g9faee993de_0_11:notes"/>
+          <p:cNvPr id="78" name="Google Shape;78;ga52a419110_0_57:notes"/>
           <p:cNvSpPr txBox="1"/>
           <p:nvPr>
             <p:ph idx="1" type="body"/>
@@ -1494,7 +1193,7 @@
   <p:cSld>
     <p:spTree>
       <p:nvGrpSpPr>
-        <p:cNvPr id="81" name="Shape 81"/>
+        <p:cNvPr id="83" name="Shape 83"/>
         <p:cNvGrpSpPr/>
         <p:nvPr/>
       </p:nvGrpSpPr>
@@ -1508,7 +1207,7 @@
       </p:grpSpPr>
       <p:sp>
         <p:nvSpPr>
-          <p:cNvPr id="82" name="Google Shape;82;g9faee993de_0_0:notes"/>
+          <p:cNvPr id="84" name="Google Shape;84;g9faee993de_0_22:notes"/>
           <p:cNvSpPr/>
           <p:nvPr>
             <p:ph idx="2" type="sldImg"/>
@@ -1543,7 +1242,7 @@
       </p:sp>
       <p:sp>
         <p:nvSpPr>
-          <p:cNvPr id="83" name="Google Shape;83;g9faee993de_0_0:notes"/>
+          <p:cNvPr id="85" name="Google Shape;85;g9faee993de_0_22:notes"/>
           <p:cNvSpPr txBox="1"/>
           <p:nvPr>
             <p:ph idx="1" type="body"/>
@@ -1593,7 +1292,7 @@
   <p:cSld>
     <p:spTree>
       <p:nvGrpSpPr>
-        <p:cNvPr id="87" name="Shape 87"/>
+        <p:cNvPr id="92" name="Shape 92"/>
         <p:cNvGrpSpPr/>
         <p:nvPr/>
       </p:nvGrpSpPr>
@@ -1607,7 +1306,7 @@
       </p:grpSpPr>
       <p:sp>
         <p:nvSpPr>
-          <p:cNvPr id="88" name="Google Shape;88;ga53c47efc0_0_6:notes"/>
+          <p:cNvPr id="93" name="Google Shape;93;ga65e1ddd1e_0_0:notes"/>
           <p:cNvSpPr/>
           <p:nvPr>
             <p:ph idx="2" type="sldImg"/>
@@ -1642,7 +1341,7 @@
       </p:sp>
       <p:sp>
         <p:nvSpPr>
-          <p:cNvPr id="89" name="Google Shape;89;ga53c47efc0_0_6:notes"/>
+          <p:cNvPr id="94" name="Google Shape;94;ga65e1ddd1e_0_0:notes"/>
           <p:cNvSpPr txBox="1"/>
           <p:nvPr>
             <p:ph idx="1" type="body"/>
@@ -1692,7 +1391,7 @@
   <p:cSld>
     <p:spTree>
       <p:nvGrpSpPr>
-        <p:cNvPr id="93" name="Shape 93"/>
+        <p:cNvPr id="98" name="Shape 98"/>
         <p:cNvGrpSpPr/>
         <p:nvPr/>
       </p:nvGrpSpPr>
@@ -1706,7 +1405,7 @@
       </p:grpSpPr>
       <p:sp>
         <p:nvSpPr>
-          <p:cNvPr id="94" name="Google Shape;94;ga52a419110_0_5:notes"/>
+          <p:cNvPr id="99" name="Google Shape;99;g9faee993de_0_0:notes"/>
           <p:cNvSpPr/>
           <p:nvPr>
             <p:ph idx="2" type="sldImg"/>
@@ -1741,106 +1440,7 @@
       </p:sp>
       <p:sp>
         <p:nvSpPr>
-          <p:cNvPr id="95" name="Google Shape;95;ga52a419110_0_5:notes"/>
-          <p:cNvSpPr txBox="1"/>
-          <p:nvPr>
-            <p:ph idx="1" type="body"/>
-          </p:nvPr>
-        </p:nvSpPr>
-        <p:spPr>
-          <a:xfrm>
-            <a:off x="685800" y="4343400"/>
-            <a:ext cx="5486400" cy="4114800"/>
-          </a:xfrm>
-          <a:prstGeom prst="rect">
-            <a:avLst/>
-          </a:prstGeom>
-        </p:spPr>
-        <p:txBody>
-          <a:bodyPr anchorCtr="0" anchor="t" bIns="91425" lIns="91425" spcFirstLastPara="1" rIns="91425" wrap="square" tIns="91425">
-            <a:noAutofit/>
-          </a:bodyPr>
-          <a:lstStyle/>
-          <a:p>
-            <a:pPr indent="0" lvl="0" marL="0" rtl="0" algn="l">
-              <a:spcBef>
-                <a:spcPts val="0"/>
-              </a:spcBef>
-              <a:spcAft>
-                <a:spcPts val="0"/>
-              </a:spcAft>
-              <a:buNone/>
-            </a:pPr>
-            <a:r>
-              <a:t/>
-            </a:r>
-            <a:endParaRPr/>
-          </a:p>
-        </p:txBody>
-      </p:sp>
-    </p:spTree>
-  </p:cSld>
-  <p:clrMapOvr>
-    <a:masterClrMapping/>
-  </p:clrMapOvr>
-</p:notes>
-</file>
-
-<file path=ppt/notesSlides/notesSlide9.xml><?xml version="1.0" encoding="utf-8"?>
-<p:notes xmlns:a="http://schemas.openxmlformats.org/drawingml/2006/main" xmlns:r="http://schemas.openxmlformats.org/officeDocument/2006/relationships" xmlns:mc="http://schemas.openxmlformats.org/markup-compatibility/2006" xmlns:mv="urn:schemas-microsoft-com:mac:vml" xmlns:p="http://schemas.openxmlformats.org/presentationml/2006/main" xmlns:c="http://schemas.openxmlformats.org/drawingml/2006/chart" xmlns:dgm="http://schemas.openxmlformats.org/drawingml/2006/diagram" xmlns:o="urn:schemas-microsoft-com:office:office" xmlns:v="urn:schemas-microsoft-com:vml" xmlns:pvml="urn:schemas-microsoft-com:office:powerpoint" xmlns:com="http://schemas.openxmlformats.org/drawingml/2006/compatibility" xmlns:p14="http://schemas.microsoft.com/office/powerpoint/2010/main" xmlns:p15="http://schemas.microsoft.com/office/powerpoint/2012/main" xmlns:ahyp="http://schemas.microsoft.com/office/drawing/2018/hyperlinkcolor" showMasterPhAnim="0" showMasterSp="0">
-  <p:cSld>
-    <p:spTree>
-      <p:nvGrpSpPr>
-        <p:cNvPr id="99" name="Shape 99"/>
-        <p:cNvGrpSpPr/>
-        <p:nvPr/>
-      </p:nvGrpSpPr>
-      <p:grpSpPr>
-        <a:xfrm>
-          <a:off x="0" y="0"/>
-          <a:ext cx="0" cy="0"/>
-          <a:chOff x="0" y="0"/>
-          <a:chExt cx="0" cy="0"/>
-        </a:xfrm>
-      </p:grpSpPr>
-      <p:sp>
-        <p:nvSpPr>
-          <p:cNvPr id="100" name="Google Shape;100;ga52a419110_0_0:notes"/>
-          <p:cNvSpPr/>
-          <p:nvPr>
-            <p:ph idx="2" type="sldImg"/>
-          </p:nvPr>
-        </p:nvSpPr>
-        <p:spPr>
-          <a:xfrm>
-            <a:off x="381300" y="685800"/>
-            <a:ext cx="6096000" cy="3429000"/>
-          </a:xfrm>
-          <a:custGeom>
-            <a:rect b="b" l="l" r="r" t="t"/>
-            <a:pathLst>
-              <a:path extrusionOk="0" h="120000" w="120000">
-                <a:moveTo>
-                  <a:pt x="0" y="0"/>
-                </a:moveTo>
-                <a:lnTo>
-                  <a:pt x="120000" y="0"/>
-                </a:lnTo>
-                <a:lnTo>
-                  <a:pt x="120000" y="120000"/>
-                </a:lnTo>
-                <a:lnTo>
-                  <a:pt x="0" y="120000"/>
-                </a:lnTo>
-                <a:close/>
-              </a:path>
-            </a:pathLst>
-          </a:custGeom>
-        </p:spPr>
-      </p:sp>
-      <p:sp>
-        <p:nvSpPr>
-          <p:cNvPr id="101" name="Google Shape;101;ga52a419110_0_0:notes"/>
+          <p:cNvPr id="100" name="Google Shape;100;g9faee993de_0_0:notes"/>
           <p:cNvSpPr txBox="1"/>
           <p:nvPr>
             <p:ph idx="1" type="body"/>
@@ -6818,329 +6418,6 @@
 </p:sld>
 </file>
 
-<file path=ppt/slides/slide10.xml><?xml version="1.0" encoding="utf-8"?>
-<p:sld xmlns:a="http://schemas.openxmlformats.org/drawingml/2006/main" xmlns:r="http://schemas.openxmlformats.org/officeDocument/2006/relationships" xmlns:mc="http://schemas.openxmlformats.org/markup-compatibility/2006" xmlns:mv="urn:schemas-microsoft-com:mac:vml" xmlns:p="http://schemas.openxmlformats.org/presentationml/2006/main" xmlns:c="http://schemas.openxmlformats.org/drawingml/2006/chart" xmlns:dgm="http://schemas.openxmlformats.org/drawingml/2006/diagram" xmlns:o="urn:schemas-microsoft-com:office:office" xmlns:v="urn:schemas-microsoft-com:vml" xmlns:pvml="urn:schemas-microsoft-com:office:powerpoint" xmlns:com="http://schemas.openxmlformats.org/drawingml/2006/compatibility" xmlns:p14="http://schemas.microsoft.com/office/powerpoint/2010/main" xmlns:p15="http://schemas.microsoft.com/office/powerpoint/2012/main" xmlns:ahyp="http://schemas.microsoft.com/office/drawing/2018/hyperlinkcolor">
-  <p:cSld>
-    <p:spTree>
-      <p:nvGrpSpPr>
-        <p:cNvPr id="108" name="Shape 108"/>
-        <p:cNvGrpSpPr/>
-        <p:nvPr/>
-      </p:nvGrpSpPr>
-      <p:grpSpPr>
-        <a:xfrm>
-          <a:off x="0" y="0"/>
-          <a:ext cx="0" cy="0"/>
-          <a:chOff x="0" y="0"/>
-          <a:chExt cx="0" cy="0"/>
-        </a:xfrm>
-      </p:grpSpPr>
-      <p:sp>
-        <p:nvSpPr>
-          <p:cNvPr id="109" name="Google Shape;109;p22"/>
-          <p:cNvSpPr txBox="1"/>
-          <p:nvPr>
-            <p:ph type="title"/>
-          </p:nvPr>
-        </p:nvSpPr>
-        <p:spPr>
-          <a:xfrm>
-            <a:off x="418275" y="253225"/>
-            <a:ext cx="8520600" cy="572700"/>
-          </a:xfrm>
-          <a:prstGeom prst="rect">
-            <a:avLst/>
-          </a:prstGeom>
-        </p:spPr>
-        <p:txBody>
-          <a:bodyPr anchorCtr="0" anchor="t" bIns="91425" lIns="91425" spcFirstLastPara="1" rIns="91425" wrap="square" tIns="91425">
-            <a:noAutofit/>
-          </a:bodyPr>
-          <a:lstStyle/>
-          <a:p>
-            <a:pPr indent="0" lvl="0" marL="0" rtl="0" algn="l">
-              <a:spcBef>
-                <a:spcPts val="0"/>
-              </a:spcBef>
-              <a:spcAft>
-                <a:spcPts val="0"/>
-              </a:spcAft>
-              <a:buNone/>
-            </a:pPr>
-            <a:r>
-              <a:rPr lang="en" sz="2600"/>
-              <a:t>Bar Graph</a:t>
-            </a:r>
-            <a:r>
-              <a:rPr lang="en" sz="2600"/>
-              <a:t>: Average Amount for Transaction w/ X Items</a:t>
-            </a:r>
-            <a:endParaRPr sz="2600"/>
-          </a:p>
-        </p:txBody>
-      </p:sp>
-      <p:pic>
-        <p:nvPicPr>
-          <p:cNvPr id="110" name="Google Shape;110;p22"/>
-          <p:cNvPicPr preferRelativeResize="0"/>
-          <p:nvPr/>
-        </p:nvPicPr>
-        <p:blipFill>
-          <a:blip r:embed="rId3">
-            <a:alphaModFix/>
-          </a:blip>
-          <a:stretch>
-            <a:fillRect/>
-          </a:stretch>
-        </p:blipFill>
-        <p:spPr>
-          <a:xfrm>
-            <a:off x="1939625" y="1042250"/>
-            <a:ext cx="5477899" cy="3852925"/>
-          </a:xfrm>
-          <a:prstGeom prst="rect">
-            <a:avLst/>
-          </a:prstGeom>
-          <a:noFill/>
-          <a:ln>
-            <a:noFill/>
-          </a:ln>
-        </p:spPr>
-      </p:pic>
-    </p:spTree>
-  </p:cSld>
-  <p:clrMapOvr>
-    <a:masterClrMapping/>
-  </p:clrMapOvr>
-</p:sld>
-</file>
-
-<file path=ppt/slides/slide11.xml><?xml version="1.0" encoding="utf-8"?>
-<p:sld xmlns:a="http://schemas.openxmlformats.org/drawingml/2006/main" xmlns:r="http://schemas.openxmlformats.org/officeDocument/2006/relationships" xmlns:mc="http://schemas.openxmlformats.org/markup-compatibility/2006" xmlns:mv="urn:schemas-microsoft-com:mac:vml" xmlns:p="http://schemas.openxmlformats.org/presentationml/2006/main" xmlns:c="http://schemas.openxmlformats.org/drawingml/2006/chart" xmlns:dgm="http://schemas.openxmlformats.org/drawingml/2006/diagram" xmlns:o="urn:schemas-microsoft-com:office:office" xmlns:v="urn:schemas-microsoft-com:vml" xmlns:pvml="urn:schemas-microsoft-com:office:powerpoint" xmlns:com="http://schemas.openxmlformats.org/drawingml/2006/compatibility" xmlns:p14="http://schemas.microsoft.com/office/powerpoint/2010/main" xmlns:p15="http://schemas.microsoft.com/office/powerpoint/2012/main" xmlns:ahyp="http://schemas.microsoft.com/office/drawing/2018/hyperlinkcolor">
-  <p:cSld>
-    <p:spTree>
-      <p:nvGrpSpPr>
-        <p:cNvPr id="114" name="Shape 114"/>
-        <p:cNvGrpSpPr/>
-        <p:nvPr/>
-      </p:nvGrpSpPr>
-      <p:grpSpPr>
-        <a:xfrm>
-          <a:off x="0" y="0"/>
-          <a:ext cx="0" cy="0"/>
-          <a:chOff x="0" y="0"/>
-          <a:chExt cx="0" cy="0"/>
-        </a:xfrm>
-      </p:grpSpPr>
-      <p:sp>
-        <p:nvSpPr>
-          <p:cNvPr id="115" name="Google Shape;115;p23"/>
-          <p:cNvSpPr txBox="1"/>
-          <p:nvPr>
-            <p:ph type="title"/>
-          </p:nvPr>
-        </p:nvSpPr>
-        <p:spPr>
-          <a:xfrm>
-            <a:off x="418275" y="231900"/>
-            <a:ext cx="8520600" cy="572700"/>
-          </a:xfrm>
-          <a:prstGeom prst="rect">
-            <a:avLst/>
-          </a:prstGeom>
-        </p:spPr>
-        <p:txBody>
-          <a:bodyPr anchorCtr="0" anchor="t" bIns="91425" lIns="91425" spcFirstLastPara="1" rIns="91425" wrap="square" tIns="91425">
-            <a:noAutofit/>
-          </a:bodyPr>
-          <a:lstStyle/>
-          <a:p>
-            <a:pPr indent="0" lvl="0" marL="0" rtl="0" algn="l">
-              <a:spcBef>
-                <a:spcPts val="0"/>
-              </a:spcBef>
-              <a:spcAft>
-                <a:spcPts val="0"/>
-              </a:spcAft>
-              <a:buNone/>
-            </a:pPr>
-            <a:r>
-              <a:rPr lang="en"/>
-              <a:t>Box</a:t>
-            </a:r>
-            <a:r>
-              <a:rPr lang="en"/>
-              <a:t> Plots: Amounts for Transactions w/ X Items</a:t>
-            </a:r>
-            <a:endParaRPr/>
-          </a:p>
-        </p:txBody>
-      </p:sp>
-      <p:pic>
-        <p:nvPicPr>
-          <p:cNvPr id="116" name="Google Shape;116;p23"/>
-          <p:cNvPicPr preferRelativeResize="0"/>
-          <p:nvPr/>
-        </p:nvPicPr>
-        <p:blipFill>
-          <a:blip r:embed="rId3">
-            <a:alphaModFix/>
-          </a:blip>
-          <a:stretch>
-            <a:fillRect/>
-          </a:stretch>
-        </p:blipFill>
-        <p:spPr>
-          <a:xfrm>
-            <a:off x="1972263" y="1063575"/>
-            <a:ext cx="5199483" cy="3852925"/>
-          </a:xfrm>
-          <a:prstGeom prst="rect">
-            <a:avLst/>
-          </a:prstGeom>
-          <a:noFill/>
-          <a:ln>
-            <a:noFill/>
-          </a:ln>
-        </p:spPr>
-      </p:pic>
-    </p:spTree>
-  </p:cSld>
-  <p:clrMapOvr>
-    <a:masterClrMapping/>
-  </p:clrMapOvr>
-</p:sld>
-</file>
-
-<file path=ppt/slides/slide12.xml><?xml version="1.0" encoding="utf-8"?>
-<p:sld xmlns:a="http://schemas.openxmlformats.org/drawingml/2006/main" xmlns:r="http://schemas.openxmlformats.org/officeDocument/2006/relationships" xmlns:mc="http://schemas.openxmlformats.org/markup-compatibility/2006" xmlns:mv="urn:schemas-microsoft-com:mac:vml" xmlns:p="http://schemas.openxmlformats.org/presentationml/2006/main" xmlns:c="http://schemas.openxmlformats.org/drawingml/2006/chart" xmlns:dgm="http://schemas.openxmlformats.org/drawingml/2006/diagram" xmlns:o="urn:schemas-microsoft-com:office:office" xmlns:v="urn:schemas-microsoft-com:vml" xmlns:pvml="urn:schemas-microsoft-com:office:powerpoint" xmlns:com="http://schemas.openxmlformats.org/drawingml/2006/compatibility" xmlns:p14="http://schemas.microsoft.com/office/powerpoint/2010/main" xmlns:p15="http://schemas.microsoft.com/office/powerpoint/2012/main" xmlns:ahyp="http://schemas.microsoft.com/office/drawing/2018/hyperlinkcolor">
-  <p:cSld>
-    <p:spTree>
-      <p:nvGrpSpPr>
-        <p:cNvPr id="120" name="Shape 120"/>
-        <p:cNvGrpSpPr/>
-        <p:nvPr/>
-      </p:nvGrpSpPr>
-      <p:grpSpPr>
-        <a:xfrm>
-          <a:off x="0" y="0"/>
-          <a:ext cx="0" cy="0"/>
-          <a:chOff x="0" y="0"/>
-          <a:chExt cx="0" cy="0"/>
-        </a:xfrm>
-      </p:grpSpPr>
-      <p:sp>
-        <p:nvSpPr>
-          <p:cNvPr id="121" name="Google Shape;121;p24"/>
-          <p:cNvSpPr txBox="1"/>
-          <p:nvPr>
-            <p:ph type="title"/>
-          </p:nvPr>
-        </p:nvSpPr>
-        <p:spPr>
-          <a:xfrm>
-            <a:off x="311700" y="445025"/>
-            <a:ext cx="8520600" cy="572700"/>
-          </a:xfrm>
-          <a:prstGeom prst="rect">
-            <a:avLst/>
-          </a:prstGeom>
-        </p:spPr>
-        <p:txBody>
-          <a:bodyPr anchorCtr="0" anchor="t" bIns="91425" lIns="91425" spcFirstLastPara="1" rIns="91425" wrap="square" tIns="91425">
-            <a:noAutofit/>
-          </a:bodyPr>
-          <a:lstStyle/>
-          <a:p>
-            <a:pPr indent="0" lvl="0" marL="0" rtl="0" algn="l">
-              <a:spcBef>
-                <a:spcPts val="0"/>
-              </a:spcBef>
-              <a:spcAft>
-                <a:spcPts val="0"/>
-              </a:spcAft>
-              <a:buNone/>
-            </a:pPr>
-            <a:r>
-              <a:rPr lang="en"/>
-              <a:t>Implications</a:t>
-            </a:r>
-            <a:endParaRPr/>
-          </a:p>
-        </p:txBody>
-      </p:sp>
-      <p:sp>
-        <p:nvSpPr>
-          <p:cNvPr id="122" name="Google Shape;122;p24"/>
-          <p:cNvSpPr txBox="1"/>
-          <p:nvPr>
-            <p:ph idx="1" type="body"/>
-          </p:nvPr>
-        </p:nvSpPr>
-        <p:spPr>
-          <a:xfrm>
-            <a:off x="311700" y="1152475"/>
-            <a:ext cx="8520600" cy="3416400"/>
-          </a:xfrm>
-          <a:prstGeom prst="rect">
-            <a:avLst/>
-          </a:prstGeom>
-        </p:spPr>
-        <p:txBody>
-          <a:bodyPr anchorCtr="0" anchor="t" bIns="91425" lIns="91425" spcFirstLastPara="1" rIns="91425" wrap="square" tIns="91425">
-            <a:noAutofit/>
-          </a:bodyPr>
-          <a:lstStyle/>
-          <a:p>
-            <a:pPr indent="0" lvl="0" marL="0" rtl="0" algn="l">
-              <a:spcBef>
-                <a:spcPts val="0"/>
-              </a:spcBef>
-              <a:spcAft>
-                <a:spcPts val="1600"/>
-              </a:spcAft>
-              <a:buNone/>
-            </a:pPr>
-            <a:r>
-              <a:rPr lang="en">
-                <a:solidFill>
-                  <a:srgbClr val="FFFFFF"/>
-                </a:solidFill>
-              </a:rPr>
-              <a:t>Items seems to have no </a:t>
-            </a:r>
-            <a:r>
-              <a:rPr lang="en">
-                <a:solidFill>
-                  <a:srgbClr val="FFFFFF"/>
-                </a:solidFill>
-              </a:rPr>
-              <a:t>correlation</a:t>
-            </a:r>
-            <a:r>
-              <a:rPr lang="en">
-                <a:solidFill>
-                  <a:srgbClr val="FFFFFF"/>
-                </a:solidFill>
-              </a:rPr>
-              <a:t> to amount spent on a transactions</a:t>
-            </a:r>
-            <a:endParaRPr>
-              <a:solidFill>
-                <a:srgbClr val="FFFFFF"/>
-              </a:solidFill>
-            </a:endParaRPr>
-          </a:p>
-        </p:txBody>
-      </p:sp>
-    </p:spTree>
-  </p:cSld>
-  <p:clrMapOvr>
-    <a:masterClrMapping/>
-  </p:clrMapOvr>
-</p:sld>
-</file>
-
 <file path=ppt/slides/slide2.xml><?xml version="1.0" encoding="utf-8"?>
 <p:sld xmlns:a="http://schemas.openxmlformats.org/drawingml/2006/main" xmlns:r="http://schemas.openxmlformats.org/officeDocument/2006/relationships" xmlns:mc="http://schemas.openxmlformats.org/markup-compatibility/2006" xmlns:mv="urn:schemas-microsoft-com:mac:vml" xmlns:p="http://schemas.openxmlformats.org/presentationml/2006/main" xmlns:c="http://schemas.openxmlformats.org/drawingml/2006/chart" xmlns:dgm="http://schemas.openxmlformats.org/drawingml/2006/diagram" xmlns:o="urn:schemas-microsoft-com:office:office" xmlns:v="urn:schemas-microsoft-com:vml" xmlns:pvml="urn:schemas-microsoft-com:office:powerpoint" xmlns:com="http://schemas.openxmlformats.org/drawingml/2006/compatibility" xmlns:p14="http://schemas.microsoft.com/office/powerpoint/2010/main" xmlns:p15="http://schemas.microsoft.com/office/powerpoint/2012/main" xmlns:ahyp="http://schemas.microsoft.com/office/drawing/2018/hyperlinkcolor">
   <p:cSld>
@@ -7772,6 +7049,37 @@
           <a:lstStyle/>
           <a:p>
             <a:pPr indent="-368300" lvl="0" marL="457200" rtl="0" algn="l">
+              <a:lnSpc>
+                <a:spcPct val="100000"/>
+              </a:lnSpc>
+              <a:spcBef>
+                <a:spcPts val="0"/>
+              </a:spcBef>
+              <a:spcAft>
+                <a:spcPts val="0"/>
+              </a:spcAft>
+              <a:buClr>
+                <a:srgbClr val="FFFFFF"/>
+              </a:buClr>
+              <a:buSzPts val="2200"/>
+              <a:buChar char="-"/>
+            </a:pPr>
+            <a:r>
+              <a:rPr lang="en" sz="2200">
+                <a:solidFill>
+                  <a:schemeClr val="dk1"/>
+                </a:solidFill>
+              </a:rPr>
+              <a:t>Scatter Plot: Transaction Amounts for each region</a:t>
+            </a:r>
+            <a:endParaRPr sz="2200">
+              <a:solidFill>
+                <a:srgbClr val="FFFFFF"/>
+              </a:solidFill>
+            </a:endParaRPr>
+          </a:p>
+          <a:p>
+            <a:pPr indent="-368300" lvl="0" marL="457200" rtl="0" algn="l">
               <a:spcBef>
                 <a:spcPts val="0"/>
               </a:spcBef>
@@ -7943,7 +7251,11 @@
             </a:pPr>
             <a:r>
               <a:rPr lang="en"/>
-              <a:t>Histogram: Amounts for each region</a:t>
+              <a:t>Scatter Plot</a:t>
+            </a:r>
+            <a:r>
+              <a:rPr lang="en"/>
+              <a:t>: Transaction Amounts for each region</a:t>
             </a:r>
             <a:endParaRPr/>
           </a:p>
@@ -7965,8 +7277,8 @@
         </p:blipFill>
         <p:spPr>
           <a:xfrm>
-            <a:off x="1892663" y="968650"/>
-            <a:ext cx="5358684" cy="3820975"/>
+            <a:off x="311720" y="1103500"/>
+            <a:ext cx="3865954" cy="3402600"/>
           </a:xfrm>
           <a:prstGeom prst="rect">
             <a:avLst/>
@@ -7977,6 +7289,187 @@
           </a:ln>
         </p:spPr>
       </p:pic>
+      <p:sp>
+        <p:nvSpPr>
+          <p:cNvPr id="75" name="Google Shape;75;p16"/>
+          <p:cNvSpPr txBox="1"/>
+          <p:nvPr/>
+        </p:nvSpPr>
+        <p:spPr>
+          <a:xfrm>
+            <a:off x="4821175" y="1103488"/>
+            <a:ext cx="4117500" cy="3402600"/>
+          </a:xfrm>
+          <a:prstGeom prst="rect">
+            <a:avLst/>
+          </a:prstGeom>
+          <a:noFill/>
+          <a:ln>
+            <a:noFill/>
+          </a:ln>
+        </p:spPr>
+        <p:txBody>
+          <a:bodyPr anchorCtr="0" anchor="t" bIns="91425" lIns="91425" spcFirstLastPara="1" rIns="91425" wrap="square" tIns="91425">
+            <a:noAutofit/>
+          </a:bodyPr>
+          <a:lstStyle/>
+          <a:p>
+            <a:pPr indent="-342900" lvl="0" marL="457200" rtl="0" algn="l">
+              <a:lnSpc>
+                <a:spcPct val="115000"/>
+              </a:lnSpc>
+              <a:spcBef>
+                <a:spcPts val="0"/>
+              </a:spcBef>
+              <a:spcAft>
+                <a:spcPts val="0"/>
+              </a:spcAft>
+              <a:buClr>
+                <a:schemeClr val="dk1"/>
+              </a:buClr>
+              <a:buSzPts val="1800"/>
+              <a:buChar char="-"/>
+            </a:pPr>
+            <a:r>
+              <a:rPr lang="en" sz="1800">
+                <a:solidFill>
+                  <a:schemeClr val="dk1"/>
+                </a:solidFill>
+              </a:rPr>
+              <a:t>Regions show a range in which all their transaction amounts reside</a:t>
+            </a:r>
+            <a:endParaRPr sz="1800">
+              <a:solidFill>
+                <a:schemeClr val="dk1"/>
+              </a:solidFill>
+            </a:endParaRPr>
+          </a:p>
+          <a:p>
+            <a:pPr indent="-342900" lvl="0" marL="457200" rtl="0" algn="l">
+              <a:lnSpc>
+                <a:spcPct val="115000"/>
+              </a:lnSpc>
+              <a:spcBef>
+                <a:spcPts val="0"/>
+              </a:spcBef>
+              <a:spcAft>
+                <a:spcPts val="0"/>
+              </a:spcAft>
+              <a:buClr>
+                <a:schemeClr val="dk1"/>
+              </a:buClr>
+              <a:buSzPts val="1800"/>
+              <a:buChar char="-"/>
+            </a:pPr>
+            <a:r>
+              <a:rPr lang="en" sz="1800">
+                <a:solidFill>
+                  <a:schemeClr val="dk1"/>
+                </a:solidFill>
+              </a:rPr>
+              <a:t>South: 0-500</a:t>
+            </a:r>
+            <a:endParaRPr sz="1800">
+              <a:solidFill>
+                <a:schemeClr val="dk1"/>
+              </a:solidFill>
+            </a:endParaRPr>
+          </a:p>
+          <a:p>
+            <a:pPr indent="-342900" lvl="0" marL="457200" rtl="0" algn="l">
+              <a:lnSpc>
+                <a:spcPct val="115000"/>
+              </a:lnSpc>
+              <a:spcBef>
+                <a:spcPts val="0"/>
+              </a:spcBef>
+              <a:spcAft>
+                <a:spcPts val="0"/>
+              </a:spcAft>
+              <a:buClr>
+                <a:schemeClr val="dk1"/>
+              </a:buClr>
+              <a:buSzPts val="1800"/>
+              <a:buChar char="-"/>
+            </a:pPr>
+            <a:r>
+              <a:rPr lang="en" sz="1800">
+                <a:solidFill>
+                  <a:schemeClr val="dk1"/>
+                </a:solidFill>
+              </a:rPr>
+              <a:t>West: 0-3000</a:t>
+            </a:r>
+            <a:endParaRPr sz="1800">
+              <a:solidFill>
+                <a:schemeClr val="dk1"/>
+              </a:solidFill>
+            </a:endParaRPr>
+          </a:p>
+          <a:p>
+            <a:pPr indent="-342900" lvl="0" marL="457200" rtl="0" algn="l">
+              <a:lnSpc>
+                <a:spcPct val="115000"/>
+              </a:lnSpc>
+              <a:spcBef>
+                <a:spcPts val="0"/>
+              </a:spcBef>
+              <a:spcAft>
+                <a:spcPts val="0"/>
+              </a:spcAft>
+              <a:buClr>
+                <a:schemeClr val="dk1"/>
+              </a:buClr>
+              <a:buSzPts val="1800"/>
+              <a:buChar char="-"/>
+            </a:pPr>
+            <a:r>
+              <a:rPr lang="en" sz="1800">
+                <a:solidFill>
+                  <a:schemeClr val="dk1"/>
+                </a:solidFill>
+              </a:rPr>
+              <a:t>East: 0-3000</a:t>
+            </a:r>
+            <a:endParaRPr sz="1800">
+              <a:solidFill>
+                <a:schemeClr val="dk1"/>
+              </a:solidFill>
+            </a:endParaRPr>
+          </a:p>
+          <a:p>
+            <a:pPr indent="-342900" lvl="0" marL="457200" rtl="0" algn="l">
+              <a:lnSpc>
+                <a:spcPct val="115000"/>
+              </a:lnSpc>
+              <a:spcBef>
+                <a:spcPts val="0"/>
+              </a:spcBef>
+              <a:spcAft>
+                <a:spcPts val="0"/>
+              </a:spcAft>
+              <a:buClr>
+                <a:schemeClr val="dk1"/>
+              </a:buClr>
+              <a:buSzPts val="1800"/>
+              <a:buChar char="-"/>
+            </a:pPr>
+            <a:r>
+              <a:rPr lang="en" sz="1800">
+                <a:solidFill>
+                  <a:schemeClr val="dk1"/>
+                </a:solidFill>
+              </a:rPr>
+              <a:t>North: 0-2000</a:t>
+            </a:r>
+            <a:endParaRPr sz="1800">
+              <a:solidFill>
+                <a:schemeClr val="dk1"/>
+              </a:solidFill>
+            </a:endParaRPr>
+          </a:p>
+        </p:txBody>
+      </p:sp>
     </p:spTree>
   </p:cSld>
   <p:clrMapOvr>
@@ -7990,7 +7483,7 @@
   <p:cSld>
     <p:spTree>
       <p:nvGrpSpPr>
-        <p:cNvPr id="78" name="Shape 78"/>
+        <p:cNvPr id="79" name="Shape 79"/>
         <p:cNvGrpSpPr/>
         <p:nvPr/>
       </p:nvGrpSpPr>
@@ -8004,7 +7497,7 @@
       </p:grpSpPr>
       <p:sp>
         <p:nvSpPr>
-          <p:cNvPr id="79" name="Google Shape;79;p17"/>
+          <p:cNvPr id="80" name="Google Shape;80;p17"/>
           <p:cNvSpPr txBox="1"/>
           <p:nvPr>
             <p:ph type="title"/>
@@ -8044,7 +7537,7 @@
       </p:sp>
       <p:pic>
         <p:nvPicPr>
-          <p:cNvPr id="80" name="Google Shape;80;p17"/>
+          <p:cNvPr id="81" name="Google Shape;81;p17"/>
           <p:cNvPicPr preferRelativeResize="0"/>
           <p:nvPr/>
         </p:nvPicPr>
@@ -8058,8 +7551,8 @@
         </p:blipFill>
         <p:spPr>
           <a:xfrm>
-            <a:off x="1836250" y="872225"/>
-            <a:ext cx="5734438" cy="4033624"/>
+            <a:off x="386250" y="993150"/>
+            <a:ext cx="4117500" cy="3226675"/>
           </a:xfrm>
           <a:prstGeom prst="rect">
             <a:avLst/>
@@ -8070,6 +7563,218 @@
           </a:ln>
         </p:spPr>
       </p:pic>
+      <p:sp>
+        <p:nvSpPr>
+          <p:cNvPr id="82" name="Google Shape;82;p17"/>
+          <p:cNvSpPr txBox="1"/>
+          <p:nvPr/>
+        </p:nvSpPr>
+        <p:spPr>
+          <a:xfrm>
+            <a:off x="4789225" y="993250"/>
+            <a:ext cx="4117500" cy="3702900"/>
+          </a:xfrm>
+          <a:prstGeom prst="rect">
+            <a:avLst/>
+          </a:prstGeom>
+          <a:noFill/>
+          <a:ln>
+            <a:noFill/>
+          </a:ln>
+        </p:spPr>
+        <p:txBody>
+          <a:bodyPr anchorCtr="0" anchor="t" bIns="91425" lIns="91425" spcFirstLastPara="1" rIns="91425" wrap="square" tIns="91425">
+            <a:noAutofit/>
+          </a:bodyPr>
+          <a:lstStyle/>
+          <a:p>
+            <a:pPr indent="-323850" lvl="0" marL="457200" rtl="0" algn="l">
+              <a:lnSpc>
+                <a:spcPct val="115000"/>
+              </a:lnSpc>
+              <a:spcBef>
+                <a:spcPts val="0"/>
+              </a:spcBef>
+              <a:spcAft>
+                <a:spcPts val="0"/>
+              </a:spcAft>
+              <a:buClr>
+                <a:schemeClr val="dk1"/>
+              </a:buClr>
+              <a:buSzPts val="1500"/>
+              <a:buChar char="-"/>
+            </a:pPr>
+            <a:r>
+              <a:rPr lang="en" sz="1500">
+                <a:solidFill>
+                  <a:schemeClr val="dk1"/>
+                </a:solidFill>
+              </a:rPr>
+              <a:t>Regions show to have a pattern in how much they spend</a:t>
+            </a:r>
+            <a:endParaRPr sz="1500">
+              <a:solidFill>
+                <a:schemeClr val="dk1"/>
+              </a:solidFill>
+            </a:endParaRPr>
+          </a:p>
+          <a:p>
+            <a:pPr indent="-323850" lvl="0" marL="457200" rtl="0" algn="l">
+              <a:lnSpc>
+                <a:spcPct val="115000"/>
+              </a:lnSpc>
+              <a:spcBef>
+                <a:spcPts val="0"/>
+              </a:spcBef>
+              <a:spcAft>
+                <a:spcPts val="0"/>
+              </a:spcAft>
+              <a:buClr>
+                <a:schemeClr val="dk1"/>
+              </a:buClr>
+              <a:buSzPts val="1500"/>
+              <a:buChar char="-"/>
+            </a:pPr>
+            <a:r>
+              <a:rPr lang="en" sz="1500">
+                <a:solidFill>
+                  <a:schemeClr val="dk1"/>
+                </a:solidFill>
+              </a:rPr>
+              <a:t>East and North regions have a sharp decrease in transaction when the transaction amount is 1000+</a:t>
+            </a:r>
+            <a:endParaRPr sz="1500">
+              <a:solidFill>
+                <a:schemeClr val="dk1"/>
+              </a:solidFill>
+            </a:endParaRPr>
+          </a:p>
+          <a:p>
+            <a:pPr indent="-323850" lvl="0" marL="457200" rtl="0" algn="l">
+              <a:lnSpc>
+                <a:spcPct val="115000"/>
+              </a:lnSpc>
+              <a:spcBef>
+                <a:spcPts val="0"/>
+              </a:spcBef>
+              <a:spcAft>
+                <a:spcPts val="0"/>
+              </a:spcAft>
+              <a:buClr>
+                <a:schemeClr val="dk1"/>
+              </a:buClr>
+              <a:buSzPts val="1500"/>
+              <a:buChar char="-"/>
+            </a:pPr>
+            <a:r>
+              <a:rPr lang="en" sz="1500">
+                <a:solidFill>
+                  <a:schemeClr val="dk1"/>
+                </a:solidFill>
+              </a:rPr>
+              <a:t>West have a sharp decrease in transactions when the amount is 2000+</a:t>
+            </a:r>
+            <a:endParaRPr sz="1500">
+              <a:solidFill>
+                <a:schemeClr val="dk1"/>
+              </a:solidFill>
+            </a:endParaRPr>
+          </a:p>
+          <a:p>
+            <a:pPr indent="-323850" lvl="0" marL="457200" rtl="0" algn="l">
+              <a:lnSpc>
+                <a:spcPct val="115000"/>
+              </a:lnSpc>
+              <a:spcBef>
+                <a:spcPts val="0"/>
+              </a:spcBef>
+              <a:spcAft>
+                <a:spcPts val="0"/>
+              </a:spcAft>
+              <a:buClr>
+                <a:schemeClr val="dk1"/>
+              </a:buClr>
+              <a:buSzPts val="1500"/>
+              <a:buChar char="-"/>
+            </a:pPr>
+            <a:r>
+              <a:rPr lang="en" sz="1500">
+                <a:solidFill>
+                  <a:schemeClr val="dk1"/>
+                </a:solidFill>
+              </a:rPr>
+              <a:t>South does not have any transactions above 500</a:t>
+            </a:r>
+            <a:endParaRPr sz="1500">
+              <a:solidFill>
+                <a:schemeClr val="dk1"/>
+              </a:solidFill>
+            </a:endParaRPr>
+          </a:p>
+          <a:p>
+            <a:pPr indent="-323850" lvl="0" marL="457200" rtl="0" algn="l">
+              <a:lnSpc>
+                <a:spcPct val="115000"/>
+              </a:lnSpc>
+              <a:spcBef>
+                <a:spcPts val="0"/>
+              </a:spcBef>
+              <a:spcAft>
+                <a:spcPts val="0"/>
+              </a:spcAft>
+              <a:buClr>
+                <a:schemeClr val="dk1"/>
+              </a:buClr>
+              <a:buSzPts val="1500"/>
+              <a:buChar char="-"/>
+            </a:pPr>
+            <a:r>
+              <a:rPr lang="en" sz="1500">
+                <a:solidFill>
+                  <a:schemeClr val="dk1"/>
+                </a:solidFill>
+              </a:rPr>
+              <a:t>Western consumers spend the most on the average transaction</a:t>
+            </a:r>
+            <a:endParaRPr sz="1500">
+              <a:solidFill>
+                <a:schemeClr val="dk1"/>
+              </a:solidFill>
+            </a:endParaRPr>
+          </a:p>
+          <a:p>
+            <a:pPr indent="-323850" lvl="0" marL="457200" rtl="0" algn="l">
+              <a:lnSpc>
+                <a:spcPct val="115000"/>
+              </a:lnSpc>
+              <a:spcBef>
+                <a:spcPts val="0"/>
+              </a:spcBef>
+              <a:spcAft>
+                <a:spcPts val="0"/>
+              </a:spcAft>
+              <a:buClr>
+                <a:schemeClr val="dk1"/>
+              </a:buClr>
+              <a:buSzPts val="1500"/>
+              <a:buChar char="-"/>
+            </a:pPr>
+            <a:r>
+              <a:rPr lang="en" sz="1500">
+                <a:solidFill>
+                  <a:schemeClr val="dk1"/>
+                </a:solidFill>
+              </a:rPr>
+              <a:t>Southern consumers spend the least on the average transaction</a:t>
+            </a:r>
+            <a:endParaRPr sz="1500">
+              <a:solidFill>
+                <a:schemeClr val="dk1"/>
+              </a:solidFill>
+            </a:endParaRPr>
+          </a:p>
+        </p:txBody>
+      </p:sp>
     </p:spTree>
   </p:cSld>
   <p:clrMapOvr>
@@ -8083,7 +7788,7 @@
   <p:cSld>
     <p:spTree>
       <p:nvGrpSpPr>
-        <p:cNvPr id="84" name="Shape 84"/>
+        <p:cNvPr id="86" name="Shape 86"/>
         <p:cNvGrpSpPr/>
         <p:nvPr/>
       </p:nvGrpSpPr>
@@ -8097,7 +7802,7 @@
       </p:grpSpPr>
       <p:sp>
         <p:nvSpPr>
-          <p:cNvPr id="85" name="Google Shape;85;p18"/>
+          <p:cNvPr id="87" name="Google Shape;87;p18"/>
           <p:cNvSpPr txBox="1"/>
           <p:nvPr>
             <p:ph type="title"/>
@@ -8105,7 +7810,7 @@
         </p:nvSpPr>
         <p:spPr>
           <a:xfrm>
-            <a:off x="418275" y="413075"/>
+            <a:off x="418275" y="317100"/>
             <a:ext cx="8520600" cy="572700"/>
           </a:xfrm>
           <a:prstGeom prst="rect">
@@ -8128,16 +7833,16 @@
               <a:buNone/>
             </a:pPr>
             <a:r>
-              <a:rPr lang="en"/>
-              <a:t>Line Plot: Average Amount Spent per Age</a:t>
+              <a:rPr lang="en" sz="2600"/>
+              <a:t>Transactions w/ X Items</a:t>
             </a:r>
-            <a:endParaRPr/>
+            <a:endParaRPr sz="2600"/>
           </a:p>
         </p:txBody>
       </p:sp>
       <p:pic>
         <p:nvPicPr>
-          <p:cNvPr id="86" name="Google Shape;86;p18"/>
+          <p:cNvPr id="88" name="Google Shape;88;p18"/>
           <p:cNvPicPr preferRelativeResize="0"/>
           <p:nvPr/>
         </p:nvPicPr>
@@ -8151,8 +7856,168 @@
         </p:blipFill>
         <p:spPr>
           <a:xfrm>
-            <a:off x="311700" y="1349660"/>
-            <a:ext cx="8520599" cy="2893440"/>
+            <a:off x="418275" y="1046400"/>
+            <a:ext cx="2505224" cy="1680110"/>
+          </a:xfrm>
+          <a:prstGeom prst="rect">
+            <a:avLst/>
+          </a:prstGeom>
+          <a:noFill/>
+          <a:ln>
+            <a:noFill/>
+          </a:ln>
+        </p:spPr>
+      </p:pic>
+      <p:pic>
+        <p:nvPicPr>
+          <p:cNvPr id="89" name="Google Shape;89;p18"/>
+          <p:cNvPicPr preferRelativeResize="0"/>
+          <p:nvPr/>
+        </p:nvPicPr>
+        <p:blipFill>
+          <a:blip r:embed="rId4">
+            <a:alphaModFix/>
+          </a:blip>
+          <a:stretch>
+            <a:fillRect/>
+          </a:stretch>
+        </p:blipFill>
+        <p:spPr>
+          <a:xfrm>
+            <a:off x="418275" y="2793065"/>
+            <a:ext cx="2505225" cy="1993485"/>
+          </a:xfrm>
+          <a:prstGeom prst="rect">
+            <a:avLst/>
+          </a:prstGeom>
+          <a:noFill/>
+          <a:ln>
+            <a:noFill/>
+          </a:ln>
+        </p:spPr>
+      </p:pic>
+      <p:sp>
+        <p:nvSpPr>
+          <p:cNvPr id="90" name="Google Shape;90;p18"/>
+          <p:cNvSpPr txBox="1"/>
+          <p:nvPr/>
+        </p:nvSpPr>
+        <p:spPr>
+          <a:xfrm>
+            <a:off x="3139275" y="1046400"/>
+            <a:ext cx="5799600" cy="3740100"/>
+          </a:xfrm>
+          <a:prstGeom prst="rect">
+            <a:avLst/>
+          </a:prstGeom>
+          <a:noFill/>
+          <a:ln>
+            <a:noFill/>
+          </a:ln>
+        </p:spPr>
+        <p:txBody>
+          <a:bodyPr anchorCtr="0" anchor="t" bIns="91425" lIns="91425" spcFirstLastPara="1" rIns="91425" wrap="square" tIns="91425">
+            <a:noAutofit/>
+          </a:bodyPr>
+          <a:lstStyle/>
+          <a:p>
+            <a:pPr indent="-336550" lvl="0" marL="457200" rtl="0" algn="l">
+              <a:lnSpc>
+                <a:spcPct val="115000"/>
+              </a:lnSpc>
+              <a:spcBef>
+                <a:spcPts val="0"/>
+              </a:spcBef>
+              <a:spcAft>
+                <a:spcPts val="0"/>
+              </a:spcAft>
+              <a:buClr>
+                <a:schemeClr val="dk1"/>
+              </a:buClr>
+              <a:buSzPts val="1700"/>
+              <a:buChar char="-"/>
+            </a:pPr>
+            <a:r>
+              <a:rPr lang="en" sz="1700">
+                <a:solidFill>
+                  <a:schemeClr val="dk1"/>
+                </a:solidFill>
+              </a:rPr>
+              <a:t>Average of amounts in transactions with different items are very close together and do not show a positive or negative relationship with the # of items in the transaction</a:t>
+            </a:r>
+            <a:endParaRPr sz="1700">
+              <a:solidFill>
+                <a:schemeClr val="dk1"/>
+              </a:solidFill>
+            </a:endParaRPr>
+          </a:p>
+          <a:p>
+            <a:pPr indent="-336550" lvl="0" marL="457200" rtl="0" algn="l">
+              <a:lnSpc>
+                <a:spcPct val="115000"/>
+              </a:lnSpc>
+              <a:spcBef>
+                <a:spcPts val="0"/>
+              </a:spcBef>
+              <a:spcAft>
+                <a:spcPts val="0"/>
+              </a:spcAft>
+              <a:buClr>
+                <a:schemeClr val="dk1"/>
+              </a:buClr>
+              <a:buSzPts val="1700"/>
+              <a:buChar char="-"/>
+            </a:pPr>
+            <a:r>
+              <a:rPr lang="en" sz="1700">
+                <a:solidFill>
+                  <a:schemeClr val="dk1"/>
+                </a:solidFill>
+              </a:rPr>
+              <a:t>In the box plot, their quadrants are very similar and does not have a </a:t>
+            </a:r>
+            <a:r>
+              <a:rPr lang="en" sz="1700">
+                <a:solidFill>
+                  <a:schemeClr val="dk1"/>
+                </a:solidFill>
+              </a:rPr>
+              <a:t>correlation</a:t>
+            </a:r>
+            <a:r>
+              <a:rPr lang="en" sz="1700">
+                <a:solidFill>
+                  <a:schemeClr val="dk1"/>
+                </a:solidFill>
+              </a:rPr>
+              <a:t> between # of items and amount.</a:t>
+            </a:r>
+            <a:endParaRPr sz="1700">
+              <a:solidFill>
+                <a:schemeClr val="dk1"/>
+              </a:solidFill>
+            </a:endParaRPr>
+          </a:p>
+        </p:txBody>
+      </p:sp>
+      <p:pic>
+        <p:nvPicPr>
+          <p:cNvPr id="91" name="Google Shape;91;p18"/>
+          <p:cNvPicPr preferRelativeResize="0"/>
+          <p:nvPr/>
+        </p:nvPicPr>
+        <p:blipFill>
+          <a:blip r:embed="rId5">
+            <a:alphaModFix/>
+          </a:blip>
+          <a:stretch>
+            <a:fillRect/>
+          </a:stretch>
+        </p:blipFill>
+        <p:spPr>
+          <a:xfrm>
+            <a:off x="3966251" y="3217875"/>
+            <a:ext cx="4262649" cy="1680100"/>
           </a:xfrm>
           <a:prstGeom prst="rect">
             <a:avLst/>
@@ -8176,7 +8041,7 @@
   <p:cSld>
     <p:spTree>
       <p:nvGrpSpPr>
-        <p:cNvPr id="90" name="Shape 90"/>
+        <p:cNvPr id="95" name="Shape 95"/>
         <p:cNvGrpSpPr/>
         <p:nvPr/>
       </p:nvGrpSpPr>
@@ -8190,100 +8055,7 @@
       </p:grpSpPr>
       <p:sp>
         <p:nvSpPr>
-          <p:cNvPr id="91" name="Google Shape;91;p19"/>
-          <p:cNvSpPr txBox="1"/>
-          <p:nvPr>
-            <p:ph type="title"/>
-          </p:nvPr>
-        </p:nvSpPr>
-        <p:spPr>
-          <a:xfrm>
-            <a:off x="311700" y="379600"/>
-            <a:ext cx="8520600" cy="572700"/>
-          </a:xfrm>
-          <a:prstGeom prst="rect">
-            <a:avLst/>
-          </a:prstGeom>
-        </p:spPr>
-        <p:txBody>
-          <a:bodyPr anchorCtr="0" anchor="t" bIns="91425" lIns="91425" spcFirstLastPara="1" rIns="91425" wrap="square" tIns="91425">
-            <a:noAutofit/>
-          </a:bodyPr>
-          <a:lstStyle/>
-          <a:p>
-            <a:pPr indent="0" lvl="0" marL="0" rtl="0" algn="l">
-              <a:spcBef>
-                <a:spcPts val="0"/>
-              </a:spcBef>
-              <a:spcAft>
-                <a:spcPts val="0"/>
-              </a:spcAft>
-              <a:buNone/>
-            </a:pPr>
-            <a:r>
-              <a:rPr lang="en"/>
-              <a:t>Scatter Plots: Amount vs. Age for each Region</a:t>
-            </a:r>
-            <a:endParaRPr/>
-          </a:p>
-        </p:txBody>
-      </p:sp>
-      <p:pic>
-        <p:nvPicPr>
-          <p:cNvPr id="92" name="Google Shape;92;p19"/>
-          <p:cNvPicPr preferRelativeResize="0"/>
-          <p:nvPr/>
-        </p:nvPicPr>
-        <p:blipFill>
-          <a:blip r:embed="rId3">
-            <a:alphaModFix/>
-          </a:blip>
-          <a:stretch>
-            <a:fillRect/>
-          </a:stretch>
-        </p:blipFill>
-        <p:spPr>
-          <a:xfrm>
-            <a:off x="561113" y="1376624"/>
-            <a:ext cx="8021773" cy="2390249"/>
-          </a:xfrm>
-          <a:prstGeom prst="rect">
-            <a:avLst/>
-          </a:prstGeom>
-          <a:noFill/>
-          <a:ln>
-            <a:noFill/>
-          </a:ln>
-        </p:spPr>
-      </p:pic>
-    </p:spTree>
-  </p:cSld>
-  <p:clrMapOvr>
-    <a:masterClrMapping/>
-  </p:clrMapOvr>
-</p:sld>
-</file>
-
-<file path=ppt/slides/slide8.xml><?xml version="1.0" encoding="utf-8"?>
-<p:sld xmlns:a="http://schemas.openxmlformats.org/drawingml/2006/main" xmlns:r="http://schemas.openxmlformats.org/officeDocument/2006/relationships" xmlns:mc="http://schemas.openxmlformats.org/markup-compatibility/2006" xmlns:mv="urn:schemas-microsoft-com:mac:vml" xmlns:p="http://schemas.openxmlformats.org/presentationml/2006/main" xmlns:c="http://schemas.openxmlformats.org/drawingml/2006/chart" xmlns:dgm="http://schemas.openxmlformats.org/drawingml/2006/diagram" xmlns:o="urn:schemas-microsoft-com:office:office" xmlns:v="urn:schemas-microsoft-com:vml" xmlns:pvml="urn:schemas-microsoft-com:office:powerpoint" xmlns:com="http://schemas.openxmlformats.org/drawingml/2006/compatibility" xmlns:p14="http://schemas.microsoft.com/office/powerpoint/2010/main" xmlns:p15="http://schemas.microsoft.com/office/powerpoint/2012/main" xmlns:ahyp="http://schemas.microsoft.com/office/drawing/2018/hyperlinkcolor">
-  <p:cSld>
-    <p:spTree>
-      <p:nvGrpSpPr>
-        <p:cNvPr id="96" name="Shape 96"/>
-        <p:cNvGrpSpPr/>
-        <p:nvPr/>
-      </p:nvGrpSpPr>
-      <p:grpSpPr>
-        <a:xfrm>
-          <a:off x="0" y="0"/>
-          <a:ext cx="0" cy="0"/>
-          <a:chOff x="0" y="0"/>
-          <a:chExt cx="0" cy="0"/>
-        </a:xfrm>
-      </p:grpSpPr>
-      <p:sp>
-        <p:nvSpPr>
-          <p:cNvPr id="97" name="Google Shape;97;p20"/>
+          <p:cNvPr id="96" name="Google Shape;96;p19"/>
           <p:cNvSpPr txBox="1"/>
           <p:nvPr>
             <p:ph type="title"/>
@@ -8315,7 +8087,7 @@
             </a:pPr>
             <a:r>
               <a:rPr lang="en"/>
-              <a:t>Implications</a:t>
+              <a:t>Other Findings</a:t>
             </a:r>
             <a:endParaRPr/>
           </a:p>
@@ -8323,7 +8095,7 @@
       </p:sp>
       <p:sp>
         <p:nvSpPr>
-          <p:cNvPr id="98" name="Google Shape;98;p20"/>
+          <p:cNvPr id="97" name="Google Shape;97;p19"/>
           <p:cNvSpPr txBox="1"/>
           <p:nvPr>
             <p:ph idx="1" type="body"/>
@@ -8331,7 +8103,7 @@
         </p:nvSpPr>
         <p:spPr>
           <a:xfrm>
-            <a:off x="311700" y="1152475"/>
+            <a:off x="311700" y="1081625"/>
             <a:ext cx="8520600" cy="3416400"/>
           </a:xfrm>
           <a:prstGeom prst="rect">
@@ -8352,7 +8124,7 @@
                 <a:spcPts val="0"/>
               </a:spcAft>
               <a:buClr>
-                <a:srgbClr val="FFFFFF"/>
+                <a:schemeClr val="dk1"/>
               </a:buClr>
               <a:buSzPts val="1800"/>
               <a:buChar char="-"/>
@@ -8360,210 +8132,14 @@
             <a:r>
               <a:rPr lang="en">
                 <a:solidFill>
-                  <a:srgbClr val="FFFFFF"/>
+                  <a:schemeClr val="dk1"/>
                 </a:solidFill>
               </a:rPr>
-              <a:t>Regions show to have a pattern in how much they spend</a:t>
+              <a:t>Age vs. Amount in each region</a:t>
             </a:r>
             <a:endParaRPr>
               <a:solidFill>
-                <a:srgbClr val="FFFFFF"/>
-              </a:solidFill>
-            </a:endParaRPr>
-          </a:p>
-          <a:p>
-            <a:pPr indent="-342900" lvl="0" marL="457200" rtl="0" algn="l">
-              <a:spcBef>
-                <a:spcPts val="0"/>
-              </a:spcBef>
-              <a:spcAft>
-                <a:spcPts val="0"/>
-              </a:spcAft>
-              <a:buClr>
-                <a:srgbClr val="FFFFFF"/>
-              </a:buClr>
-              <a:buSzPts val="1800"/>
-              <a:buChar char="-"/>
-            </a:pPr>
-            <a:r>
-              <a:rPr lang="en">
-                <a:solidFill>
-                  <a:srgbClr val="FFFFFF"/>
-                </a:solidFill>
-              </a:rPr>
-              <a:t>Ages in each regions seem to have a pattern on how they individually spend</a:t>
-            </a:r>
-            <a:endParaRPr>
-              <a:solidFill>
-                <a:srgbClr val="FFFFFF"/>
-              </a:solidFill>
-            </a:endParaRPr>
-          </a:p>
-          <a:p>
-            <a:pPr indent="-342900" lvl="0" marL="457200" rtl="0" algn="l">
-              <a:spcBef>
-                <a:spcPts val="0"/>
-              </a:spcBef>
-              <a:spcAft>
-                <a:spcPts val="0"/>
-              </a:spcAft>
-              <a:buClr>
-                <a:srgbClr val="FFFFFF"/>
-              </a:buClr>
-              <a:buSzPts val="1800"/>
-              <a:buChar char="-"/>
-            </a:pPr>
-            <a:r>
-              <a:rPr lang="en">
-                <a:solidFill>
-                  <a:srgbClr val="FFFFFF"/>
-                </a:solidFill>
-              </a:rPr>
-              <a:t>West spends the most overall on the average transaction</a:t>
-            </a:r>
-            <a:endParaRPr>
-              <a:solidFill>
-                <a:srgbClr val="FFFFFF"/>
-              </a:solidFill>
-            </a:endParaRPr>
-          </a:p>
-          <a:p>
-            <a:pPr indent="-342900" lvl="0" marL="457200" rtl="0" algn="l">
-              <a:spcBef>
-                <a:spcPts val="0"/>
-              </a:spcBef>
-              <a:spcAft>
-                <a:spcPts val="0"/>
-              </a:spcAft>
-              <a:buClr>
-                <a:srgbClr val="FFFFFF"/>
-              </a:buClr>
-              <a:buSzPts val="1800"/>
-              <a:buChar char="-"/>
-            </a:pPr>
-            <a:r>
-              <a:rPr lang="en">
-                <a:solidFill>
-                  <a:srgbClr val="FFFFFF"/>
-                </a:solidFill>
-              </a:rPr>
-              <a:t>South does seems to have very spread out transactions</a:t>
-            </a:r>
-            <a:endParaRPr>
-              <a:solidFill>
-                <a:srgbClr val="FFFFFF"/>
-              </a:solidFill>
-            </a:endParaRPr>
-          </a:p>
-          <a:p>
-            <a:pPr indent="-342900" lvl="0" marL="457200" rtl="0" algn="l">
-              <a:spcBef>
-                <a:spcPts val="0"/>
-              </a:spcBef>
-              <a:spcAft>
-                <a:spcPts val="0"/>
-              </a:spcAft>
-              <a:buClr>
-                <a:srgbClr val="FFFFFF"/>
-              </a:buClr>
-              <a:buSzPts val="1800"/>
-              <a:buChar char="-"/>
-            </a:pPr>
-            <a:r>
-              <a:rPr lang="en">
-                <a:solidFill>
-                  <a:srgbClr val="FFFFFF"/>
-                </a:solidFill>
-              </a:rPr>
-              <a:t>North and East have a sharp cliff of transactions after the amounts are greater than 1000</a:t>
-            </a:r>
-            <a:endParaRPr>
-              <a:solidFill>
-                <a:srgbClr val="FFFFFF"/>
-              </a:solidFill>
-            </a:endParaRPr>
-          </a:p>
-          <a:p>
-            <a:pPr indent="-317500" lvl="1" marL="914400" rtl="0" algn="l">
-              <a:spcBef>
-                <a:spcPts val="0"/>
-              </a:spcBef>
-              <a:spcAft>
-                <a:spcPts val="0"/>
-              </a:spcAft>
-              <a:buClr>
-                <a:srgbClr val="FFFFFF"/>
-              </a:buClr>
-              <a:buSzPts val="1400"/>
-              <a:buChar char="-"/>
-            </a:pPr>
-            <a:r>
-              <a:rPr lang="en">
-                <a:solidFill>
-                  <a:srgbClr val="FFFFFF"/>
-                </a:solidFill>
-              </a:rPr>
-              <a:t>Most likely due to the 60+ years old customers do not make transactions &gt; 1000 in these regions</a:t>
-            </a:r>
-            <a:endParaRPr>
-              <a:solidFill>
-                <a:srgbClr val="FFFFFF"/>
-              </a:solidFill>
-            </a:endParaRPr>
-          </a:p>
-          <a:p>
-            <a:pPr indent="-342900" lvl="0" marL="457200" rtl="0" algn="l">
-              <a:spcBef>
-                <a:spcPts val="0"/>
-              </a:spcBef>
-              <a:spcAft>
-                <a:spcPts val="0"/>
-              </a:spcAft>
-              <a:buClr>
-                <a:srgbClr val="FFFFFF"/>
-              </a:buClr>
-              <a:buSzPts val="1800"/>
-              <a:buChar char="-"/>
-            </a:pPr>
-            <a:r>
-              <a:rPr lang="en">
-                <a:solidFill>
-                  <a:srgbClr val="FFFFFF"/>
-                </a:solidFill>
-              </a:rPr>
-              <a:t>West has a similar cliff of transaction after the amounts are greater than 2000</a:t>
-            </a:r>
-            <a:endParaRPr>
-              <a:solidFill>
-                <a:srgbClr val="FFFFFF"/>
-              </a:solidFill>
-            </a:endParaRPr>
-          </a:p>
-          <a:p>
-            <a:pPr indent="-317500" lvl="1" marL="914400" rtl="0" algn="l">
-              <a:spcBef>
-                <a:spcPts val="0"/>
-              </a:spcBef>
-              <a:spcAft>
-                <a:spcPts val="0"/>
-              </a:spcAft>
-              <a:buClr>
-                <a:srgbClr val="FFFFFF"/>
-              </a:buClr>
-              <a:buSzPts val="1400"/>
-              <a:buChar char="-"/>
-            </a:pPr>
-            <a:r>
-              <a:rPr lang="en">
-                <a:solidFill>
-                  <a:srgbClr val="FFFFFF"/>
-                </a:solidFill>
-              </a:rPr>
-              <a:t>Does not have a spending pattern with age or amount</a:t>
-            </a:r>
-            <a:endParaRPr>
-              <a:solidFill>
-                <a:srgbClr val="FFFFFF"/>
+                <a:schemeClr val="dk1"/>
               </a:solidFill>
             </a:endParaRPr>
           </a:p>
@@ -8577,12 +8153,12 @@
 </p:sld>
 </file>
 
-<file path=ppt/slides/slide9.xml><?xml version="1.0" encoding="utf-8"?>
+<file path=ppt/slides/slide8.xml><?xml version="1.0" encoding="utf-8"?>
 <p:sld xmlns:a="http://schemas.openxmlformats.org/drawingml/2006/main" xmlns:r="http://schemas.openxmlformats.org/officeDocument/2006/relationships" xmlns:mc="http://schemas.openxmlformats.org/markup-compatibility/2006" xmlns:mv="urn:schemas-microsoft-com:mac:vml" xmlns:p="http://schemas.openxmlformats.org/presentationml/2006/main" xmlns:c="http://schemas.openxmlformats.org/drawingml/2006/chart" xmlns:dgm="http://schemas.openxmlformats.org/drawingml/2006/diagram" xmlns:o="urn:schemas-microsoft-com:office:office" xmlns:v="urn:schemas-microsoft-com:vml" xmlns:pvml="urn:schemas-microsoft-com:office:powerpoint" xmlns:com="http://schemas.openxmlformats.org/drawingml/2006/compatibility" xmlns:p14="http://schemas.microsoft.com/office/powerpoint/2010/main" xmlns:p15="http://schemas.microsoft.com/office/powerpoint/2012/main" xmlns:ahyp="http://schemas.microsoft.com/office/drawing/2018/hyperlinkcolor">
   <p:cSld>
     <p:spTree>
       <p:nvGrpSpPr>
-        <p:cNvPr id="102" name="Shape 102"/>
+        <p:cNvPr id="101" name="Shape 101"/>
         <p:cNvGrpSpPr/>
         <p:nvPr/>
       </p:nvGrpSpPr>
@@ -8596,7 +8172,7 @@
       </p:grpSpPr>
       <p:sp>
         <p:nvSpPr>
-          <p:cNvPr id="103" name="Google Shape;103;p21"/>
+          <p:cNvPr id="102" name="Google Shape;102;p20"/>
           <p:cNvSpPr txBox="1"/>
           <p:nvPr>
             <p:ph type="title"/>
@@ -8604,8 +8180,8 @@
         </p:nvSpPr>
         <p:spPr>
           <a:xfrm>
-            <a:off x="311700" y="232375"/>
-            <a:ext cx="8520600" cy="1015800"/>
+            <a:off x="311700" y="188625"/>
+            <a:ext cx="8520600" cy="572700"/>
           </a:xfrm>
           <a:prstGeom prst="rect">
             <a:avLst/>
@@ -8628,59 +8204,86 @@
             </a:pPr>
             <a:r>
               <a:rPr lang="en"/>
-              <a:t>Analysis:</a:t>
-            </a:r>
-            <a:endParaRPr/>
-          </a:p>
-          <a:p>
-            <a:pPr indent="0" lvl="0" marL="0" rtl="0" algn="l">
-              <a:spcBef>
-                <a:spcPts val="0"/>
-              </a:spcBef>
-              <a:spcAft>
-                <a:spcPts val="0"/>
-              </a:spcAft>
-              <a:buNone/>
-            </a:pPr>
-            <a:r>
-              <a:rPr lang="en" sz="2100"/>
-              <a:t>Relationship between # of items and amount</a:t>
-            </a:r>
-            <a:endParaRPr sz="2100"/>
-          </a:p>
-          <a:p>
-            <a:pPr indent="0" lvl="0" marL="0" rtl="0" algn="l">
-              <a:spcBef>
-                <a:spcPts val="0"/>
-              </a:spcBef>
-              <a:spcAft>
-                <a:spcPts val="0"/>
-              </a:spcAft>
-              <a:buNone/>
-            </a:pPr>
-            <a:r>
-              <a:t/>
+              <a:t>Amount Spent per Age</a:t>
             </a:r>
             <a:endParaRPr/>
           </a:p>
         </p:txBody>
       </p:sp>
-      <p:sp>
-        <p:nvSpPr>
-          <p:cNvPr id="104" name="Google Shape;104;p21"/>
-          <p:cNvSpPr txBox="1"/>
-          <p:nvPr>
-            <p:ph idx="1" type="body"/>
-          </p:nvPr>
-        </p:nvSpPr>
+      <p:pic>
+        <p:nvPicPr>
+          <p:cNvPr id="103" name="Google Shape;103;p20"/>
+          <p:cNvPicPr preferRelativeResize="0"/>
+          <p:nvPr/>
+        </p:nvPicPr>
+        <p:blipFill>
+          <a:blip r:embed="rId3">
+            <a:alphaModFix/>
+          </a:blip>
+          <a:stretch>
+            <a:fillRect/>
+          </a:stretch>
+        </p:blipFill>
         <p:spPr>
           <a:xfrm>
-            <a:off x="311700" y="1346250"/>
-            <a:ext cx="8520600" cy="3222600"/>
+            <a:off x="323750" y="1068475"/>
+            <a:ext cx="4337848" cy="1689187"/>
           </a:xfrm>
           <a:prstGeom prst="rect">
             <a:avLst/>
           </a:prstGeom>
+          <a:noFill/>
+          <a:ln>
+            <a:noFill/>
+          </a:ln>
+        </p:spPr>
+      </p:pic>
+      <p:pic>
+        <p:nvPicPr>
+          <p:cNvPr id="104" name="Google Shape;104;p20"/>
+          <p:cNvPicPr preferRelativeResize="0"/>
+          <p:nvPr/>
+        </p:nvPicPr>
+        <p:blipFill>
+          <a:blip r:embed="rId4">
+            <a:alphaModFix/>
+          </a:blip>
+          <a:stretch>
+            <a:fillRect/>
+          </a:stretch>
+        </p:blipFill>
+        <p:spPr>
+          <a:xfrm>
+            <a:off x="323750" y="2781887"/>
+            <a:ext cx="4337852" cy="1689188"/>
+          </a:xfrm>
+          <a:prstGeom prst="rect">
+            <a:avLst/>
+          </a:prstGeom>
+          <a:noFill/>
+          <a:ln>
+            <a:noFill/>
+          </a:ln>
+        </p:spPr>
+      </p:pic>
+      <p:sp>
+        <p:nvSpPr>
+          <p:cNvPr id="105" name="Google Shape;105;p20"/>
+          <p:cNvSpPr txBox="1"/>
+          <p:nvPr/>
+        </p:nvSpPr>
+        <p:spPr>
+          <a:xfrm>
+            <a:off x="4815175" y="993250"/>
+            <a:ext cx="4091700" cy="3402600"/>
+          </a:xfrm>
+          <a:prstGeom prst="rect">
+            <a:avLst/>
+          </a:prstGeom>
+          <a:noFill/>
+          <a:ln>
+            <a:noFill/>
+          </a:ln>
         </p:spPr>
         <p:txBody>
           <a:bodyPr anchorCtr="0" anchor="t" bIns="91425" lIns="91425" spcFirstLastPara="1" rIns="91425" wrap="square" tIns="91425">
@@ -8688,7 +8291,10 @@
           </a:bodyPr>
           <a:lstStyle/>
           <a:p>
-            <a:pPr indent="-368300" lvl="0" marL="457200" rtl="0" algn="l">
+            <a:pPr indent="-336550" lvl="0" marL="457200" rtl="0" algn="l">
+              <a:lnSpc>
+                <a:spcPct val="115000"/>
+              </a:lnSpc>
               <a:spcBef>
                 <a:spcPts val="0"/>
               </a:spcBef>
@@ -8696,27 +8302,30 @@
                 <a:spcPts val="0"/>
               </a:spcAft>
               <a:buClr>
-                <a:srgbClr val="FFFFFF"/>
+                <a:schemeClr val="dk1"/>
               </a:buClr>
-              <a:buSzPts val="2200"/>
+              <a:buSzPts val="1700"/>
               <a:buChar char="-"/>
             </a:pPr>
             <a:r>
-              <a:rPr lang="en" sz="2200">
+              <a:rPr lang="en" sz="1700">
                 <a:solidFill>
-                  <a:srgbClr val="FFFFFF"/>
+                  <a:schemeClr val="dk1"/>
                 </a:solidFill>
               </a:rPr>
-              <a:t>Bar Graph: Average Amount Cost for Transaction with X items</a:t>
+              <a:t>Regions show to have a pattern the transactions and their age</a:t>
             </a:r>
-            <a:endParaRPr sz="2200">
+            <a:endParaRPr sz="1700">
               <a:solidFill>
                 <a:schemeClr val="dk1"/>
               </a:solidFill>
             </a:endParaRPr>
           </a:p>
           <a:p>
-            <a:pPr indent="-368300" lvl="0" marL="457200" rtl="0" algn="l">
+            <a:pPr indent="-336550" lvl="0" marL="457200" rtl="0" algn="l">
+              <a:lnSpc>
+                <a:spcPct val="115000"/>
+              </a:lnSpc>
               <a:spcBef>
                 <a:spcPts val="0"/>
               </a:spcBef>
@@ -8724,22 +8333,53 @@
                 <a:spcPts val="0"/>
               </a:spcAft>
               <a:buClr>
-                <a:srgbClr val="FFFFFF"/>
+                <a:schemeClr val="dk1"/>
               </a:buClr>
-              <a:buSzPts val="2200"/>
+              <a:buSzPts val="1700"/>
               <a:buChar char="-"/>
             </a:pPr>
             <a:r>
-              <a:rPr lang="en" sz="2200">
+              <a:rPr lang="en" sz="1700">
                 <a:solidFill>
                   <a:schemeClr val="dk1"/>
                 </a:solidFill>
               </a:rPr>
-              <a:t>Box Plot: Amount per Transaction with X Items</a:t>
+              <a:t>Northern 55yrs.+ consumers do not spend more than 1000 in a transaction</a:t>
             </a:r>
-            <a:endParaRPr sz="2200">
+            <a:endParaRPr sz="1700">
               <a:solidFill>
-                <a:srgbClr val="FFFFFF"/>
+                <a:schemeClr val="dk1"/>
+              </a:solidFill>
+            </a:endParaRPr>
+          </a:p>
+          <a:p>
+            <a:pPr indent="-336550" lvl="0" marL="457200" rtl="0" algn="l">
+              <a:lnSpc>
+                <a:spcPct val="115000"/>
+              </a:lnSpc>
+              <a:spcBef>
+                <a:spcPts val="0"/>
+              </a:spcBef>
+              <a:spcAft>
+                <a:spcPts val="0"/>
+              </a:spcAft>
+              <a:buClr>
+                <a:schemeClr val="dk1"/>
+              </a:buClr>
+              <a:buSzPts val="1700"/>
+              <a:buChar char="-"/>
+            </a:pPr>
+            <a:r>
+              <a:rPr lang="en" sz="1700">
+                <a:solidFill>
+                  <a:schemeClr val="dk1"/>
+                </a:solidFill>
+              </a:rPr>
+              <a:t>Eastern 60yrs.+ consumers do not spend more than 1000 in a transaction</a:t>
+            </a:r>
+            <a:endParaRPr sz="1700">
+              <a:solidFill>
+                <a:schemeClr val="dk1"/>
               </a:solidFill>
             </a:endParaRPr>
           </a:p>
@@ -8754,6 +8394,285 @@
 </file>
 
 <file path=ppt/theme/theme1.xml><?xml version="1.0" encoding="utf-8"?>
+<a:theme xmlns:a="http://schemas.openxmlformats.org/drawingml/2006/main" xmlns:r="http://schemas.openxmlformats.org/officeDocument/2006/relationships">
+  <a:themeElements>
+    <a:clrScheme name="Default">
+      <a:dk1>
+        <a:srgbClr val="000000"/>
+      </a:dk1>
+      <a:lt1>
+        <a:srgbClr val="FFFFFF"/>
+      </a:lt1>
+      <a:dk2>
+        <a:srgbClr val="158158"/>
+      </a:dk2>
+      <a:lt2>
+        <a:srgbClr val="F3F3F3"/>
+      </a:lt2>
+      <a:accent1>
+        <a:srgbClr val="058DC7"/>
+      </a:accent1>
+      <a:accent2>
+        <a:srgbClr val="50B432"/>
+      </a:accent2>
+      <a:accent3>
+        <a:srgbClr val="ED561B"/>
+      </a:accent3>
+      <a:accent4>
+        <a:srgbClr val="EDEF00"/>
+      </a:accent4>
+      <a:accent5>
+        <a:srgbClr val="24CBE5"/>
+      </a:accent5>
+      <a:accent6>
+        <a:srgbClr val="64E572"/>
+      </a:accent6>
+      <a:hlink>
+        <a:srgbClr val="2200CC"/>
+      </a:hlink>
+      <a:folHlink>
+        <a:srgbClr val="551A8B"/>
+      </a:folHlink>
+    </a:clrScheme>
+    <a:fontScheme name="Office">
+      <a:majorFont>
+        <a:latin typeface="Arial"/>
+        <a:ea typeface=""/>
+        <a:cs typeface=""/>
+        <a:font script="Jpan" typeface="ＭＳ Ｐゴシック"/>
+        <a:font script="Hang" typeface="맑은 고딕"/>
+        <a:font script="Hans" typeface="宋体"/>
+        <a:font script="Hant" typeface="新細明體"/>
+        <a:font script="Arab" typeface="Times New Roman"/>
+        <a:font script="Hebr" typeface="Times New Roman"/>
+        <a:font script="Thai" typeface="Angsana New"/>
+        <a:font script="Ethi" typeface="Nyala"/>
+        <a:font script="Beng" typeface="Vrinda"/>
+        <a:font script="Gujr" typeface="Shruti"/>
+        <a:font script="Khmr" typeface="MoolBoran"/>
+        <a:font script="Knda" typeface="Tunga"/>
+        <a:font script="Guru" typeface="Raavi"/>
+        <a:font script="Cans" typeface="Euphemia"/>
+        <a:font script="Cher" typeface="Plantagenet Cherokee"/>
+        <a:font script="Yiii" typeface="Microsoft Yi Baiti"/>
+        <a:font script="Tibt" typeface="Microsoft Himalaya"/>
+        <a:font script="Thaa" typeface="MV Boli"/>
+        <a:font script="Deva" typeface="Mangal"/>
+        <a:font script="Telu" typeface="Gautami"/>
+        <a:font script="Taml" typeface="Latha"/>
+        <a:font script="Syrc" typeface="Estrangelo Edessa"/>
+        <a:font script="Orya" typeface="Kalinga"/>
+        <a:font script="Mlym" typeface="Kartika"/>
+        <a:font script="Laoo" typeface="DokChampa"/>
+        <a:font script="Sinh" typeface="Iskoola Pota"/>
+        <a:font script="Mong" typeface="Mongolian Baiti"/>
+        <a:font script="Viet" typeface="Times New Roman"/>
+        <a:font script="Uigh" typeface="Microsoft Uighur"/>
+        <a:font script="Geor" typeface="Sylfaen"/>
+      </a:majorFont>
+      <a:minorFont>
+        <a:latin typeface="Arial"/>
+        <a:ea typeface=""/>
+        <a:cs typeface=""/>
+        <a:font script="Jpan" typeface="ＭＳ Ｐゴシック"/>
+        <a:font script="Hang" typeface="맑은 고딕"/>
+        <a:font script="Hans" typeface="宋体"/>
+        <a:font script="Hant" typeface="新細明體"/>
+        <a:font script="Arab" typeface="Arial"/>
+        <a:font script="Hebr" typeface="Arial"/>
+        <a:font script="Thai" typeface="Cordia New"/>
+        <a:font script="Ethi" typeface="Nyala"/>
+        <a:font script="Beng" typeface="Vrinda"/>
+        <a:font script="Gujr" typeface="Shruti"/>
+        <a:font script="Khmr" typeface="DaunPenh"/>
+        <a:font script="Knda" typeface="Tunga"/>
+        <a:font script="Guru" typeface="Raavi"/>
+        <a:font script="Cans" typeface="Euphemia"/>
+        <a:font script="Cher" typeface="Plantagenet Cherokee"/>
+        <a:font script="Yiii" typeface="Microsoft Yi Baiti"/>
+        <a:font script="Tibt" typeface="Microsoft Himalaya"/>
+        <a:font script="Thaa" typeface="MV Boli"/>
+        <a:font script="Deva" typeface="Mangal"/>
+        <a:font script="Telu" typeface="Gautami"/>
+        <a:font script="Taml" typeface="Latha"/>
+        <a:font script="Syrc" typeface="Estrangelo Edessa"/>
+        <a:font script="Orya" typeface="Kalinga"/>
+        <a:font script="Mlym" typeface="Kartika"/>
+        <a:font script="Laoo" typeface="DokChampa"/>
+        <a:font script="Sinh" typeface="Iskoola Pota"/>
+        <a:font script="Mong" typeface="Mongolian Baiti"/>
+        <a:font script="Viet" typeface="Arial"/>
+        <a:font script="Uigh" typeface="Microsoft Uighur"/>
+        <a:font script="Geor" typeface="Sylfaen"/>
+      </a:minorFont>
+    </a:fontScheme>
+    <a:fmtScheme name="Office">
+      <a:fillStyleLst>
+        <a:solidFill>
+          <a:schemeClr val="phClr"/>
+        </a:solidFill>
+        <a:gradFill rotWithShape="1">
+          <a:gsLst>
+            <a:gs pos="0">
+              <a:schemeClr val="phClr">
+                <a:tint val="50000"/>
+                <a:satMod val="300000"/>
+              </a:schemeClr>
+            </a:gs>
+            <a:gs pos="35000">
+              <a:schemeClr val="phClr">
+                <a:tint val="37000"/>
+                <a:satMod val="300000"/>
+              </a:schemeClr>
+            </a:gs>
+            <a:gs pos="100000">
+              <a:schemeClr val="phClr">
+                <a:tint val="15000"/>
+                <a:satMod val="350000"/>
+              </a:schemeClr>
+            </a:gs>
+          </a:gsLst>
+          <a:lin ang="16200000" scaled="1"/>
+        </a:gradFill>
+        <a:gradFill rotWithShape="1">
+          <a:gsLst>
+            <a:gs pos="0">
+              <a:schemeClr val="phClr">
+                <a:tint val="100000"/>
+                <a:shade val="100000"/>
+                <a:satMod val="130000"/>
+              </a:schemeClr>
+            </a:gs>
+            <a:gs pos="100000">
+              <a:schemeClr val="phClr">
+                <a:tint val="50000"/>
+                <a:shade val="100000"/>
+                <a:satMod val="350000"/>
+              </a:schemeClr>
+            </a:gs>
+          </a:gsLst>
+          <a:lin ang="16200000" scaled="0"/>
+        </a:gradFill>
+      </a:fillStyleLst>
+      <a:lnStyleLst>
+        <a:ln w="9525" cap="flat" cmpd="sng" algn="ctr">
+          <a:solidFill>
+            <a:schemeClr val="phClr">
+              <a:shade val="95000"/>
+              <a:satMod val="105000"/>
+            </a:schemeClr>
+          </a:solidFill>
+          <a:prstDash val="solid"/>
+        </a:ln>
+        <a:ln w="25400" cap="flat" cmpd="sng" algn="ctr">
+          <a:solidFill>
+            <a:schemeClr val="phClr"/>
+          </a:solidFill>
+          <a:prstDash val="solid"/>
+        </a:ln>
+        <a:ln w="38100" cap="flat" cmpd="sng" algn="ctr">
+          <a:solidFill>
+            <a:schemeClr val="phClr"/>
+          </a:solidFill>
+          <a:prstDash val="solid"/>
+        </a:ln>
+      </a:lnStyleLst>
+      <a:effectStyleLst>
+        <a:effectStyle>
+          <a:effectLst>
+            <a:outerShdw blurRad="40000" dist="20000" dir="5400000" rotWithShape="0">
+              <a:srgbClr val="000000">
+                <a:alpha val="38000"/>
+              </a:srgbClr>
+            </a:outerShdw>
+          </a:effectLst>
+        </a:effectStyle>
+        <a:effectStyle>
+          <a:effectLst>
+            <a:outerShdw blurRad="40000" dist="23000" dir="5400000" rotWithShape="0">
+              <a:srgbClr val="000000">
+                <a:alpha val="35000"/>
+              </a:srgbClr>
+            </a:outerShdw>
+          </a:effectLst>
+        </a:effectStyle>
+        <a:effectStyle>
+          <a:effectLst>
+            <a:outerShdw blurRad="40000" dist="23000" dir="5400000" rotWithShape="0">
+              <a:srgbClr val="000000">
+                <a:alpha val="35000"/>
+              </a:srgbClr>
+            </a:outerShdw>
+          </a:effectLst>
+          <a:scene3d>
+            <a:camera prst="orthographicFront">
+              <a:rot lat="0" lon="0" rev="0"/>
+            </a:camera>
+            <a:lightRig rig="threePt" dir="t">
+              <a:rot lat="0" lon="0" rev="1200000"/>
+            </a:lightRig>
+          </a:scene3d>
+          <a:sp3d>
+            <a:bevelT w="63500" h="25400"/>
+          </a:sp3d>
+        </a:effectStyle>
+      </a:effectStyleLst>
+      <a:bgFillStyleLst>
+        <a:solidFill>
+          <a:schemeClr val="phClr"/>
+        </a:solidFill>
+        <a:gradFill rotWithShape="1">
+          <a:gsLst>
+            <a:gs pos="0">
+              <a:schemeClr val="phClr">
+                <a:tint val="40000"/>
+                <a:satMod val="350000"/>
+              </a:schemeClr>
+            </a:gs>
+            <a:gs pos="40000">
+              <a:schemeClr val="phClr">
+                <a:tint val="45000"/>
+                <a:shade val="99000"/>
+                <a:satMod val="350000"/>
+              </a:schemeClr>
+            </a:gs>
+            <a:gs pos="100000">
+              <a:schemeClr val="phClr">
+                <a:shade val="20000"/>
+                <a:satMod val="255000"/>
+              </a:schemeClr>
+            </a:gs>
+          </a:gsLst>
+          <a:path path="circle">
+            <a:fillToRect l="50000" t="-80000" r="50000" b="180000"/>
+          </a:path>
+        </a:gradFill>
+        <a:gradFill rotWithShape="1">
+          <a:gsLst>
+            <a:gs pos="0">
+              <a:schemeClr val="phClr">
+                <a:tint val="80000"/>
+                <a:satMod val="300000"/>
+              </a:schemeClr>
+            </a:gs>
+            <a:gs pos="100000">
+              <a:schemeClr val="phClr">
+                <a:shade val="30000"/>
+                <a:satMod val="200000"/>
+              </a:schemeClr>
+            </a:gs>
+          </a:gsLst>
+          <a:path path="circle">
+            <a:fillToRect l="50000" t="50000" r="50000" b="50000"/>
+          </a:path>
+        </a:gradFill>
+      </a:bgFillStyleLst>
+    </a:fmtScheme>
+  </a:themeElements>
+</a:theme>
+</file>
+
+<file path=ppt/theme/theme2.xml><?xml version="1.0" encoding="utf-8"?>
 <a:theme xmlns:a="http://schemas.openxmlformats.org/drawingml/2006/main" xmlns:r="http://schemas.openxmlformats.org/officeDocument/2006/relationships" name="Simple Dark">
   <a:themeElements>
     <a:clrScheme name="Simple Dark">
@@ -9030,283 +8949,4 @@
     </a:fmtScheme>
   </a:themeElements>
 </a:theme>
-</file>
-
-<file path=ppt/theme/theme2.xml><?xml version="1.0" encoding="utf-8"?>
-<a:theme xmlns:a="http://schemas.openxmlformats.org/drawingml/2006/main" xmlns:r="http://schemas.openxmlformats.org/officeDocument/2006/relationships">
-  <a:themeElements>
-    <a:clrScheme name="Default">
-      <a:dk1>
-        <a:srgbClr val="000000"/>
-      </a:dk1>
-      <a:lt1>
-        <a:srgbClr val="FFFFFF"/>
-      </a:lt1>
-      <a:dk2>
-        <a:srgbClr val="158158"/>
-      </a:dk2>
-      <a:lt2>
-        <a:srgbClr val="F3F3F3"/>
-      </a:lt2>
-      <a:accent1>
-        <a:srgbClr val="058DC7"/>
-      </a:accent1>
-      <a:accent2>
-        <a:srgbClr val="50B432"/>
-      </a:accent2>
-      <a:accent3>
-        <a:srgbClr val="ED561B"/>
-      </a:accent3>
-      <a:accent4>
-        <a:srgbClr val="EDEF00"/>
-      </a:accent4>
-      <a:accent5>
-        <a:srgbClr val="24CBE5"/>
-      </a:accent5>
-      <a:accent6>
-        <a:srgbClr val="64E572"/>
-      </a:accent6>
-      <a:hlink>
-        <a:srgbClr val="2200CC"/>
-      </a:hlink>
-      <a:folHlink>
-        <a:srgbClr val="551A8B"/>
-      </a:folHlink>
-    </a:clrScheme>
-    <a:fontScheme name="Office">
-      <a:majorFont>
-        <a:latin typeface="Arial"/>
-        <a:ea typeface=""/>
-        <a:cs typeface=""/>
-        <a:font script="Jpan" typeface="ＭＳ Ｐゴシック"/>
-        <a:font script="Hang" typeface="맑은 고딕"/>
-        <a:font script="Hans" typeface="宋体"/>
-        <a:font script="Hant" typeface="新細明體"/>
-        <a:font script="Arab" typeface="Times New Roman"/>
-        <a:font script="Hebr" typeface="Times New Roman"/>
-        <a:font script="Thai" typeface="Angsana New"/>
-        <a:font script="Ethi" typeface="Nyala"/>
-        <a:font script="Beng" typeface="Vrinda"/>
-        <a:font script="Gujr" typeface="Shruti"/>
-        <a:font script="Khmr" typeface="MoolBoran"/>
-        <a:font script="Knda" typeface="Tunga"/>
-        <a:font script="Guru" typeface="Raavi"/>
-        <a:font script="Cans" typeface="Euphemia"/>
-        <a:font script="Cher" typeface="Plantagenet Cherokee"/>
-        <a:font script="Yiii" typeface="Microsoft Yi Baiti"/>
-        <a:font script="Tibt" typeface="Microsoft Himalaya"/>
-        <a:font script="Thaa" typeface="MV Boli"/>
-        <a:font script="Deva" typeface="Mangal"/>
-        <a:font script="Telu" typeface="Gautami"/>
-        <a:font script="Taml" typeface="Latha"/>
-        <a:font script="Syrc" typeface="Estrangelo Edessa"/>
-        <a:font script="Orya" typeface="Kalinga"/>
-        <a:font script="Mlym" typeface="Kartika"/>
-        <a:font script="Laoo" typeface="DokChampa"/>
-        <a:font script="Sinh" typeface="Iskoola Pota"/>
-        <a:font script="Mong" typeface="Mongolian Baiti"/>
-        <a:font script="Viet" typeface="Times New Roman"/>
-        <a:font script="Uigh" typeface="Microsoft Uighur"/>
-        <a:font script="Geor" typeface="Sylfaen"/>
-      </a:majorFont>
-      <a:minorFont>
-        <a:latin typeface="Arial"/>
-        <a:ea typeface=""/>
-        <a:cs typeface=""/>
-        <a:font script="Jpan" typeface="ＭＳ Ｐゴシック"/>
-        <a:font script="Hang" typeface="맑은 고딕"/>
-        <a:font script="Hans" typeface="宋体"/>
-        <a:font script="Hant" typeface="新細明體"/>
-        <a:font script="Arab" typeface="Arial"/>
-        <a:font script="Hebr" typeface="Arial"/>
-        <a:font script="Thai" typeface="Cordia New"/>
-        <a:font script="Ethi" typeface="Nyala"/>
-        <a:font script="Beng" typeface="Vrinda"/>
-        <a:font script="Gujr" typeface="Shruti"/>
-        <a:font script="Khmr" typeface="DaunPenh"/>
-        <a:font script="Knda" typeface="Tunga"/>
-        <a:font script="Guru" typeface="Raavi"/>
-        <a:font script="Cans" typeface="Euphemia"/>
-        <a:font script="Cher" typeface="Plantagenet Cherokee"/>
-        <a:font script="Yiii" typeface="Microsoft Yi Baiti"/>
-        <a:font script="Tibt" typeface="Microsoft Himalaya"/>
-        <a:font script="Thaa" typeface="MV Boli"/>
-        <a:font script="Deva" typeface="Mangal"/>
-        <a:font script="Telu" typeface="Gautami"/>
-        <a:font script="Taml" typeface="Latha"/>
-        <a:font script="Syrc" typeface="Estrangelo Edessa"/>
-        <a:font script="Orya" typeface="Kalinga"/>
-        <a:font script="Mlym" typeface="Kartika"/>
-        <a:font script="Laoo" typeface="DokChampa"/>
-        <a:font script="Sinh" typeface="Iskoola Pota"/>
-        <a:font script="Mong" typeface="Mongolian Baiti"/>
-        <a:font script="Viet" typeface="Arial"/>
-        <a:font script="Uigh" typeface="Microsoft Uighur"/>
-        <a:font script="Geor" typeface="Sylfaen"/>
-      </a:minorFont>
-    </a:fontScheme>
-    <a:fmtScheme name="Office">
-      <a:fillStyleLst>
-        <a:solidFill>
-          <a:schemeClr val="phClr"/>
-        </a:solidFill>
-        <a:gradFill rotWithShape="1">
-          <a:gsLst>
-            <a:gs pos="0">
-              <a:schemeClr val="phClr">
-                <a:tint val="50000"/>
-                <a:satMod val="300000"/>
-              </a:schemeClr>
-            </a:gs>
-            <a:gs pos="35000">
-              <a:schemeClr val="phClr">
-                <a:tint val="37000"/>
-                <a:satMod val="300000"/>
-              </a:schemeClr>
-            </a:gs>
-            <a:gs pos="100000">
-              <a:schemeClr val="phClr">
-                <a:tint val="15000"/>
-                <a:satMod val="350000"/>
-              </a:schemeClr>
-            </a:gs>
-          </a:gsLst>
-          <a:lin ang="16200000" scaled="1"/>
-        </a:gradFill>
-        <a:gradFill rotWithShape="1">
-          <a:gsLst>
-            <a:gs pos="0">
-              <a:schemeClr val="phClr">
-                <a:tint val="100000"/>
-                <a:shade val="100000"/>
-                <a:satMod val="130000"/>
-              </a:schemeClr>
-            </a:gs>
-            <a:gs pos="100000">
-              <a:schemeClr val="phClr">
-                <a:tint val="50000"/>
-                <a:shade val="100000"/>
-                <a:satMod val="350000"/>
-              </a:schemeClr>
-            </a:gs>
-          </a:gsLst>
-          <a:lin ang="16200000" scaled="0"/>
-        </a:gradFill>
-      </a:fillStyleLst>
-      <a:lnStyleLst>
-        <a:ln w="9525" cap="flat" cmpd="sng" algn="ctr">
-          <a:solidFill>
-            <a:schemeClr val="phClr">
-              <a:shade val="95000"/>
-              <a:satMod val="105000"/>
-            </a:schemeClr>
-          </a:solidFill>
-          <a:prstDash val="solid"/>
-        </a:ln>
-        <a:ln w="25400" cap="flat" cmpd="sng" algn="ctr">
-          <a:solidFill>
-            <a:schemeClr val="phClr"/>
-          </a:solidFill>
-          <a:prstDash val="solid"/>
-        </a:ln>
-        <a:ln w="38100" cap="flat" cmpd="sng" algn="ctr">
-          <a:solidFill>
-            <a:schemeClr val="phClr"/>
-          </a:solidFill>
-          <a:prstDash val="solid"/>
-        </a:ln>
-      </a:lnStyleLst>
-      <a:effectStyleLst>
-        <a:effectStyle>
-          <a:effectLst>
-            <a:outerShdw blurRad="40000" dist="20000" dir="5400000" rotWithShape="0">
-              <a:srgbClr val="000000">
-                <a:alpha val="38000"/>
-              </a:srgbClr>
-            </a:outerShdw>
-          </a:effectLst>
-        </a:effectStyle>
-        <a:effectStyle>
-          <a:effectLst>
-            <a:outerShdw blurRad="40000" dist="23000" dir="5400000" rotWithShape="0">
-              <a:srgbClr val="000000">
-                <a:alpha val="35000"/>
-              </a:srgbClr>
-            </a:outerShdw>
-          </a:effectLst>
-        </a:effectStyle>
-        <a:effectStyle>
-          <a:effectLst>
-            <a:outerShdw blurRad="40000" dist="23000" dir="5400000" rotWithShape="0">
-              <a:srgbClr val="000000">
-                <a:alpha val="35000"/>
-              </a:srgbClr>
-            </a:outerShdw>
-          </a:effectLst>
-          <a:scene3d>
-            <a:camera prst="orthographicFront">
-              <a:rot lat="0" lon="0" rev="0"/>
-            </a:camera>
-            <a:lightRig rig="threePt" dir="t">
-              <a:rot lat="0" lon="0" rev="1200000"/>
-            </a:lightRig>
-          </a:scene3d>
-          <a:sp3d>
-            <a:bevelT w="63500" h="25400"/>
-          </a:sp3d>
-        </a:effectStyle>
-      </a:effectStyleLst>
-      <a:bgFillStyleLst>
-        <a:solidFill>
-          <a:schemeClr val="phClr"/>
-        </a:solidFill>
-        <a:gradFill rotWithShape="1">
-          <a:gsLst>
-            <a:gs pos="0">
-              <a:schemeClr val="phClr">
-                <a:tint val="40000"/>
-                <a:satMod val="350000"/>
-              </a:schemeClr>
-            </a:gs>
-            <a:gs pos="40000">
-              <a:schemeClr val="phClr">
-                <a:tint val="45000"/>
-                <a:shade val="99000"/>
-                <a:satMod val="350000"/>
-              </a:schemeClr>
-            </a:gs>
-            <a:gs pos="100000">
-              <a:schemeClr val="phClr">
-                <a:shade val="20000"/>
-                <a:satMod val="255000"/>
-              </a:schemeClr>
-            </a:gs>
-          </a:gsLst>
-          <a:path path="circle">
-            <a:fillToRect l="50000" t="-80000" r="50000" b="180000"/>
-          </a:path>
-        </a:gradFill>
-        <a:gradFill rotWithShape="1">
-          <a:gsLst>
-            <a:gs pos="0">
-              <a:schemeClr val="phClr">
-                <a:tint val="80000"/>
-                <a:satMod val="300000"/>
-              </a:schemeClr>
-            </a:gs>
-            <a:gs pos="100000">
-              <a:schemeClr val="phClr">
-                <a:shade val="30000"/>
-                <a:satMod val="200000"/>
-              </a:schemeClr>
-            </a:gs>
-          </a:gsLst>
-          <a:path path="circle">
-            <a:fillToRect l="50000" t="50000" r="50000" b="50000"/>
-          </a:path>
-        </a:gradFill>
-      </a:bgFillStyleLst>
-    </a:fmtScheme>
-  </a:themeElements>
-</a:theme>
 </file>
</xml_diff>